<commit_message>
REPORTGEN-1070: update generic library templates
</commit_message>
<xml_diff>
--- a/CastReporting.Reporting.Core/Templates/zh-CN/Application/Component library/Generic Graph Definition.pptx
+++ b/CastReporting.Reporting.Core/Templates/zh-CN/Application/Component library/Generic Graph Definition.pptx
@@ -5,7 +5,7 @@
     <p:sldMasterId id="2147483648" r:id="rId1"/>
   </p:sldMasterIdLst>
   <p:notesMasterIdLst>
-    <p:notesMasterId r:id="rId13"/>
+    <p:notesMasterId r:id="rId14"/>
   </p:notesMasterIdLst>
   <p:sldIdLst>
     <p:sldId id="342" r:id="rId2"/>
@@ -19,6 +19,7 @@
     <p:sldId id="382" r:id="rId10"/>
     <p:sldId id="385" r:id="rId11"/>
     <p:sldId id="387" r:id="rId12"/>
+    <p:sldId id="388" r:id="rId13"/>
   </p:sldIdLst>
   <p:sldSz cx="12192000" cy="6858000"/>
   <p:notesSz cx="6858000" cy="9144000"/>
@@ -1083,6 +1084,485 @@
         <a:effectLst/>
       </c:spPr>
     </c:plotArea>
+    <c:plotVisOnly val="1"/>
+    <c:dispBlanksAs val="gap"/>
+    <c:showDLblsOverMax val="0"/>
+  </c:chart>
+  <c:spPr>
+    <a:noFill/>
+    <a:ln>
+      <a:noFill/>
+    </a:ln>
+    <a:effectLst/>
+  </c:spPr>
+  <c:txPr>
+    <a:bodyPr/>
+    <a:lstStyle/>
+    <a:p>
+      <a:pPr>
+        <a:defRPr/>
+      </a:pPr>
+      <a:endParaRPr lang="en-US"/>
+    </a:p>
+  </c:txPr>
+  <c:externalData r:id="rId3">
+    <c:autoUpdate val="0"/>
+  </c:externalData>
+</c:chartSpace>
+</file>
+
+<file path=ppt/charts/chart11.xml><?xml version="1.0" encoding="utf-8"?>
+<c:chartSpace xmlns:c="http://schemas.openxmlformats.org/drawingml/2006/chart" xmlns:a="http://schemas.openxmlformats.org/drawingml/2006/main" xmlns:r="http://schemas.openxmlformats.org/officeDocument/2006/relationships" xmlns:c16r2="http://schemas.microsoft.com/office/drawing/2015/06/chart">
+  <c:date1904 val="0"/>
+  <c:lang val="en-US"/>
+  <c:roundedCorners val="0"/>
+  <mc:AlternateContent xmlns:mc="http://schemas.openxmlformats.org/markup-compatibility/2006">
+    <mc:Choice xmlns:c14="http://schemas.microsoft.com/office/drawing/2007/8/2/chart" Requires="c14">
+      <c14:style val="102"/>
+    </mc:Choice>
+    <mc:Fallback>
+      <c:style val="2"/>
+    </mc:Fallback>
+  </mc:AlternateContent>
+  <c:chart>
+    <c:title>
+      <c:tx>
+        <c:rich>
+          <a:bodyPr rot="0" spcFirstLastPara="1" vertOverflow="ellipsis" vert="horz" wrap="square" anchor="ctr" anchorCtr="1"/>
+          <a:lstStyle/>
+          <a:p>
+            <a:pPr>
+              <a:defRPr sz="1000" b="1" i="0" u="none" strike="noStrike" kern="1200" spc="0" baseline="0">
+                <a:solidFill>
+                  <a:schemeClr val="tx1">
+                    <a:lumMod val="65000"/>
+                    <a:lumOff val="35000"/>
+                  </a:schemeClr>
+                </a:solidFill>
+                <a:latin typeface="+mn-lt"/>
+                <a:ea typeface="+mn-ea"/>
+                <a:cs typeface="+mn-cs"/>
+              </a:defRPr>
+            </a:pPr>
+            <a:r>
+              <a:rPr lang="fr-FR" sz="1000" b="1" dirty="0">
+                <a:effectLst/>
+              </a:rPr>
+              <a:t>ADDED AND REMOVED ISO TECHNICAL DEBT BY MODULE</a:t>
+            </a:r>
+            <a:endParaRPr lang="en-US" sz="1000" b="1" dirty="0">
+              <a:effectLst/>
+            </a:endParaRPr>
+          </a:p>
+        </c:rich>
+      </c:tx>
+      <c:overlay val="0"/>
+      <c:spPr>
+        <a:noFill/>
+        <a:ln>
+          <a:noFill/>
+        </a:ln>
+        <a:effectLst/>
+      </c:spPr>
+      <c:txPr>
+        <a:bodyPr rot="0" spcFirstLastPara="1" vertOverflow="ellipsis" vert="horz" wrap="square" anchor="ctr" anchorCtr="1"/>
+        <a:lstStyle/>
+        <a:p>
+          <a:pPr>
+            <a:defRPr sz="1000" b="1" i="0" u="none" strike="noStrike" kern="1200" spc="0" baseline="0">
+              <a:solidFill>
+                <a:schemeClr val="tx1">
+                  <a:lumMod val="65000"/>
+                  <a:lumOff val="35000"/>
+                </a:schemeClr>
+              </a:solidFill>
+              <a:latin typeface="+mn-lt"/>
+              <a:ea typeface="+mn-ea"/>
+              <a:cs typeface="+mn-cs"/>
+            </a:defRPr>
+          </a:pPr>
+          <a:endParaRPr lang="en-US"/>
+        </a:p>
+      </c:txPr>
+    </c:title>
+    <c:autoTitleDeleted val="0"/>
+    <c:plotArea>
+      <c:layout/>
+      <c:barChart>
+        <c:barDir val="bar"/>
+        <c:grouping val="clustered"/>
+        <c:varyColors val="0"/>
+        <c:ser>
+          <c:idx val="0"/>
+          <c:order val="0"/>
+          <c:tx>
+            <c:strRef>
+              <c:f>Sheet1!$B$1</c:f>
+              <c:strCache>
+                <c:ptCount val="1"/>
+                <c:pt idx="0">
+                  <c:v>Total</c:v>
+                </c:pt>
+              </c:strCache>
+            </c:strRef>
+          </c:tx>
+          <c:spPr>
+            <a:solidFill>
+              <a:schemeClr val="accent1"/>
+            </a:solidFill>
+            <a:ln>
+              <a:noFill/>
+            </a:ln>
+            <a:effectLst/>
+          </c:spPr>
+          <c:invertIfNegative val="0"/>
+          <c:cat>
+            <c:strRef>
+              <c:f>Sheet1!$A$2:$A$5</c:f>
+              <c:strCache>
+                <c:ptCount val="4"/>
+                <c:pt idx="0">
+                  <c:v>Module 1</c:v>
+                </c:pt>
+                <c:pt idx="1">
+                  <c:v>Module 2</c:v>
+                </c:pt>
+                <c:pt idx="2">
+                  <c:v>Module 3</c:v>
+                </c:pt>
+                <c:pt idx="3">
+                  <c:v>Module 4</c:v>
+                </c:pt>
+              </c:strCache>
+            </c:strRef>
+          </c:cat>
+          <c:val>
+            <c:numRef>
+              <c:f>Sheet1!$B$2:$B$5</c:f>
+              <c:numCache>
+                <c:formatCode>General</c:formatCode>
+                <c:ptCount val="4"/>
+                <c:pt idx="0">
+                  <c:v>30</c:v>
+                </c:pt>
+                <c:pt idx="1">
+                  <c:v>30</c:v>
+                </c:pt>
+                <c:pt idx="2">
+                  <c:v>30</c:v>
+                </c:pt>
+                <c:pt idx="3">
+                  <c:v>30</c:v>
+                </c:pt>
+              </c:numCache>
+            </c:numRef>
+          </c:val>
+          <c:extLst>
+            <c:ext xmlns:c16="http://schemas.microsoft.com/office/drawing/2014/chart" uri="{C3380CC4-5D6E-409C-BE32-E72D297353CC}">
+              <c16:uniqueId val="{00000000-3332-4F3C-99BE-F7E77DEDD538}"/>
+            </c:ext>
+          </c:extLst>
+        </c:ser>
+        <c:ser>
+          <c:idx val="1"/>
+          <c:order val="1"/>
+          <c:tx>
+            <c:strRef>
+              <c:f>Sheet1!$C$1</c:f>
+              <c:strCache>
+                <c:ptCount val="1"/>
+                <c:pt idx="0">
+                  <c:v>Added</c:v>
+                </c:pt>
+              </c:strCache>
+            </c:strRef>
+          </c:tx>
+          <c:spPr>
+            <a:solidFill>
+              <a:schemeClr val="accent2"/>
+            </a:solidFill>
+            <a:ln>
+              <a:noFill/>
+            </a:ln>
+            <a:effectLst/>
+          </c:spPr>
+          <c:invertIfNegative val="0"/>
+          <c:cat>
+            <c:strRef>
+              <c:f>Sheet1!$A$2:$A$5</c:f>
+              <c:strCache>
+                <c:ptCount val="4"/>
+                <c:pt idx="0">
+                  <c:v>Module 1</c:v>
+                </c:pt>
+                <c:pt idx="1">
+                  <c:v>Module 2</c:v>
+                </c:pt>
+                <c:pt idx="2">
+                  <c:v>Module 3</c:v>
+                </c:pt>
+                <c:pt idx="3">
+                  <c:v>Module 4</c:v>
+                </c:pt>
+              </c:strCache>
+            </c:strRef>
+          </c:cat>
+          <c:val>
+            <c:numRef>
+              <c:f>Sheet1!$C$2:$C$5</c:f>
+              <c:numCache>
+                <c:formatCode>General</c:formatCode>
+                <c:ptCount val="4"/>
+                <c:pt idx="0">
+                  <c:v>10</c:v>
+                </c:pt>
+                <c:pt idx="1">
+                  <c:v>10</c:v>
+                </c:pt>
+                <c:pt idx="2">
+                  <c:v>10</c:v>
+                </c:pt>
+                <c:pt idx="3">
+                  <c:v>10</c:v>
+                </c:pt>
+              </c:numCache>
+            </c:numRef>
+          </c:val>
+          <c:extLst>
+            <c:ext xmlns:c16="http://schemas.microsoft.com/office/drawing/2014/chart" uri="{C3380CC4-5D6E-409C-BE32-E72D297353CC}">
+              <c16:uniqueId val="{00000001-3332-4F3C-99BE-F7E77DEDD538}"/>
+            </c:ext>
+          </c:extLst>
+        </c:ser>
+        <c:ser>
+          <c:idx val="2"/>
+          <c:order val="2"/>
+          <c:tx>
+            <c:strRef>
+              <c:f>Sheet1!$D$1</c:f>
+              <c:strCache>
+                <c:ptCount val="1"/>
+                <c:pt idx="0">
+                  <c:v>Removed</c:v>
+                </c:pt>
+              </c:strCache>
+            </c:strRef>
+          </c:tx>
+          <c:spPr>
+            <a:solidFill>
+              <a:schemeClr val="accent3"/>
+            </a:solidFill>
+            <a:ln>
+              <a:noFill/>
+            </a:ln>
+            <a:effectLst/>
+          </c:spPr>
+          <c:invertIfNegative val="0"/>
+          <c:cat>
+            <c:strRef>
+              <c:f>Sheet1!$A$2:$A$5</c:f>
+              <c:strCache>
+                <c:ptCount val="4"/>
+                <c:pt idx="0">
+                  <c:v>Module 1</c:v>
+                </c:pt>
+                <c:pt idx="1">
+                  <c:v>Module 2</c:v>
+                </c:pt>
+                <c:pt idx="2">
+                  <c:v>Module 3</c:v>
+                </c:pt>
+                <c:pt idx="3">
+                  <c:v>Module 4</c:v>
+                </c:pt>
+              </c:strCache>
+            </c:strRef>
+          </c:cat>
+          <c:val>
+            <c:numRef>
+              <c:f>Sheet1!$D$2:$D$5</c:f>
+              <c:numCache>
+                <c:formatCode>General</c:formatCode>
+                <c:ptCount val="4"/>
+                <c:pt idx="0">
+                  <c:v>10</c:v>
+                </c:pt>
+                <c:pt idx="1">
+                  <c:v>10</c:v>
+                </c:pt>
+                <c:pt idx="2">
+                  <c:v>10</c:v>
+                </c:pt>
+                <c:pt idx="3">
+                  <c:v>10</c:v>
+                </c:pt>
+              </c:numCache>
+            </c:numRef>
+          </c:val>
+          <c:extLst>
+            <c:ext xmlns:c16="http://schemas.microsoft.com/office/drawing/2014/chart" uri="{C3380CC4-5D6E-409C-BE32-E72D297353CC}">
+              <c16:uniqueId val="{00000002-3332-4F3C-99BE-F7E77DEDD538}"/>
+            </c:ext>
+          </c:extLst>
+        </c:ser>
+        <c:dLbls>
+          <c:showLegendKey val="0"/>
+          <c:showVal val="0"/>
+          <c:showCatName val="0"/>
+          <c:showSerName val="0"/>
+          <c:showPercent val="0"/>
+          <c:showBubbleSize val="0"/>
+        </c:dLbls>
+        <c:gapWidth val="219"/>
+        <c:axId val="461299216"/>
+        <c:axId val="461299544"/>
+      </c:barChart>
+      <c:catAx>
+        <c:axId val="461299216"/>
+        <c:scaling>
+          <c:orientation val="minMax"/>
+        </c:scaling>
+        <c:delete val="0"/>
+        <c:axPos val="l"/>
+        <c:numFmt formatCode="General" sourceLinked="1"/>
+        <c:majorTickMark val="none"/>
+        <c:minorTickMark val="none"/>
+        <c:tickLblPos val="nextTo"/>
+        <c:spPr>
+          <a:noFill/>
+          <a:ln w="9525" cap="flat" cmpd="sng" algn="ctr">
+            <a:solidFill>
+              <a:schemeClr val="tx1">
+                <a:lumMod val="15000"/>
+                <a:lumOff val="85000"/>
+              </a:schemeClr>
+            </a:solidFill>
+            <a:round/>
+          </a:ln>
+          <a:effectLst/>
+        </c:spPr>
+        <c:txPr>
+          <a:bodyPr rot="-60000000" spcFirstLastPara="1" vertOverflow="ellipsis" vert="horz" wrap="square" anchor="ctr" anchorCtr="1"/>
+          <a:lstStyle/>
+          <a:p>
+            <a:pPr>
+              <a:defRPr sz="1197" b="0" i="0" u="none" strike="noStrike" kern="1200" baseline="0">
+                <a:solidFill>
+                  <a:schemeClr val="tx1">
+                    <a:lumMod val="65000"/>
+                    <a:lumOff val="35000"/>
+                  </a:schemeClr>
+                </a:solidFill>
+                <a:latin typeface="+mn-lt"/>
+                <a:ea typeface="+mn-ea"/>
+                <a:cs typeface="+mn-cs"/>
+              </a:defRPr>
+            </a:pPr>
+            <a:endParaRPr lang="en-US"/>
+          </a:p>
+        </c:txPr>
+        <c:crossAx val="461299544"/>
+        <c:crosses val="autoZero"/>
+        <c:auto val="1"/>
+        <c:lblAlgn val="ctr"/>
+        <c:lblOffset val="100"/>
+        <c:noMultiLvlLbl val="0"/>
+      </c:catAx>
+      <c:valAx>
+        <c:axId val="461299544"/>
+        <c:scaling>
+          <c:orientation val="minMax"/>
+        </c:scaling>
+        <c:delete val="0"/>
+        <c:axPos val="b"/>
+        <c:majorGridlines>
+          <c:spPr>
+            <a:ln w="9525" cap="flat" cmpd="sng" algn="ctr">
+              <a:solidFill>
+                <a:schemeClr val="tx1">
+                  <a:lumMod val="15000"/>
+                  <a:lumOff val="85000"/>
+                </a:schemeClr>
+              </a:solidFill>
+              <a:round/>
+            </a:ln>
+            <a:effectLst/>
+          </c:spPr>
+        </c:majorGridlines>
+        <c:numFmt formatCode="General" sourceLinked="1"/>
+        <c:majorTickMark val="none"/>
+        <c:minorTickMark val="none"/>
+        <c:tickLblPos val="nextTo"/>
+        <c:spPr>
+          <a:noFill/>
+          <a:ln>
+            <a:noFill/>
+          </a:ln>
+          <a:effectLst/>
+        </c:spPr>
+        <c:txPr>
+          <a:bodyPr rot="-60000000" spcFirstLastPara="1" vertOverflow="ellipsis" vert="horz" wrap="square" anchor="ctr" anchorCtr="1"/>
+          <a:lstStyle/>
+          <a:p>
+            <a:pPr>
+              <a:defRPr sz="1197" b="0" i="0" u="none" strike="noStrike" kern="1200" baseline="0">
+                <a:solidFill>
+                  <a:schemeClr val="tx1">
+                    <a:lumMod val="65000"/>
+                    <a:lumOff val="35000"/>
+                  </a:schemeClr>
+                </a:solidFill>
+                <a:latin typeface="+mn-lt"/>
+                <a:ea typeface="+mn-ea"/>
+                <a:cs typeface="+mn-cs"/>
+              </a:defRPr>
+            </a:pPr>
+            <a:endParaRPr lang="en-US"/>
+          </a:p>
+        </c:txPr>
+        <c:crossAx val="461299216"/>
+        <c:crosses val="autoZero"/>
+        <c:crossBetween val="between"/>
+      </c:valAx>
+      <c:spPr>
+        <a:noFill/>
+        <a:ln>
+          <a:noFill/>
+        </a:ln>
+        <a:effectLst/>
+      </c:spPr>
+    </c:plotArea>
+    <c:legend>
+      <c:legendPos val="b"/>
+      <c:overlay val="0"/>
+      <c:spPr>
+        <a:noFill/>
+        <a:ln>
+          <a:noFill/>
+        </a:ln>
+        <a:effectLst/>
+      </c:spPr>
+      <c:txPr>
+        <a:bodyPr rot="0" spcFirstLastPara="1" vertOverflow="ellipsis" vert="horz" wrap="square" anchor="ctr" anchorCtr="1"/>
+        <a:lstStyle/>
+        <a:p>
+          <a:pPr>
+            <a:defRPr sz="1197" b="0" i="0" u="none" strike="noStrike" kern="1200" baseline="0">
+              <a:solidFill>
+                <a:schemeClr val="tx1">
+                  <a:lumMod val="65000"/>
+                  <a:lumOff val="35000"/>
+                </a:schemeClr>
+              </a:solidFill>
+              <a:latin typeface="+mn-lt"/>
+              <a:ea typeface="+mn-ea"/>
+              <a:cs typeface="+mn-cs"/>
+            </a:defRPr>
+          </a:pPr>
+          <a:endParaRPr lang="en-US"/>
+        </a:p>
+      </c:txPr>
+    </c:legend>
     <c:plotVisOnly val="1"/>
     <c:dispBlanksAs val="gap"/>
     <c:showDLblsOverMax val="0"/>
@@ -5623,6 +6103,46 @@
 </cs:colorStyle>
 </file>
 
+<file path=ppt/charts/colors11.xml><?xml version="1.0" encoding="utf-8"?>
+<cs:colorStyle xmlns:cs="http://schemas.microsoft.com/office/drawing/2012/chartStyle" xmlns:a="http://schemas.openxmlformats.org/drawingml/2006/main" meth="cycle" id="10">
+  <a:schemeClr val="accent1"/>
+  <a:schemeClr val="accent2"/>
+  <a:schemeClr val="accent3"/>
+  <a:schemeClr val="accent4"/>
+  <a:schemeClr val="accent5"/>
+  <a:schemeClr val="accent6"/>
+  <cs:variation/>
+  <cs:variation>
+    <a:lumMod val="60000"/>
+  </cs:variation>
+  <cs:variation>
+    <a:lumMod val="80000"/>
+    <a:lumOff val="20000"/>
+  </cs:variation>
+  <cs:variation>
+    <a:lumMod val="80000"/>
+  </cs:variation>
+  <cs:variation>
+    <a:lumMod val="60000"/>
+    <a:lumOff val="40000"/>
+  </cs:variation>
+  <cs:variation>
+    <a:lumMod val="50000"/>
+  </cs:variation>
+  <cs:variation>
+    <a:lumMod val="70000"/>
+    <a:lumOff val="30000"/>
+  </cs:variation>
+  <cs:variation>
+    <a:lumMod val="70000"/>
+  </cs:variation>
+  <cs:variation>
+    <a:lumMod val="50000"/>
+    <a:lumOff val="50000"/>
+  </cs:variation>
+</cs:colorStyle>
+</file>
+
 <file path=ppt/charts/colors2.xml><?xml version="1.0" encoding="utf-8"?>
 <cs:colorStyle xmlns:cs="http://schemas.microsoft.com/office/drawing/2012/chartStyle" xmlns:a="http://schemas.openxmlformats.org/drawingml/2006/main" meth="cycle" id="10">
   <a:schemeClr val="accent1"/>
@@ -6963,6 +7483,509 @@
 </cs:chartStyle>
 </file>
 
+<file path=ppt/charts/style11.xml><?xml version="1.0" encoding="utf-8"?>
+<cs:chartStyle xmlns:cs="http://schemas.microsoft.com/office/drawing/2012/chartStyle" xmlns:a="http://schemas.openxmlformats.org/drawingml/2006/main" id="201">
+  <cs:axisTitle>
+    <cs:lnRef idx="0"/>
+    <cs:fillRef idx="0"/>
+    <cs:effectRef idx="0"/>
+    <cs:fontRef idx="minor">
+      <a:schemeClr val="tx1">
+        <a:lumMod val="65000"/>
+        <a:lumOff val="35000"/>
+      </a:schemeClr>
+    </cs:fontRef>
+    <cs:defRPr sz="1330" kern="1200"/>
+  </cs:axisTitle>
+  <cs:categoryAxis>
+    <cs:lnRef idx="0"/>
+    <cs:fillRef idx="0"/>
+    <cs:effectRef idx="0"/>
+    <cs:fontRef idx="minor">
+      <a:schemeClr val="tx1">
+        <a:lumMod val="65000"/>
+        <a:lumOff val="35000"/>
+      </a:schemeClr>
+    </cs:fontRef>
+    <cs:spPr>
+      <a:ln w="9525" cap="flat" cmpd="sng" algn="ctr">
+        <a:solidFill>
+          <a:schemeClr val="tx1">
+            <a:lumMod val="15000"/>
+            <a:lumOff val="85000"/>
+          </a:schemeClr>
+        </a:solidFill>
+        <a:round/>
+      </a:ln>
+    </cs:spPr>
+    <cs:defRPr sz="1197" kern="1200"/>
+  </cs:categoryAxis>
+  <cs:chartArea mods="allowNoFillOverride allowNoLineOverride">
+    <cs:lnRef idx="0"/>
+    <cs:fillRef idx="0"/>
+    <cs:effectRef idx="0"/>
+    <cs:fontRef idx="minor">
+      <a:schemeClr val="tx1"/>
+    </cs:fontRef>
+    <cs:spPr>
+      <a:solidFill>
+        <a:schemeClr val="bg1"/>
+      </a:solidFill>
+      <a:ln w="9525" cap="flat" cmpd="sng" algn="ctr">
+        <a:solidFill>
+          <a:schemeClr val="tx1">
+            <a:lumMod val="15000"/>
+            <a:lumOff val="85000"/>
+          </a:schemeClr>
+        </a:solidFill>
+        <a:round/>
+      </a:ln>
+    </cs:spPr>
+    <cs:defRPr sz="1330" kern="1200"/>
+  </cs:chartArea>
+  <cs:dataLabel>
+    <cs:lnRef idx="0"/>
+    <cs:fillRef idx="0"/>
+    <cs:effectRef idx="0"/>
+    <cs:fontRef idx="minor">
+      <a:schemeClr val="tx1">
+        <a:lumMod val="75000"/>
+        <a:lumOff val="25000"/>
+      </a:schemeClr>
+    </cs:fontRef>
+    <cs:defRPr sz="1197" kern="1200"/>
+  </cs:dataLabel>
+  <cs:dataLabelCallout>
+    <cs:lnRef idx="0"/>
+    <cs:fillRef idx="0"/>
+    <cs:effectRef idx="0"/>
+    <cs:fontRef idx="minor">
+      <a:schemeClr val="dk1">
+        <a:lumMod val="65000"/>
+        <a:lumOff val="35000"/>
+      </a:schemeClr>
+    </cs:fontRef>
+    <cs:spPr>
+      <a:solidFill>
+        <a:schemeClr val="lt1"/>
+      </a:solidFill>
+      <a:ln>
+        <a:solidFill>
+          <a:schemeClr val="dk1">
+            <a:lumMod val="25000"/>
+            <a:lumOff val="75000"/>
+          </a:schemeClr>
+        </a:solidFill>
+      </a:ln>
+    </cs:spPr>
+    <cs:defRPr sz="1197" kern="1200"/>
+    <cs:bodyPr rot="0" spcFirstLastPara="1" vertOverflow="clip" horzOverflow="clip" vert="horz" wrap="square" lIns="36576" tIns="18288" rIns="36576" bIns="18288" anchor="ctr" anchorCtr="1">
+      <a:spAutoFit/>
+    </cs:bodyPr>
+  </cs:dataLabelCallout>
+  <cs:dataPoint>
+    <cs:lnRef idx="0"/>
+    <cs:fillRef idx="1">
+      <cs:styleClr val="auto"/>
+    </cs:fillRef>
+    <cs:effectRef idx="0"/>
+    <cs:fontRef idx="minor">
+      <a:schemeClr val="tx1"/>
+    </cs:fontRef>
+  </cs:dataPoint>
+  <cs:dataPoint3D>
+    <cs:lnRef idx="0"/>
+    <cs:fillRef idx="1">
+      <cs:styleClr val="auto"/>
+    </cs:fillRef>
+    <cs:effectRef idx="0"/>
+    <cs:fontRef idx="minor">
+      <a:schemeClr val="tx1"/>
+    </cs:fontRef>
+  </cs:dataPoint3D>
+  <cs:dataPointLine>
+    <cs:lnRef idx="0">
+      <cs:styleClr val="auto"/>
+    </cs:lnRef>
+    <cs:fillRef idx="1"/>
+    <cs:effectRef idx="0"/>
+    <cs:fontRef idx="minor">
+      <a:schemeClr val="tx1"/>
+    </cs:fontRef>
+    <cs:spPr>
+      <a:ln w="28575" cap="rnd">
+        <a:solidFill>
+          <a:schemeClr val="phClr"/>
+        </a:solidFill>
+        <a:round/>
+      </a:ln>
+    </cs:spPr>
+  </cs:dataPointLine>
+  <cs:dataPointMarker>
+    <cs:lnRef idx="0">
+      <cs:styleClr val="auto"/>
+    </cs:lnRef>
+    <cs:fillRef idx="1">
+      <cs:styleClr val="auto"/>
+    </cs:fillRef>
+    <cs:effectRef idx="0"/>
+    <cs:fontRef idx="minor">
+      <a:schemeClr val="tx1"/>
+    </cs:fontRef>
+    <cs:spPr>
+      <a:ln w="9525">
+        <a:solidFill>
+          <a:schemeClr val="phClr"/>
+        </a:solidFill>
+      </a:ln>
+    </cs:spPr>
+  </cs:dataPointMarker>
+  <cs:dataPointMarkerLayout symbol="circle" size="5"/>
+  <cs:dataPointWireframe>
+    <cs:lnRef idx="0">
+      <cs:styleClr val="auto"/>
+    </cs:lnRef>
+    <cs:fillRef idx="1"/>
+    <cs:effectRef idx="0"/>
+    <cs:fontRef idx="minor">
+      <a:schemeClr val="tx1"/>
+    </cs:fontRef>
+    <cs:spPr>
+      <a:ln w="9525" cap="rnd">
+        <a:solidFill>
+          <a:schemeClr val="phClr"/>
+        </a:solidFill>
+        <a:round/>
+      </a:ln>
+    </cs:spPr>
+  </cs:dataPointWireframe>
+  <cs:dataTable>
+    <cs:lnRef idx="0"/>
+    <cs:fillRef idx="0"/>
+    <cs:effectRef idx="0"/>
+    <cs:fontRef idx="minor">
+      <a:schemeClr val="tx1">
+        <a:lumMod val="65000"/>
+        <a:lumOff val="35000"/>
+      </a:schemeClr>
+    </cs:fontRef>
+    <cs:spPr>
+      <a:noFill/>
+      <a:ln w="9525" cap="flat" cmpd="sng" algn="ctr">
+        <a:solidFill>
+          <a:schemeClr val="tx1">
+            <a:lumMod val="15000"/>
+            <a:lumOff val="85000"/>
+          </a:schemeClr>
+        </a:solidFill>
+        <a:round/>
+      </a:ln>
+    </cs:spPr>
+    <cs:defRPr sz="1197" kern="1200"/>
+  </cs:dataTable>
+  <cs:downBar>
+    <cs:lnRef idx="0"/>
+    <cs:fillRef idx="0"/>
+    <cs:effectRef idx="0"/>
+    <cs:fontRef idx="minor">
+      <a:schemeClr val="dk1"/>
+    </cs:fontRef>
+    <cs:spPr>
+      <a:solidFill>
+        <a:schemeClr val="dk1">
+          <a:lumMod val="65000"/>
+          <a:lumOff val="35000"/>
+        </a:schemeClr>
+      </a:solidFill>
+      <a:ln w="9525">
+        <a:solidFill>
+          <a:schemeClr val="tx1">
+            <a:lumMod val="65000"/>
+            <a:lumOff val="35000"/>
+          </a:schemeClr>
+        </a:solidFill>
+      </a:ln>
+    </cs:spPr>
+  </cs:downBar>
+  <cs:dropLine>
+    <cs:lnRef idx="0"/>
+    <cs:fillRef idx="0"/>
+    <cs:effectRef idx="0"/>
+    <cs:fontRef idx="minor">
+      <a:schemeClr val="tx1"/>
+    </cs:fontRef>
+    <cs:spPr>
+      <a:ln w="9525" cap="flat" cmpd="sng" algn="ctr">
+        <a:solidFill>
+          <a:schemeClr val="tx1">
+            <a:lumMod val="35000"/>
+            <a:lumOff val="65000"/>
+          </a:schemeClr>
+        </a:solidFill>
+        <a:round/>
+      </a:ln>
+    </cs:spPr>
+  </cs:dropLine>
+  <cs:errorBar>
+    <cs:lnRef idx="0"/>
+    <cs:fillRef idx="0"/>
+    <cs:effectRef idx="0"/>
+    <cs:fontRef idx="minor">
+      <a:schemeClr val="tx1"/>
+    </cs:fontRef>
+    <cs:spPr>
+      <a:ln w="9525" cap="flat" cmpd="sng" algn="ctr">
+        <a:solidFill>
+          <a:schemeClr val="tx1">
+            <a:lumMod val="65000"/>
+            <a:lumOff val="35000"/>
+          </a:schemeClr>
+        </a:solidFill>
+        <a:round/>
+      </a:ln>
+    </cs:spPr>
+  </cs:errorBar>
+  <cs:floor>
+    <cs:lnRef idx="0"/>
+    <cs:fillRef idx="0"/>
+    <cs:effectRef idx="0"/>
+    <cs:fontRef idx="minor">
+      <a:schemeClr val="tx1"/>
+    </cs:fontRef>
+    <cs:spPr>
+      <a:noFill/>
+      <a:ln>
+        <a:noFill/>
+      </a:ln>
+    </cs:spPr>
+  </cs:floor>
+  <cs:gridlineMajor>
+    <cs:lnRef idx="0"/>
+    <cs:fillRef idx="0"/>
+    <cs:effectRef idx="0"/>
+    <cs:fontRef idx="minor">
+      <a:schemeClr val="tx1"/>
+    </cs:fontRef>
+    <cs:spPr>
+      <a:ln w="9525" cap="flat" cmpd="sng" algn="ctr">
+        <a:solidFill>
+          <a:schemeClr val="tx1">
+            <a:lumMod val="15000"/>
+            <a:lumOff val="85000"/>
+          </a:schemeClr>
+        </a:solidFill>
+        <a:round/>
+      </a:ln>
+    </cs:spPr>
+  </cs:gridlineMajor>
+  <cs:gridlineMinor>
+    <cs:lnRef idx="0"/>
+    <cs:fillRef idx="0"/>
+    <cs:effectRef idx="0"/>
+    <cs:fontRef idx="minor">
+      <a:schemeClr val="tx1"/>
+    </cs:fontRef>
+    <cs:spPr>
+      <a:ln w="9525" cap="flat" cmpd="sng" algn="ctr">
+        <a:solidFill>
+          <a:schemeClr val="tx1">
+            <a:lumMod val="5000"/>
+            <a:lumOff val="95000"/>
+          </a:schemeClr>
+        </a:solidFill>
+        <a:round/>
+      </a:ln>
+    </cs:spPr>
+  </cs:gridlineMinor>
+  <cs:hiLoLine>
+    <cs:lnRef idx="0"/>
+    <cs:fillRef idx="0"/>
+    <cs:effectRef idx="0"/>
+    <cs:fontRef idx="minor">
+      <a:schemeClr val="tx1"/>
+    </cs:fontRef>
+    <cs:spPr>
+      <a:ln w="9525" cap="flat" cmpd="sng" algn="ctr">
+        <a:solidFill>
+          <a:schemeClr val="tx1">
+            <a:lumMod val="75000"/>
+            <a:lumOff val="25000"/>
+          </a:schemeClr>
+        </a:solidFill>
+        <a:round/>
+      </a:ln>
+    </cs:spPr>
+  </cs:hiLoLine>
+  <cs:leaderLine>
+    <cs:lnRef idx="0"/>
+    <cs:fillRef idx="0"/>
+    <cs:effectRef idx="0"/>
+    <cs:fontRef idx="minor">
+      <a:schemeClr val="tx1"/>
+    </cs:fontRef>
+    <cs:spPr>
+      <a:ln w="9525" cap="flat" cmpd="sng" algn="ctr">
+        <a:solidFill>
+          <a:schemeClr val="tx1">
+            <a:lumMod val="35000"/>
+            <a:lumOff val="65000"/>
+          </a:schemeClr>
+        </a:solidFill>
+        <a:round/>
+      </a:ln>
+    </cs:spPr>
+  </cs:leaderLine>
+  <cs:legend>
+    <cs:lnRef idx="0"/>
+    <cs:fillRef idx="0"/>
+    <cs:effectRef idx="0"/>
+    <cs:fontRef idx="minor">
+      <a:schemeClr val="tx1">
+        <a:lumMod val="65000"/>
+        <a:lumOff val="35000"/>
+      </a:schemeClr>
+    </cs:fontRef>
+    <cs:defRPr sz="1197" kern="1200"/>
+  </cs:legend>
+  <cs:plotArea mods="allowNoFillOverride allowNoLineOverride">
+    <cs:lnRef idx="0"/>
+    <cs:fillRef idx="0"/>
+    <cs:effectRef idx="0"/>
+    <cs:fontRef idx="minor">
+      <a:schemeClr val="tx1"/>
+    </cs:fontRef>
+  </cs:plotArea>
+  <cs:plotArea3D mods="allowNoFillOverride allowNoLineOverride">
+    <cs:lnRef idx="0"/>
+    <cs:fillRef idx="0"/>
+    <cs:effectRef idx="0"/>
+    <cs:fontRef idx="minor">
+      <a:schemeClr val="tx1"/>
+    </cs:fontRef>
+  </cs:plotArea3D>
+  <cs:seriesAxis>
+    <cs:lnRef idx="0"/>
+    <cs:fillRef idx="0"/>
+    <cs:effectRef idx="0"/>
+    <cs:fontRef idx="minor">
+      <a:schemeClr val="tx1">
+        <a:lumMod val="65000"/>
+        <a:lumOff val="35000"/>
+      </a:schemeClr>
+    </cs:fontRef>
+    <cs:defRPr sz="1197" kern="1200"/>
+  </cs:seriesAxis>
+  <cs:seriesLine>
+    <cs:lnRef idx="0"/>
+    <cs:fillRef idx="0"/>
+    <cs:effectRef idx="0"/>
+    <cs:fontRef idx="minor">
+      <a:schemeClr val="tx1"/>
+    </cs:fontRef>
+    <cs:spPr>
+      <a:ln w="9525" cap="flat" cmpd="sng" algn="ctr">
+        <a:solidFill>
+          <a:schemeClr val="tx1">
+            <a:lumMod val="35000"/>
+            <a:lumOff val="65000"/>
+          </a:schemeClr>
+        </a:solidFill>
+        <a:round/>
+      </a:ln>
+    </cs:spPr>
+  </cs:seriesLine>
+  <cs:title>
+    <cs:lnRef idx="0"/>
+    <cs:fillRef idx="0"/>
+    <cs:effectRef idx="0"/>
+    <cs:fontRef idx="minor">
+      <a:schemeClr val="tx1">
+        <a:lumMod val="65000"/>
+        <a:lumOff val="35000"/>
+      </a:schemeClr>
+    </cs:fontRef>
+    <cs:defRPr sz="1862" b="0" kern="1200" spc="0" baseline="0"/>
+  </cs:title>
+  <cs:trendline>
+    <cs:lnRef idx="0">
+      <cs:styleClr val="auto"/>
+    </cs:lnRef>
+    <cs:fillRef idx="0"/>
+    <cs:effectRef idx="0"/>
+    <cs:fontRef idx="minor">
+      <a:schemeClr val="tx1"/>
+    </cs:fontRef>
+    <cs:spPr>
+      <a:ln w="19050" cap="rnd">
+        <a:solidFill>
+          <a:schemeClr val="phClr"/>
+        </a:solidFill>
+        <a:prstDash val="sysDot"/>
+      </a:ln>
+    </cs:spPr>
+  </cs:trendline>
+  <cs:trendlineLabel>
+    <cs:lnRef idx="0"/>
+    <cs:fillRef idx="0"/>
+    <cs:effectRef idx="0"/>
+    <cs:fontRef idx="minor">
+      <a:schemeClr val="tx1">
+        <a:lumMod val="65000"/>
+        <a:lumOff val="35000"/>
+      </a:schemeClr>
+    </cs:fontRef>
+    <cs:defRPr sz="1197" kern="1200"/>
+  </cs:trendlineLabel>
+  <cs:upBar>
+    <cs:lnRef idx="0"/>
+    <cs:fillRef idx="0"/>
+    <cs:effectRef idx="0"/>
+    <cs:fontRef idx="minor">
+      <a:schemeClr val="dk1"/>
+    </cs:fontRef>
+    <cs:spPr>
+      <a:solidFill>
+        <a:schemeClr val="lt1"/>
+      </a:solidFill>
+      <a:ln w="9525">
+        <a:solidFill>
+          <a:schemeClr val="tx1">
+            <a:lumMod val="15000"/>
+            <a:lumOff val="85000"/>
+          </a:schemeClr>
+        </a:solidFill>
+      </a:ln>
+    </cs:spPr>
+  </cs:upBar>
+  <cs:valueAxis>
+    <cs:lnRef idx="0"/>
+    <cs:fillRef idx="0"/>
+    <cs:effectRef idx="0"/>
+    <cs:fontRef idx="minor">
+      <a:schemeClr val="tx1">
+        <a:lumMod val="65000"/>
+        <a:lumOff val="35000"/>
+      </a:schemeClr>
+    </cs:fontRef>
+    <cs:defRPr sz="1197" kern="1200"/>
+  </cs:valueAxis>
+  <cs:wall>
+    <cs:lnRef idx="0"/>
+    <cs:fillRef idx="0"/>
+    <cs:effectRef idx="0"/>
+    <cs:fontRef idx="minor">
+      <a:schemeClr val="tx1"/>
+    </cs:fontRef>
+    <cs:spPr>
+      <a:noFill/>
+      <a:ln>
+        <a:noFill/>
+      </a:ln>
+    </cs:spPr>
+  </cs:wall>
+</cs:chartStyle>
+</file>
+
 <file path=ppt/charts/style2.xml><?xml version="1.0" encoding="utf-8"?>
 <cs:chartStyle xmlns:cs="http://schemas.microsoft.com/office/drawing/2012/chartStyle" xmlns:a="http://schemas.openxmlformats.org/drawingml/2006/main" id="201">
   <cs:axisTitle>
@@ -11086,7 +12109,7 @@
           <a:p>
             <a:fld id="{BE7CF963-E58D-FC4D-BA9E-60A980752DC6}" type="datetimeFigureOut">
               <a:rPr lang="en-US" smtClean="0"/>
-              <a:t>7/21/2020</a:t>
+              <a:t>10/22/2021</a:t>
             </a:fld>
             <a:endParaRPr lang="en-US"/>
           </a:p>
@@ -11575,7 +12598,7 @@
           <a:p>
             <a:fld id="{B590C078-9131-4E49-8A0D-400FEE8377B5}" type="datetimeFigureOut">
               <a:rPr lang="en-US" smtClean="0"/>
-              <a:t>7/21/2020</a:t>
+              <a:t>10/22/2021</a:t>
             </a:fld>
             <a:endParaRPr lang="en-US"/>
           </a:p>
@@ -15160,7 +16183,7 @@
           <a:p>
             <a:fld id="{B590C078-9131-4E49-8A0D-400FEE8377B5}" type="datetimeFigureOut">
               <a:rPr lang="en-US" smtClean="0"/>
-              <a:t>7/21/2020</a:t>
+              <a:t>10/22/2021</a:t>
             </a:fld>
             <a:endParaRPr lang="en-US"/>
           </a:p>
@@ -19238,7 +20261,7 @@
           <a:p>
             <a:fld id="{B590C078-9131-4E49-8A0D-400FEE8377B5}" type="datetimeFigureOut">
               <a:rPr lang="en-US" smtClean="0"/>
-              <a:t>7/21/2020</a:t>
+              <a:t>10/22/2021</a:t>
             </a:fld>
             <a:endParaRPr lang="en-US"/>
           </a:p>
@@ -23063,7 +24086,7 @@
           <a:p>
             <a:fld id="{B590C078-9131-4E49-8A0D-400FEE8377B5}" type="datetimeFigureOut">
               <a:rPr lang="en-US" smtClean="0"/>
-              <a:t>7/21/2020</a:t>
+              <a:t>10/22/2021</a:t>
             </a:fld>
             <a:endParaRPr lang="en-US"/>
           </a:p>
@@ -23890,6 +24913,175 @@
 </p:sld>
 </file>
 
+<file path=ppt/slides/slide12.xml><?xml version="1.0" encoding="utf-8"?>
+<p:sld xmlns:a="http://schemas.openxmlformats.org/drawingml/2006/main" xmlns:r="http://schemas.openxmlformats.org/officeDocument/2006/relationships" xmlns:p="http://schemas.openxmlformats.org/presentationml/2006/main">
+  <p:cSld>
+    <p:spTree>
+      <p:nvGrpSpPr>
+        <p:cNvPr id="1" name=""/>
+        <p:cNvGrpSpPr/>
+        <p:nvPr/>
+      </p:nvGrpSpPr>
+      <p:grpSpPr>
+        <a:xfrm>
+          <a:off x="0" y="0"/>
+          <a:ext cx="0" cy="0"/>
+          <a:chOff x="0" y="0"/>
+          <a:chExt cx="0" cy="0"/>
+        </a:xfrm>
+      </p:grpSpPr>
+      <p:sp>
+        <p:nvSpPr>
+          <p:cNvPr id="2" name="Title 1"/>
+          <p:cNvSpPr>
+            <a:spLocks noGrp="1"/>
+          </p:cNvSpPr>
+          <p:nvPr>
+            <p:ph type="title"/>
+          </p:nvPr>
+        </p:nvSpPr>
+        <p:spPr/>
+        <p:txBody>
+          <a:bodyPr/>
+          <a:lstStyle/>
+          <a:p>
+            <a:r>
+              <a:rPr lang="en-US" dirty="0"/>
+              <a:t>Stacked Bar</a:t>
+            </a:r>
+          </a:p>
+        </p:txBody>
+      </p:sp>
+      <p:sp>
+        <p:nvSpPr>
+          <p:cNvPr id="4" name="Text Placeholder 2"/>
+          <p:cNvSpPr>
+            <a:spLocks noGrp="1"/>
+          </p:cNvSpPr>
+          <p:nvPr>
+            <p:ph type="body" sz="quarter" idx="13"/>
+          </p:nvPr>
+        </p:nvSpPr>
+        <p:spPr>
+          <a:xfrm>
+            <a:off x="642730" y="980148"/>
+            <a:ext cx="10939670" cy="400110"/>
+          </a:xfrm>
+        </p:spPr>
+        <p:txBody>
+          <a:bodyPr>
+            <a:normAutofit/>
+          </a:bodyPr>
+          <a:lstStyle/>
+          <a:p>
+            <a:r>
+              <a:rPr lang="en-US" sz="1200" dirty="0"/>
+              <a:t>GRAPH;GENERIC_GRAPH;COL1=OMG_TECHNICAL_DEBT,ROW1=MODULES,MODULES=ALL,OMG_TECHNICAL_DEBT=ALL,METRICS=ISO</a:t>
+            </a:r>
+          </a:p>
+        </p:txBody>
+      </p:sp>
+      <p:graphicFrame>
+        <p:nvGraphicFramePr>
+          <p:cNvPr id="6" name="Chart 5" descr="GRAPH;GENERIC_GRAPH;COL1=OMG_TECHNICAL_DEBT,ROW1=MODULES,MODULES=ALL,OMG_TECHNICAL_DEBT=ALL,METRICS=ISO"/>
+          <p:cNvGraphicFramePr/>
+          <p:nvPr>
+            <p:extLst>
+              <p:ext uri="{D42A27DB-BD31-4B8C-83A1-F6EECF244321}">
+                <p14:modId xmlns:p14="http://schemas.microsoft.com/office/powerpoint/2010/main" val="3323507612"/>
+              </p:ext>
+            </p:extLst>
+          </p:nvPr>
+        </p:nvGraphicFramePr>
+        <p:xfrm>
+          <a:off x="3030070" y="2207640"/>
+          <a:ext cx="5486399" cy="3081535"/>
+        </p:xfrm>
+        <a:graphic>
+          <a:graphicData uri="http://schemas.openxmlformats.org/drawingml/2006/chart">
+            <c:chart xmlns:c="http://schemas.openxmlformats.org/drawingml/2006/chart" xmlns:r="http://schemas.openxmlformats.org/officeDocument/2006/relationships" r:id="rId2"/>
+          </a:graphicData>
+        </a:graphic>
+      </p:graphicFrame>
+      <p:sp>
+        <p:nvSpPr>
+          <p:cNvPr id="5" name="TextBox 4">
+            <a:extLst>
+              <a:ext uri="{FF2B5EF4-FFF2-40B4-BE49-F238E27FC236}">
+                <a16:creationId xmlns:a16="http://schemas.microsoft.com/office/drawing/2014/main" id="{4297E9E4-3047-4638-9BBD-767D8D1A1D78}"/>
+              </a:ext>
+            </a:extLst>
+          </p:cNvPr>
+          <p:cNvSpPr txBox="1"/>
+          <p:nvPr/>
+        </p:nvSpPr>
+        <p:spPr>
+          <a:xfrm>
+            <a:off x="1069344" y="1380258"/>
+            <a:ext cx="10703859" cy="447383"/>
+          </a:xfrm>
+          <a:prstGeom prst="rect">
+            <a:avLst/>
+          </a:prstGeom>
+        </p:spPr>
+        <p:txBody>
+          <a:bodyPr vert="horz" wrap="square" lIns="91440" tIns="45720" rIns="91440" bIns="45720" rtlCol="0" anchor="t">
+            <a:noAutofit/>
+          </a:bodyPr>
+          <a:lstStyle>
+            <a:defPPr>
+              <a:defRPr lang="en-US"/>
+            </a:defPPr>
+            <a:lvl1pPr>
+              <a:defRPr sz="1200">
+                <a:solidFill>
+                  <a:schemeClr val="tx1">
+                    <a:lumMod val="50000"/>
+                    <a:lumOff val="50000"/>
+                  </a:schemeClr>
+                </a:solidFill>
+              </a:defRPr>
+            </a:lvl1pPr>
+          </a:lstStyle>
+          <a:p>
+            <a:r>
+              <a:rPr lang="en-US" sz="1100" dirty="0"/>
+              <a:t>*** Requires installation of OMG Technical Debt Measure (&gt;2.0.0 </a:t>
+            </a:r>
+            <a:r>
+              <a:rPr lang="en-US" sz="1100" dirty="0" err="1"/>
+              <a:t>funcrel</a:t>
+            </a:r>
+            <a:r>
+              <a:rPr lang="en-US" sz="1100" dirty="0"/>
+              <a:t>) (and ISO-5055 Index extensions and/or CISQ Index extensions)</a:t>
+            </a:r>
+          </a:p>
+          <a:p>
+            <a:r>
+              <a:rPr lang="en-US" sz="1100" dirty="0"/>
+              <a:t>To get results on Omg Technical Debt on a specific metric, add the axis "METRICS=M" where M is the index id (ISO, CISQ or AIP)</a:t>
+            </a:r>
+            <a:endParaRPr lang="en-GB" sz="1100" dirty="0"/>
+          </a:p>
+          <a:p>
+            <a:endParaRPr lang="en-US" sz="1100" dirty="0"/>
+          </a:p>
+        </p:txBody>
+      </p:sp>
+    </p:spTree>
+    <p:extLst>
+      <p:ext uri="{BB962C8B-B14F-4D97-AF65-F5344CB8AC3E}">
+        <p14:creationId xmlns:p14="http://schemas.microsoft.com/office/powerpoint/2010/main" val="2256376819"/>
+      </p:ext>
+    </p:extLst>
+  </p:cSld>
+  <p:clrMapOvr>
+    <a:masterClrMapping/>
+  </p:clrMapOvr>
+</p:sld>
+</file>
+
 <file path=ppt/slides/slide2.xml><?xml version="1.0" encoding="utf-8"?>
 <p:sld xmlns:a="http://schemas.openxmlformats.org/drawingml/2006/main" xmlns:r="http://schemas.openxmlformats.org/officeDocument/2006/relationships" xmlns:p="http://schemas.openxmlformats.org/presentationml/2006/main">
   <p:cSld>
@@ -23967,7 +25159,7 @@
         </p:nvSpPr>
         <p:spPr>
           <a:xfrm>
-            <a:off x="744070" y="5764646"/>
+            <a:off x="744070" y="5378752"/>
             <a:ext cx="10703859" cy="367553"/>
           </a:xfrm>
           <a:prstGeom prst="rect">
@@ -23981,7 +25173,7 @@
           <a:lstStyle/>
           <a:p>
             <a:r>
-              <a:rPr lang="en-US" sz="1200" dirty="0">
+              <a:rPr lang="en-US" sz="1050" dirty="0">
                 <a:solidFill>
                   <a:schemeClr val="tx1">
                     <a:lumMod val="50000"/>
@@ -23992,7 +25184,7 @@
               <a:t>* To get results on violations or critical violations on a specific metrics, add the axis “METRICS=M” where M is a metric id from quality model (</a:t>
             </a:r>
             <a:r>
-              <a:rPr lang="en-US" sz="1200" dirty="0" err="1">
+              <a:rPr lang="en-US" sz="1050" dirty="0" err="1">
                 <a:solidFill>
                   <a:schemeClr val="tx1">
                     <a:lumMod val="50000"/>
@@ -24003,7 +25195,7 @@
               <a:t>eg</a:t>
             </a:r>
             <a:r>
-              <a:rPr lang="en-US" sz="1200" dirty="0">
+              <a:rPr lang="en-US" sz="1050" dirty="0">
                 <a:solidFill>
                   <a:schemeClr val="tx1">
                     <a:lumMod val="50000"/>
@@ -24035,7 +25227,7 @@
         <p:spPr>
           <a:xfrm>
             <a:off x="328706" y="1333500"/>
-            <a:ext cx="11253694" cy="4351338"/>
+            <a:ext cx="11253694" cy="4063593"/>
           </a:xfrm>
         </p:spPr>
         <p:txBody>
@@ -24048,13 +25240,13 @@
               <a:buNone/>
             </a:pPr>
             <a:r>
-              <a:rPr lang="en-US" dirty="0"/>
+              <a:rPr lang="en-US" sz="1600" dirty="0"/>
               <a:t>AXIS					VALUES</a:t>
             </a:r>
           </a:p>
           <a:p>
             <a:r>
-              <a:rPr lang="fr-FR" dirty="0">
+              <a:rPr lang="fr-FR" sz="1600" dirty="0">
                 <a:solidFill>
                   <a:schemeClr val="accent5">
                     <a:lumMod val="75000"/>
@@ -24066,7 +25258,7 @@
           </a:p>
           <a:p>
             <a:r>
-              <a:rPr lang="fr-FR" dirty="0">
+              <a:rPr lang="fr-FR" sz="1600" dirty="0">
                 <a:solidFill>
                   <a:schemeClr val="accent2"/>
                 </a:solidFill>
@@ -24075,29 +25267,22 @@
             </a:r>
           </a:p>
           <a:p>
-            <a:endParaRPr lang="fr-FR" dirty="0">
+            <a:endParaRPr lang="fr-FR" sz="1600" dirty="0">
               <a:solidFill>
                 <a:schemeClr val="accent3"/>
               </a:solidFill>
             </a:endParaRPr>
           </a:p>
           <a:p>
-            <a:endParaRPr lang="fr-FR" dirty="0">
+            <a:endParaRPr lang="fr-FR" sz="1600" dirty="0">
               <a:solidFill>
                 <a:schemeClr val="accent3"/>
               </a:solidFill>
             </a:endParaRPr>
           </a:p>
           <a:p>
-            <a:endParaRPr lang="fr-FR" dirty="0">
-              <a:solidFill>
-                <a:schemeClr val="accent3"/>
-              </a:solidFill>
-            </a:endParaRPr>
-          </a:p>
-          <a:p>
-            <a:r>
-              <a:rPr lang="fr-FR" dirty="0">
+            <a:r>
+              <a:rPr lang="fr-FR" sz="1600" dirty="0">
                 <a:solidFill>
                   <a:schemeClr val="accent3"/>
                 </a:solidFill>
@@ -24107,7 +25292,7 @@
           </a:p>
           <a:p>
             <a:r>
-              <a:rPr lang="fr-FR" dirty="0">
+              <a:rPr lang="fr-FR" sz="1600" dirty="0">
                 <a:solidFill>
                   <a:schemeClr val="accent6"/>
                 </a:solidFill>
@@ -24117,7 +25302,7 @@
           </a:p>
           <a:p>
             <a:r>
-              <a:rPr lang="fr-FR" dirty="0">
+              <a:rPr lang="fr-FR" sz="1600" dirty="0">
                 <a:solidFill>
                   <a:srgbClr val="00B0F0"/>
                 </a:solidFill>
@@ -24127,12 +25312,22 @@
           </a:p>
           <a:p>
             <a:r>
-              <a:rPr lang="fr-FR" dirty="0">
+              <a:rPr lang="fr-FR" sz="1600" dirty="0">
                 <a:solidFill>
                   <a:schemeClr val="accent1"/>
                 </a:solidFill>
               </a:rPr>
               <a:t>CRITICAL_VIOLATIONS *</a:t>
+            </a:r>
+          </a:p>
+          <a:p>
+            <a:r>
+              <a:rPr lang="fr-FR" sz="1600" dirty="0">
+                <a:solidFill>
+                  <a:srgbClr val="7F7F7F"/>
+                </a:solidFill>
+              </a:rPr>
+              <a:t>OMG_TECHNICAL_DEBT***</a:t>
             </a:r>
           </a:p>
         </p:txBody>
@@ -24152,7 +25347,7 @@
         <p:spPr>
           <a:xfrm>
             <a:off x="3477775" y="1767155"/>
-            <a:ext cx="998420" cy="322080"/>
+            <a:ext cx="998420" cy="183689"/>
           </a:xfrm>
           <a:prstGeom prst="roundRect">
             <a:avLst/>
@@ -24188,10 +25383,10 @@
           <a:p>
             <a:pPr algn="ctr"/>
             <a:r>
-              <a:rPr lang="en-US" sz="1200" dirty="0"/>
+              <a:rPr lang="en-US" sz="1100" dirty="0"/>
               <a:t>CURRENT</a:t>
             </a:r>
-            <a:endParaRPr lang="en-US" dirty="0"/>
+            <a:endParaRPr lang="en-US" sz="1600" dirty="0"/>
           </a:p>
         </p:txBody>
       </p:sp>
@@ -24210,7 +25405,7 @@
         <p:spPr>
           <a:xfrm>
             <a:off x="4540657" y="1767155"/>
-            <a:ext cx="1102877" cy="322080"/>
+            <a:ext cx="1102877" cy="183689"/>
           </a:xfrm>
           <a:prstGeom prst="roundRect">
             <a:avLst/>
@@ -24246,10 +25441,10 @@
           <a:p>
             <a:pPr algn="ctr"/>
             <a:r>
-              <a:rPr lang="en-US" sz="1200" dirty="0"/>
+              <a:rPr lang="en-US" sz="1100" dirty="0"/>
               <a:t>PREVIOUS</a:t>
             </a:r>
-            <a:endParaRPr lang="en-US" dirty="0"/>
+            <a:endParaRPr lang="en-US" sz="1600" dirty="0"/>
           </a:p>
         </p:txBody>
       </p:sp>
@@ -24268,7 +25463,7 @@
         <p:spPr>
           <a:xfrm>
             <a:off x="5707996" y="1767155"/>
-            <a:ext cx="719193" cy="322080"/>
+            <a:ext cx="719193" cy="183689"/>
           </a:xfrm>
           <a:prstGeom prst="roundRect">
             <a:avLst/>
@@ -24304,10 +25499,10 @@
           <a:p>
             <a:pPr algn="ctr"/>
             <a:r>
-              <a:rPr lang="en-US" sz="1200" dirty="0"/>
+              <a:rPr lang="en-US" sz="1100" dirty="0"/>
               <a:t>EVOL</a:t>
             </a:r>
-            <a:endParaRPr lang="en-US" dirty="0"/>
+            <a:endParaRPr lang="en-US" sz="1600" dirty="0"/>
           </a:p>
         </p:txBody>
       </p:sp>
@@ -24326,7 +25521,7 @@
         <p:spPr>
           <a:xfrm>
             <a:off x="6491651" y="1767155"/>
-            <a:ext cx="1510302" cy="322080"/>
+            <a:ext cx="1510302" cy="183689"/>
           </a:xfrm>
           <a:prstGeom prst="roundRect">
             <a:avLst/>
@@ -24362,10 +25557,10 @@
           <a:p>
             <a:pPr algn="ctr"/>
             <a:r>
-              <a:rPr lang="en-US" sz="1200" dirty="0"/>
+              <a:rPr lang="en-US" sz="1100" dirty="0"/>
               <a:t>EVOL_PERCENT</a:t>
             </a:r>
-            <a:endParaRPr lang="en-US" dirty="0"/>
+            <a:endParaRPr lang="en-US" sz="1600" dirty="0"/>
           </a:p>
         </p:txBody>
       </p:sp>
@@ -24384,7 +25579,7 @@
         <p:spPr>
           <a:xfrm>
             <a:off x="8066415" y="1767155"/>
-            <a:ext cx="539991" cy="322080"/>
+            <a:ext cx="539991" cy="183689"/>
           </a:xfrm>
           <a:prstGeom prst="roundRect">
             <a:avLst/>
@@ -24420,10 +25615,10 @@
           <a:p>
             <a:pPr algn="ctr"/>
             <a:r>
-              <a:rPr lang="en-US" sz="1200" dirty="0"/>
+              <a:rPr lang="en-US" sz="1100" dirty="0"/>
               <a:t>ALL</a:t>
             </a:r>
-            <a:endParaRPr lang="en-US" dirty="0"/>
+            <a:endParaRPr lang="en-US" sz="1600" dirty="0"/>
           </a:p>
         </p:txBody>
       </p:sp>
@@ -24442,7 +25637,7 @@
         <p:spPr>
           <a:xfrm>
             <a:off x="3493539" y="2203333"/>
-            <a:ext cx="560589" cy="322080"/>
+            <a:ext cx="560589" cy="183689"/>
           </a:xfrm>
           <a:prstGeom prst="roundRect">
             <a:avLst/>
@@ -24476,10 +25671,10 @@
           <a:p>
             <a:pPr algn="ctr"/>
             <a:r>
-              <a:rPr lang="en-US" sz="1200" dirty="0"/>
+              <a:rPr lang="en-US" sz="1100" dirty="0"/>
               <a:t>&lt;ID&gt;</a:t>
             </a:r>
-            <a:endParaRPr lang="en-US" dirty="0"/>
+            <a:endParaRPr lang="en-US" sz="1600" dirty="0"/>
           </a:p>
         </p:txBody>
       </p:sp>
@@ -24498,7 +25693,7 @@
         <p:spPr>
           <a:xfrm>
             <a:off x="4121612" y="2203333"/>
-            <a:ext cx="1540708" cy="322080"/>
+            <a:ext cx="1540708" cy="183689"/>
           </a:xfrm>
           <a:prstGeom prst="roundRect">
             <a:avLst/>
@@ -24532,10 +25727,10 @@
           <a:p>
             <a:pPr algn="ctr"/>
             <a:r>
-              <a:rPr lang="en-US" sz="1200" dirty="0"/>
+              <a:rPr lang="en-US" sz="1100" dirty="0"/>
               <a:t>HEALTH_FACTOR</a:t>
             </a:r>
-            <a:endParaRPr lang="en-US" dirty="0"/>
+            <a:endParaRPr lang="en-US" sz="1600" dirty="0"/>
           </a:p>
         </p:txBody>
       </p:sp>
@@ -24554,7 +25749,7 @@
         <p:spPr>
           <a:xfrm>
             <a:off x="5729804" y="2203333"/>
-            <a:ext cx="1790858" cy="322080"/>
+            <a:ext cx="1790858" cy="183689"/>
           </a:xfrm>
           <a:prstGeom prst="roundRect">
             <a:avLst/>
@@ -24588,10 +25783,10 @@
           <a:p>
             <a:pPr algn="ctr"/>
             <a:r>
-              <a:rPr lang="en-US" sz="1200" dirty="0"/>
+              <a:rPr lang="en-US" sz="1100" dirty="0"/>
               <a:t>BUSINESS_CRITERIA</a:t>
             </a:r>
-            <a:endParaRPr lang="en-US" dirty="0"/>
+            <a:endParaRPr lang="en-US" sz="1600" dirty="0"/>
           </a:p>
         </p:txBody>
       </p:sp>
@@ -24610,7 +25805,7 @@
         <p:spPr>
           <a:xfrm>
             <a:off x="7588146" y="2203333"/>
-            <a:ext cx="1887485" cy="322080"/>
+            <a:ext cx="1887485" cy="183689"/>
           </a:xfrm>
           <a:prstGeom prst="roundRect">
             <a:avLst/>
@@ -24644,10 +25839,10 @@
           <a:p>
             <a:pPr algn="ctr"/>
             <a:r>
-              <a:rPr lang="en-US" sz="1200" dirty="0"/>
+              <a:rPr lang="en-US" sz="1100" dirty="0"/>
               <a:t>TECHNICAL_CRITERIA</a:t>
             </a:r>
-            <a:endParaRPr lang="en-US" dirty="0"/>
+            <a:endParaRPr lang="en-US" sz="1600" dirty="0"/>
           </a:p>
         </p:txBody>
       </p:sp>
@@ -24665,8 +25860,8 @@
         </p:nvSpPr>
         <p:spPr>
           <a:xfrm>
-            <a:off x="3505085" y="2639376"/>
-            <a:ext cx="1500390" cy="322080"/>
+            <a:off x="3505085" y="2505152"/>
+            <a:ext cx="1500390" cy="183689"/>
           </a:xfrm>
           <a:prstGeom prst="roundRect">
             <a:avLst/>
@@ -24700,10 +25895,10 @@
           <a:p>
             <a:pPr algn="ctr"/>
             <a:r>
-              <a:rPr lang="en-US" sz="1200" dirty="0"/>
+              <a:rPr lang="en-US" sz="1100" dirty="0"/>
               <a:t>QUALITY_RULES</a:t>
             </a:r>
-            <a:endParaRPr lang="en-US" dirty="0"/>
+            <a:endParaRPr lang="en-US" sz="1600" dirty="0"/>
           </a:p>
         </p:txBody>
       </p:sp>
@@ -24721,8 +25916,8 @@
         </p:nvSpPr>
         <p:spPr>
           <a:xfrm>
-            <a:off x="3505706" y="3074009"/>
-            <a:ext cx="1769278" cy="322080"/>
+            <a:off x="3505706" y="2822339"/>
+            <a:ext cx="1769278" cy="183689"/>
           </a:xfrm>
           <a:prstGeom prst="roundRect">
             <a:avLst/>
@@ -24756,10 +25951,10 @@
           <a:p>
             <a:pPr algn="ctr"/>
             <a:r>
-              <a:rPr lang="en-US" sz="1200" dirty="0"/>
+              <a:rPr lang="en-US" sz="1100" dirty="0"/>
               <a:t>TECHNICAL_SIZING</a:t>
             </a:r>
-            <a:endParaRPr lang="en-US" dirty="0"/>
+            <a:endParaRPr lang="en-US" sz="1600" dirty="0"/>
           </a:p>
         </p:txBody>
       </p:sp>
@@ -24777,8 +25972,8 @@
         </p:nvSpPr>
         <p:spPr>
           <a:xfrm>
-            <a:off x="5336329" y="3074009"/>
-            <a:ext cx="1913713" cy="322080"/>
+            <a:off x="5336329" y="2822339"/>
+            <a:ext cx="1913713" cy="183689"/>
           </a:xfrm>
           <a:prstGeom prst="roundRect">
             <a:avLst/>
@@ -24812,10 +26007,10 @@
           <a:p>
             <a:pPr algn="ctr"/>
             <a:r>
-              <a:rPr lang="en-US" sz="1200" dirty="0"/>
+              <a:rPr lang="en-US" sz="1100" dirty="0"/>
               <a:t>FUNCTIONAL_WEIGHT</a:t>
             </a:r>
-            <a:endParaRPr lang="en-US" dirty="0"/>
+            <a:endParaRPr lang="en-US" sz="1600" dirty="0"/>
           </a:p>
         </p:txBody>
       </p:sp>
@@ -24833,8 +26028,8 @@
         </p:nvSpPr>
         <p:spPr>
           <a:xfrm>
-            <a:off x="7311387" y="3074009"/>
-            <a:ext cx="1608804" cy="322080"/>
+            <a:off x="7311387" y="2822339"/>
+            <a:ext cx="1608804" cy="183689"/>
           </a:xfrm>
           <a:prstGeom prst="roundRect">
             <a:avLst/>
@@ -24868,10 +26063,10 @@
           <a:p>
             <a:pPr algn="ctr"/>
             <a:r>
-              <a:rPr lang="en-US" sz="1200" dirty="0"/>
+              <a:rPr lang="en-US" sz="1100" strike="sngStrike" dirty="0"/>
               <a:t>TECHNICAL_DEBT</a:t>
             </a:r>
-            <a:endParaRPr lang="en-US" dirty="0"/>
+            <a:endParaRPr lang="en-US" sz="1600" strike="sngStrike" dirty="0"/>
           </a:p>
         </p:txBody>
       </p:sp>
@@ -24889,8 +26084,8 @@
         </p:nvSpPr>
         <p:spPr>
           <a:xfrm>
-            <a:off x="8981536" y="3074009"/>
-            <a:ext cx="1064968" cy="322080"/>
+            <a:off x="8981536" y="2822339"/>
+            <a:ext cx="1064968" cy="183689"/>
           </a:xfrm>
           <a:prstGeom prst="roundRect">
             <a:avLst/>
@@ -24924,10 +26119,10 @@
           <a:p>
             <a:pPr algn="ctr"/>
             <a:r>
-              <a:rPr lang="en-US" sz="1200" dirty="0"/>
+              <a:rPr lang="en-US" sz="1100" dirty="0"/>
               <a:t>VIOLATION</a:t>
             </a:r>
-            <a:endParaRPr lang="en-US" dirty="0"/>
+            <a:endParaRPr lang="en-US" sz="1600" dirty="0"/>
           </a:p>
         </p:txBody>
       </p:sp>
@@ -24945,8 +26140,8 @@
         </p:nvSpPr>
         <p:spPr>
           <a:xfrm>
-            <a:off x="10107848" y="3074009"/>
-            <a:ext cx="1813035" cy="322080"/>
+            <a:off x="10107848" y="2822339"/>
+            <a:ext cx="1813035" cy="183689"/>
           </a:xfrm>
           <a:prstGeom prst="roundRect">
             <a:avLst/>
@@ -24980,10 +26175,10 @@
           <a:p>
             <a:pPr algn="ctr"/>
             <a:r>
-              <a:rPr lang="en-US" sz="1200" dirty="0"/>
+              <a:rPr lang="en-US" sz="1100" dirty="0"/>
               <a:t>CRITICAL_VIOLATION</a:t>
             </a:r>
-            <a:endParaRPr lang="en-US" dirty="0"/>
+            <a:endParaRPr lang="en-US" sz="1600" dirty="0"/>
           </a:p>
         </p:txBody>
       </p:sp>
@@ -25001,8 +26196,8 @@
         </p:nvSpPr>
         <p:spPr>
           <a:xfrm>
-            <a:off x="3505706" y="3486840"/>
-            <a:ext cx="1064968" cy="322080"/>
+            <a:off x="10093898" y="2516215"/>
+            <a:ext cx="1064968" cy="183689"/>
           </a:xfrm>
           <a:prstGeom prst="roundRect">
             <a:avLst/>
@@ -25036,10 +26231,10 @@
           <a:p>
             <a:pPr algn="ctr"/>
             <a:r>
-              <a:rPr lang="en-US" sz="1200" dirty="0"/>
+              <a:rPr lang="en-US" sz="1100" dirty="0"/>
               <a:t>RUN_TIME</a:t>
             </a:r>
-            <a:endParaRPr lang="en-US" dirty="0"/>
+            <a:endParaRPr lang="en-US" sz="1600" dirty="0"/>
           </a:p>
         </p:txBody>
       </p:sp>
@@ -25057,8 +26252,8 @@
         </p:nvSpPr>
         <p:spPr>
           <a:xfrm>
-            <a:off x="3502534" y="3978678"/>
-            <a:ext cx="998420" cy="322080"/>
+            <a:off x="3502534" y="3383059"/>
+            <a:ext cx="998420" cy="183689"/>
           </a:xfrm>
           <a:prstGeom prst="roundRect">
             <a:avLst/>
@@ -25092,10 +26287,10 @@
           <a:p>
             <a:pPr algn="ctr"/>
             <a:r>
-              <a:rPr lang="en-US" sz="1200" dirty="0"/>
+              <a:rPr lang="en-US" sz="1100" dirty="0"/>
               <a:t>&lt;NAME&gt;</a:t>
             </a:r>
-            <a:endParaRPr lang="en-US" dirty="0"/>
+            <a:endParaRPr lang="en-US" sz="1600" dirty="0"/>
           </a:p>
         </p:txBody>
       </p:sp>
@@ -25113,8 +26308,8 @@
         </p:nvSpPr>
         <p:spPr>
           <a:xfrm>
-            <a:off x="4565416" y="3978678"/>
-            <a:ext cx="524699" cy="322080"/>
+            <a:off x="4565416" y="3383059"/>
+            <a:ext cx="524699" cy="183689"/>
           </a:xfrm>
           <a:prstGeom prst="roundRect">
             <a:avLst/>
@@ -25148,10 +26343,10 @@
           <a:p>
             <a:pPr algn="ctr"/>
             <a:r>
-              <a:rPr lang="en-US" sz="1200" dirty="0"/>
+              <a:rPr lang="en-US" sz="1100" dirty="0"/>
               <a:t>ALL</a:t>
             </a:r>
-            <a:endParaRPr lang="en-US" dirty="0"/>
+            <a:endParaRPr lang="en-US" sz="1600" dirty="0"/>
           </a:p>
         </p:txBody>
       </p:sp>
@@ -25169,8 +26364,8 @@
         </p:nvSpPr>
         <p:spPr>
           <a:xfrm>
-            <a:off x="3507792" y="4383325"/>
-            <a:ext cx="998420" cy="322080"/>
+            <a:off x="3507792" y="3762539"/>
+            <a:ext cx="998420" cy="183689"/>
           </a:xfrm>
           <a:prstGeom prst="roundRect">
             <a:avLst/>
@@ -25204,10 +26399,10 @@
           <a:p>
             <a:pPr algn="ctr"/>
             <a:r>
-              <a:rPr lang="en-US" sz="1200" dirty="0"/>
+              <a:rPr lang="en-US" sz="1100" dirty="0"/>
               <a:t>&lt;NAME&gt;</a:t>
             </a:r>
-            <a:endParaRPr lang="en-US" dirty="0"/>
+            <a:endParaRPr lang="en-US" sz="1600" dirty="0"/>
           </a:p>
         </p:txBody>
       </p:sp>
@@ -25225,8 +26420,8 @@
         </p:nvSpPr>
         <p:spPr>
           <a:xfrm>
-            <a:off x="4570674" y="4383325"/>
-            <a:ext cx="524699" cy="322080"/>
+            <a:off x="4570674" y="3762539"/>
+            <a:ext cx="524699" cy="183689"/>
           </a:xfrm>
           <a:prstGeom prst="roundRect">
             <a:avLst/>
@@ -25260,10 +26455,10 @@
           <a:p>
             <a:pPr algn="ctr"/>
             <a:r>
-              <a:rPr lang="en-US" sz="1200" dirty="0"/>
+              <a:rPr lang="en-US" sz="1100" dirty="0"/>
               <a:t>ALL</a:t>
             </a:r>
-            <a:endParaRPr lang="en-US" dirty="0"/>
+            <a:endParaRPr lang="en-US" sz="1600" dirty="0"/>
           </a:p>
         </p:txBody>
       </p:sp>
@@ -25281,8 +26476,8 @@
         </p:nvSpPr>
         <p:spPr>
           <a:xfrm>
-            <a:off x="3509445" y="4780169"/>
-            <a:ext cx="998420" cy="322080"/>
+            <a:off x="3509445" y="4184550"/>
+            <a:ext cx="998420" cy="183689"/>
           </a:xfrm>
           <a:prstGeom prst="roundRect">
             <a:avLst/>
@@ -25316,10 +26511,10 @@
           <a:p>
             <a:pPr algn="ctr"/>
             <a:r>
-              <a:rPr lang="en-US" sz="1200" dirty="0"/>
+              <a:rPr lang="en-US" sz="1100" dirty="0"/>
               <a:t>TOTAL</a:t>
             </a:r>
-            <a:endParaRPr lang="en-US" dirty="0"/>
+            <a:endParaRPr lang="en-US" sz="1600" dirty="0"/>
           </a:p>
         </p:txBody>
       </p:sp>
@@ -25337,8 +26532,8 @@
         </p:nvSpPr>
         <p:spPr>
           <a:xfrm>
-            <a:off x="4572327" y="4780169"/>
-            <a:ext cx="757808" cy="322080"/>
+            <a:off x="4572327" y="4184550"/>
+            <a:ext cx="757808" cy="183689"/>
           </a:xfrm>
           <a:prstGeom prst="roundRect">
             <a:avLst/>
@@ -25372,10 +26567,10 @@
           <a:p>
             <a:pPr algn="ctr"/>
             <a:r>
-              <a:rPr lang="en-US" sz="1200" dirty="0"/>
+              <a:rPr lang="en-US" sz="1100" dirty="0"/>
               <a:t>ADDED</a:t>
             </a:r>
-            <a:endParaRPr lang="en-US" dirty="0"/>
+            <a:endParaRPr lang="en-US" sz="1600" dirty="0"/>
           </a:p>
         </p:txBody>
       </p:sp>
@@ -25393,8 +26588,8 @@
         </p:nvSpPr>
         <p:spPr>
           <a:xfrm>
-            <a:off x="5396478" y="4780169"/>
-            <a:ext cx="1036683" cy="322080"/>
+            <a:off x="5396478" y="4184550"/>
+            <a:ext cx="1036683" cy="183689"/>
           </a:xfrm>
           <a:prstGeom prst="roundRect">
             <a:avLst/>
@@ -25428,10 +26623,10 @@
           <a:p>
             <a:pPr algn="ctr"/>
             <a:r>
-              <a:rPr lang="en-US" sz="1200" dirty="0"/>
+              <a:rPr lang="en-US" sz="1100" dirty="0"/>
               <a:t>REMOVED</a:t>
             </a:r>
-            <a:endParaRPr lang="en-US" dirty="0"/>
+            <a:endParaRPr lang="en-US" sz="1600" dirty="0"/>
           </a:p>
         </p:txBody>
       </p:sp>
@@ -25449,8 +26644,8 @@
         </p:nvSpPr>
         <p:spPr>
           <a:xfrm>
-            <a:off x="6497624" y="4771529"/>
-            <a:ext cx="484353" cy="322080"/>
+            <a:off x="6497624" y="4175910"/>
+            <a:ext cx="484353" cy="183689"/>
           </a:xfrm>
           <a:prstGeom prst="roundRect">
             <a:avLst/>
@@ -25484,10 +26679,10 @@
           <a:p>
             <a:pPr algn="ctr"/>
             <a:r>
-              <a:rPr lang="en-US" sz="1200" dirty="0"/>
+              <a:rPr lang="en-US" sz="1100" dirty="0"/>
               <a:t>ALL</a:t>
             </a:r>
-            <a:endParaRPr lang="en-US" dirty="0"/>
+            <a:endParaRPr lang="en-US" sz="1600" dirty="0"/>
           </a:p>
         </p:txBody>
       </p:sp>
@@ -25505,8 +26700,8 @@
         </p:nvSpPr>
         <p:spPr>
           <a:xfrm>
-            <a:off x="3502534" y="5201640"/>
-            <a:ext cx="998420" cy="322080"/>
+            <a:off x="3502534" y="4555687"/>
+            <a:ext cx="998420" cy="183689"/>
           </a:xfrm>
           <a:prstGeom prst="roundRect">
             <a:avLst/>
@@ -25540,10 +26735,10 @@
           <a:p>
             <a:pPr algn="ctr"/>
             <a:r>
-              <a:rPr lang="en-US" sz="1200" dirty="0"/>
+              <a:rPr lang="en-US" sz="1100" dirty="0"/>
               <a:t>TOTAL</a:t>
             </a:r>
-            <a:endParaRPr lang="en-US" dirty="0"/>
+            <a:endParaRPr lang="en-US" sz="1600" dirty="0"/>
           </a:p>
         </p:txBody>
       </p:sp>
@@ -25561,8 +26756,8 @@
         </p:nvSpPr>
         <p:spPr>
           <a:xfrm>
-            <a:off x="4565416" y="5201640"/>
-            <a:ext cx="757808" cy="322080"/>
+            <a:off x="4565416" y="4555687"/>
+            <a:ext cx="757808" cy="183689"/>
           </a:xfrm>
           <a:prstGeom prst="roundRect">
             <a:avLst/>
@@ -25596,10 +26791,10 @@
           <a:p>
             <a:pPr algn="ctr"/>
             <a:r>
-              <a:rPr lang="en-US" sz="1200" dirty="0"/>
+              <a:rPr lang="en-US" sz="1100" dirty="0"/>
               <a:t>ADDED</a:t>
             </a:r>
-            <a:endParaRPr lang="en-US" dirty="0"/>
+            <a:endParaRPr lang="en-US" sz="1600" dirty="0"/>
           </a:p>
         </p:txBody>
       </p:sp>
@@ -25617,8 +26812,8 @@
         </p:nvSpPr>
         <p:spPr>
           <a:xfrm>
-            <a:off x="5389567" y="5201640"/>
-            <a:ext cx="1036683" cy="322080"/>
+            <a:off x="5389567" y="4555687"/>
+            <a:ext cx="1036683" cy="183689"/>
           </a:xfrm>
           <a:prstGeom prst="roundRect">
             <a:avLst/>
@@ -25652,10 +26847,10 @@
           <a:p>
             <a:pPr algn="ctr"/>
             <a:r>
-              <a:rPr lang="en-US" sz="1200" dirty="0"/>
+              <a:rPr lang="en-US" sz="1100" dirty="0"/>
               <a:t>REMOVED</a:t>
             </a:r>
-            <a:endParaRPr lang="en-US" dirty="0"/>
+            <a:endParaRPr lang="en-US" sz="1600" dirty="0"/>
           </a:p>
         </p:txBody>
       </p:sp>
@@ -25673,8 +26868,8 @@
         </p:nvSpPr>
         <p:spPr>
           <a:xfrm>
-            <a:off x="6490713" y="5193000"/>
-            <a:ext cx="484353" cy="322080"/>
+            <a:off x="6490713" y="4547047"/>
+            <a:ext cx="484353" cy="183689"/>
           </a:xfrm>
           <a:prstGeom prst="roundRect">
             <a:avLst/>
@@ -25708,10 +26903,10 @@
           <a:p>
             <a:pPr algn="ctr"/>
             <a:r>
-              <a:rPr lang="en-US" sz="1200" dirty="0"/>
+              <a:rPr lang="en-US" sz="1100" dirty="0"/>
               <a:t>ALL</a:t>
             </a:r>
-            <a:endParaRPr lang="en-US" dirty="0"/>
+            <a:endParaRPr lang="en-US" sz="1600" dirty="0"/>
           </a:p>
         </p:txBody>
       </p:sp>
@@ -25729,8 +26924,8 @@
         </p:nvSpPr>
         <p:spPr>
           <a:xfrm>
-            <a:off x="5122359" y="2649570"/>
-            <a:ext cx="2296753" cy="322080"/>
+            <a:off x="5122359" y="2515346"/>
+            <a:ext cx="2296753" cy="183689"/>
           </a:xfrm>
           <a:prstGeom prst="roundRect">
             <a:avLst/>
@@ -25764,10 +26959,10 @@
           <a:p>
             <a:pPr algn="ctr"/>
             <a:r>
-              <a:rPr lang="en-US" sz="1200" dirty="0"/>
+              <a:rPr lang="en-US" sz="1100" dirty="0"/>
               <a:t>CRITICAL_QUALITY_RULES</a:t>
             </a:r>
-            <a:endParaRPr lang="en-US" dirty="0"/>
+            <a:endParaRPr lang="en-US" sz="1600" dirty="0"/>
           </a:p>
         </p:txBody>
       </p:sp>
@@ -25785,8 +26980,8 @@
         </p:nvSpPr>
         <p:spPr>
           <a:xfrm>
-            <a:off x="4686677" y="3490689"/>
-            <a:ext cx="2382338" cy="322080"/>
+            <a:off x="7565336" y="2516215"/>
+            <a:ext cx="2382338" cy="183689"/>
           </a:xfrm>
           <a:prstGeom prst="roundRect">
             <a:avLst/>
@@ -25820,7 +27015,7 @@
           <a:p>
             <a:pPr algn="ctr"/>
             <a:r>
-              <a:rPr lang="en-US" sz="1200" dirty="0"/>
+              <a:rPr lang="en-US" sz="1100" dirty="0"/>
               <a:t>&lt;STANDARD TAG NAME&gt;**</a:t>
             </a:r>
           </a:p>
@@ -25840,7 +27035,7 @@
         </p:nvSpPr>
         <p:spPr>
           <a:xfrm>
-            <a:off x="715662" y="6052369"/>
+            <a:off x="715662" y="5607752"/>
             <a:ext cx="10703859" cy="447383"/>
           </a:xfrm>
           <a:prstGeom prst="rect">
@@ -25868,22 +27063,312 @@
           </a:lstStyle>
           <a:p>
             <a:r>
-              <a:rPr lang="en-US" dirty="0"/>
+              <a:rPr lang="en-US" sz="1050" dirty="0"/>
               <a:t>** </a:t>
             </a:r>
             <a:r>
-              <a:rPr lang="en-GB" dirty="0"/>
+              <a:rPr lang="en-GB" sz="1050" dirty="0"/>
               <a:t>The selection of metrics by standard quality tag name should only be used for an application where the extension “Quality Standards Support” is installed. If not, no metrics will be selected and </a:t>
             </a:r>
             <a:r>
-              <a:rPr lang="en-US" dirty="0"/>
+              <a:rPr lang="en-US" sz="1050" dirty="0"/>
               <a:t>graph</a:t>
             </a:r>
             <a:r>
-              <a:rPr lang="en-GB" dirty="0"/>
+              <a:rPr lang="en-GB" sz="1050" dirty="0"/>
               <a:t> will be empty.</a:t>
             </a:r>
-            <a:endParaRPr lang="en-US" dirty="0"/>
+            <a:endParaRPr lang="en-US" sz="1050" dirty="0"/>
+          </a:p>
+        </p:txBody>
+      </p:sp>
+      <p:sp>
+        <p:nvSpPr>
+          <p:cNvPr id="37" name="Rectangle: Rounded Corners 36">
+            <a:extLst>
+              <a:ext uri="{FF2B5EF4-FFF2-40B4-BE49-F238E27FC236}">
+                <a16:creationId xmlns:a16="http://schemas.microsoft.com/office/drawing/2014/main" id="{C396BBBA-7974-438E-80F8-9D5738774B7F}"/>
+              </a:ext>
+            </a:extLst>
+          </p:cNvPr>
+          <p:cNvSpPr/>
+          <p:nvPr/>
+        </p:nvSpPr>
+        <p:spPr>
+          <a:xfrm>
+            <a:off x="3503932" y="4993313"/>
+            <a:ext cx="998420" cy="183689"/>
+          </a:xfrm>
+          <a:prstGeom prst="roundRect">
+            <a:avLst/>
+          </a:prstGeom>
+          <a:solidFill>
+            <a:srgbClr val="7F7F7F"/>
+          </a:solidFill>
+          <a:ln>
+            <a:noFill/>
+          </a:ln>
+        </p:spPr>
+        <p:style>
+          <a:lnRef idx="2">
+            <a:schemeClr val="accent1">
+              <a:shade val="50000"/>
+            </a:schemeClr>
+          </a:lnRef>
+          <a:fillRef idx="1">
+            <a:schemeClr val="accent1"/>
+          </a:fillRef>
+          <a:effectRef idx="0">
+            <a:schemeClr val="accent1"/>
+          </a:effectRef>
+          <a:fontRef idx="minor">
+            <a:schemeClr val="lt1"/>
+          </a:fontRef>
+        </p:style>
+        <p:txBody>
+          <a:bodyPr rtlCol="0" anchor="ctr"/>
+          <a:lstStyle/>
+          <a:p>
+            <a:pPr algn="ctr"/>
+            <a:r>
+              <a:rPr lang="en-US" sz="1100" dirty="0"/>
+              <a:t>TOTAL</a:t>
+            </a:r>
+            <a:endParaRPr lang="en-US" sz="1600" dirty="0"/>
+          </a:p>
+        </p:txBody>
+      </p:sp>
+      <p:sp>
+        <p:nvSpPr>
+          <p:cNvPr id="38" name="Rectangle: Rounded Corners 37">
+            <a:extLst>
+              <a:ext uri="{FF2B5EF4-FFF2-40B4-BE49-F238E27FC236}">
+                <a16:creationId xmlns:a16="http://schemas.microsoft.com/office/drawing/2014/main" id="{3BD185FD-4AF2-4DE6-A55E-F09901FD58AF}"/>
+              </a:ext>
+            </a:extLst>
+          </p:cNvPr>
+          <p:cNvSpPr/>
+          <p:nvPr/>
+        </p:nvSpPr>
+        <p:spPr>
+          <a:xfrm>
+            <a:off x="4566814" y="4993313"/>
+            <a:ext cx="757808" cy="183689"/>
+          </a:xfrm>
+          <a:prstGeom prst="roundRect">
+            <a:avLst/>
+          </a:prstGeom>
+          <a:solidFill>
+            <a:srgbClr val="7F7F7F"/>
+          </a:solidFill>
+          <a:ln>
+            <a:noFill/>
+          </a:ln>
+        </p:spPr>
+        <p:style>
+          <a:lnRef idx="2">
+            <a:schemeClr val="accent1">
+              <a:shade val="50000"/>
+            </a:schemeClr>
+          </a:lnRef>
+          <a:fillRef idx="1">
+            <a:schemeClr val="accent1"/>
+          </a:fillRef>
+          <a:effectRef idx="0">
+            <a:schemeClr val="accent1"/>
+          </a:effectRef>
+          <a:fontRef idx="minor">
+            <a:schemeClr val="lt1"/>
+          </a:fontRef>
+        </p:style>
+        <p:txBody>
+          <a:bodyPr rtlCol="0" anchor="ctr"/>
+          <a:lstStyle/>
+          <a:p>
+            <a:pPr algn="ctr"/>
+            <a:r>
+              <a:rPr lang="en-US" sz="1100" dirty="0"/>
+              <a:t>ADDED</a:t>
+            </a:r>
+            <a:endParaRPr lang="en-US" sz="1600" dirty="0"/>
+          </a:p>
+        </p:txBody>
+      </p:sp>
+      <p:sp>
+        <p:nvSpPr>
+          <p:cNvPr id="39" name="Rectangle: Rounded Corners 38">
+            <a:extLst>
+              <a:ext uri="{FF2B5EF4-FFF2-40B4-BE49-F238E27FC236}">
+                <a16:creationId xmlns:a16="http://schemas.microsoft.com/office/drawing/2014/main" id="{3009B6B9-9E64-4D18-886D-9B154F45B614}"/>
+              </a:ext>
+            </a:extLst>
+          </p:cNvPr>
+          <p:cNvSpPr/>
+          <p:nvPr/>
+        </p:nvSpPr>
+        <p:spPr>
+          <a:xfrm>
+            <a:off x="5390965" y="4993313"/>
+            <a:ext cx="1036683" cy="183689"/>
+          </a:xfrm>
+          <a:prstGeom prst="roundRect">
+            <a:avLst/>
+          </a:prstGeom>
+          <a:solidFill>
+            <a:srgbClr val="7F7F7F"/>
+          </a:solidFill>
+          <a:ln>
+            <a:noFill/>
+          </a:ln>
+        </p:spPr>
+        <p:style>
+          <a:lnRef idx="2">
+            <a:schemeClr val="accent1">
+              <a:shade val="50000"/>
+            </a:schemeClr>
+          </a:lnRef>
+          <a:fillRef idx="1">
+            <a:schemeClr val="accent1"/>
+          </a:fillRef>
+          <a:effectRef idx="0">
+            <a:schemeClr val="accent1"/>
+          </a:effectRef>
+          <a:fontRef idx="minor">
+            <a:schemeClr val="lt1"/>
+          </a:fontRef>
+        </p:style>
+        <p:txBody>
+          <a:bodyPr rtlCol="0" anchor="ctr"/>
+          <a:lstStyle/>
+          <a:p>
+            <a:pPr algn="ctr"/>
+            <a:r>
+              <a:rPr lang="en-US" sz="1100" dirty="0"/>
+              <a:t>REMOVED</a:t>
+            </a:r>
+            <a:endParaRPr lang="en-US" sz="1600" dirty="0"/>
+          </a:p>
+        </p:txBody>
+      </p:sp>
+      <p:sp>
+        <p:nvSpPr>
+          <p:cNvPr id="40" name="Rectangle: Rounded Corners 39">
+            <a:extLst>
+              <a:ext uri="{FF2B5EF4-FFF2-40B4-BE49-F238E27FC236}">
+                <a16:creationId xmlns:a16="http://schemas.microsoft.com/office/drawing/2014/main" id="{5DA30AA2-4EBB-4EA3-BB6D-76B53008F6F3}"/>
+              </a:ext>
+            </a:extLst>
+          </p:cNvPr>
+          <p:cNvSpPr/>
+          <p:nvPr/>
+        </p:nvSpPr>
+        <p:spPr>
+          <a:xfrm>
+            <a:off x="6492111" y="4984673"/>
+            <a:ext cx="484353" cy="183689"/>
+          </a:xfrm>
+          <a:prstGeom prst="roundRect">
+            <a:avLst/>
+          </a:prstGeom>
+          <a:solidFill>
+            <a:srgbClr val="7F7F7F"/>
+          </a:solidFill>
+          <a:ln>
+            <a:noFill/>
+          </a:ln>
+        </p:spPr>
+        <p:style>
+          <a:lnRef idx="2">
+            <a:schemeClr val="accent1">
+              <a:shade val="50000"/>
+            </a:schemeClr>
+          </a:lnRef>
+          <a:fillRef idx="1">
+            <a:schemeClr val="accent1"/>
+          </a:fillRef>
+          <a:effectRef idx="0">
+            <a:schemeClr val="accent1"/>
+          </a:effectRef>
+          <a:fontRef idx="minor">
+            <a:schemeClr val="lt1"/>
+          </a:fontRef>
+        </p:style>
+        <p:txBody>
+          <a:bodyPr rtlCol="0" anchor="ctr"/>
+          <a:lstStyle/>
+          <a:p>
+            <a:pPr algn="ctr"/>
+            <a:r>
+              <a:rPr lang="en-US" sz="1100" dirty="0"/>
+              <a:t>ALL</a:t>
+            </a:r>
+            <a:endParaRPr lang="en-US" sz="1600" dirty="0"/>
+          </a:p>
+        </p:txBody>
+      </p:sp>
+      <p:sp>
+        <p:nvSpPr>
+          <p:cNvPr id="41" name="TextBox 40">
+            <a:extLst>
+              <a:ext uri="{FF2B5EF4-FFF2-40B4-BE49-F238E27FC236}">
+                <a16:creationId xmlns:a16="http://schemas.microsoft.com/office/drawing/2014/main" id="{A95BBD19-162B-4418-8A8B-34FCC1EB9E93}"/>
+              </a:ext>
+            </a:extLst>
+          </p:cNvPr>
+          <p:cNvSpPr txBox="1"/>
+          <p:nvPr/>
+        </p:nvSpPr>
+        <p:spPr>
+          <a:xfrm>
+            <a:off x="715661" y="6091311"/>
+            <a:ext cx="10703859" cy="447383"/>
+          </a:xfrm>
+          <a:prstGeom prst="rect">
+            <a:avLst/>
+          </a:prstGeom>
+        </p:spPr>
+        <p:txBody>
+          <a:bodyPr vert="horz" wrap="square" lIns="91440" tIns="45720" rIns="91440" bIns="45720" rtlCol="0" anchor="t">
+            <a:noAutofit/>
+          </a:bodyPr>
+          <a:lstStyle>
+            <a:defPPr>
+              <a:defRPr lang="en-US"/>
+            </a:defPPr>
+            <a:lvl1pPr>
+              <a:defRPr sz="1200">
+                <a:solidFill>
+                  <a:schemeClr val="tx1">
+                    <a:lumMod val="50000"/>
+                    <a:lumOff val="50000"/>
+                  </a:schemeClr>
+                </a:solidFill>
+              </a:defRPr>
+            </a:lvl1pPr>
+          </a:lstStyle>
+          <a:p>
+            <a:r>
+              <a:rPr lang="en-US" sz="1050" dirty="0"/>
+              <a:t>*** Requires installation of OMG Technical Debt Measure (&gt;2.0.0 </a:t>
+            </a:r>
+            <a:r>
+              <a:rPr lang="en-US" sz="1050" dirty="0" err="1"/>
+              <a:t>funcrel</a:t>
+            </a:r>
+            <a:r>
+              <a:rPr lang="en-US" sz="1050" dirty="0"/>
+              <a:t>) (and ISO-5055 Index extensions and/or CISQ Index extensions)</a:t>
+            </a:r>
+          </a:p>
+          <a:p>
+            <a:r>
+              <a:rPr lang="en-US" sz="1050" dirty="0"/>
+              <a:t>To get results on Omg Technical Debt on a specific metric, add the axis "METRICS=M" where M is the index id (ISO, CISQ or AIP)</a:t>
+            </a:r>
+            <a:endParaRPr lang="en-GB" sz="1050" dirty="0"/>
+          </a:p>
+          <a:p>
+            <a:endParaRPr lang="en-US" sz="1050" dirty="0"/>
           </a:p>
         </p:txBody>
       </p:sp>

</xml_diff>

<commit_message>
REPORTGEN-1070: update chinese templates
</commit_message>
<xml_diff>
--- a/CastReporting.Reporting.Core/Templates/zh-CN/Application/Component library/Generic Graph Definition.pptx
+++ b/CastReporting.Reporting.Core/Templates/zh-CN/Application/Component library/Generic Graph Definition.pptx
@@ -5,7 +5,7 @@
     <p:sldMasterId id="2147483648" r:id="rId1"/>
   </p:sldMasterIdLst>
   <p:notesMasterIdLst>
-    <p:notesMasterId r:id="rId14"/>
+    <p:notesMasterId r:id="rId13"/>
   </p:notesMasterIdLst>
   <p:sldIdLst>
     <p:sldId id="342" r:id="rId2"/>
@@ -19,7 +19,6 @@
     <p:sldId id="382" r:id="rId10"/>
     <p:sldId id="385" r:id="rId11"/>
     <p:sldId id="387" r:id="rId12"/>
-    <p:sldId id="388" r:id="rId13"/>
   </p:sldIdLst>
   <p:sldSz cx="12192000" cy="6858000"/>
   <p:notesSz cx="6858000" cy="9144000"/>
@@ -1084,485 +1083,6 @@
         <a:effectLst/>
       </c:spPr>
     </c:plotArea>
-    <c:plotVisOnly val="1"/>
-    <c:dispBlanksAs val="gap"/>
-    <c:showDLblsOverMax val="0"/>
-  </c:chart>
-  <c:spPr>
-    <a:noFill/>
-    <a:ln>
-      <a:noFill/>
-    </a:ln>
-    <a:effectLst/>
-  </c:spPr>
-  <c:txPr>
-    <a:bodyPr/>
-    <a:lstStyle/>
-    <a:p>
-      <a:pPr>
-        <a:defRPr/>
-      </a:pPr>
-      <a:endParaRPr lang="en-US"/>
-    </a:p>
-  </c:txPr>
-  <c:externalData r:id="rId3">
-    <c:autoUpdate val="0"/>
-  </c:externalData>
-</c:chartSpace>
-</file>
-
-<file path=ppt/charts/chart11.xml><?xml version="1.0" encoding="utf-8"?>
-<c:chartSpace xmlns:c="http://schemas.openxmlformats.org/drawingml/2006/chart" xmlns:a="http://schemas.openxmlformats.org/drawingml/2006/main" xmlns:r="http://schemas.openxmlformats.org/officeDocument/2006/relationships" xmlns:c16r2="http://schemas.microsoft.com/office/drawing/2015/06/chart">
-  <c:date1904 val="0"/>
-  <c:lang val="en-US"/>
-  <c:roundedCorners val="0"/>
-  <mc:AlternateContent xmlns:mc="http://schemas.openxmlformats.org/markup-compatibility/2006">
-    <mc:Choice xmlns:c14="http://schemas.microsoft.com/office/drawing/2007/8/2/chart" Requires="c14">
-      <c14:style val="102"/>
-    </mc:Choice>
-    <mc:Fallback>
-      <c:style val="2"/>
-    </mc:Fallback>
-  </mc:AlternateContent>
-  <c:chart>
-    <c:title>
-      <c:tx>
-        <c:rich>
-          <a:bodyPr rot="0" spcFirstLastPara="1" vertOverflow="ellipsis" vert="horz" wrap="square" anchor="ctr" anchorCtr="1"/>
-          <a:lstStyle/>
-          <a:p>
-            <a:pPr>
-              <a:defRPr sz="1000" b="1" i="0" u="none" strike="noStrike" kern="1200" spc="0" baseline="0">
-                <a:solidFill>
-                  <a:schemeClr val="tx1">
-                    <a:lumMod val="65000"/>
-                    <a:lumOff val="35000"/>
-                  </a:schemeClr>
-                </a:solidFill>
-                <a:latin typeface="+mn-lt"/>
-                <a:ea typeface="+mn-ea"/>
-                <a:cs typeface="+mn-cs"/>
-              </a:defRPr>
-            </a:pPr>
-            <a:r>
-              <a:rPr lang="fr-FR" sz="1000" b="1" dirty="0">
-                <a:effectLst/>
-              </a:rPr>
-              <a:t>ADDED AND REMOVED ISO TECHNICAL DEBT BY MODULE</a:t>
-            </a:r>
-            <a:endParaRPr lang="en-US" sz="1000" b="1" dirty="0">
-              <a:effectLst/>
-            </a:endParaRPr>
-          </a:p>
-        </c:rich>
-      </c:tx>
-      <c:overlay val="0"/>
-      <c:spPr>
-        <a:noFill/>
-        <a:ln>
-          <a:noFill/>
-        </a:ln>
-        <a:effectLst/>
-      </c:spPr>
-      <c:txPr>
-        <a:bodyPr rot="0" spcFirstLastPara="1" vertOverflow="ellipsis" vert="horz" wrap="square" anchor="ctr" anchorCtr="1"/>
-        <a:lstStyle/>
-        <a:p>
-          <a:pPr>
-            <a:defRPr sz="1000" b="1" i="0" u="none" strike="noStrike" kern="1200" spc="0" baseline="0">
-              <a:solidFill>
-                <a:schemeClr val="tx1">
-                  <a:lumMod val="65000"/>
-                  <a:lumOff val="35000"/>
-                </a:schemeClr>
-              </a:solidFill>
-              <a:latin typeface="+mn-lt"/>
-              <a:ea typeface="+mn-ea"/>
-              <a:cs typeface="+mn-cs"/>
-            </a:defRPr>
-          </a:pPr>
-          <a:endParaRPr lang="en-US"/>
-        </a:p>
-      </c:txPr>
-    </c:title>
-    <c:autoTitleDeleted val="0"/>
-    <c:plotArea>
-      <c:layout/>
-      <c:barChart>
-        <c:barDir val="bar"/>
-        <c:grouping val="clustered"/>
-        <c:varyColors val="0"/>
-        <c:ser>
-          <c:idx val="0"/>
-          <c:order val="0"/>
-          <c:tx>
-            <c:strRef>
-              <c:f>Sheet1!$B$1</c:f>
-              <c:strCache>
-                <c:ptCount val="1"/>
-                <c:pt idx="0">
-                  <c:v>Total</c:v>
-                </c:pt>
-              </c:strCache>
-            </c:strRef>
-          </c:tx>
-          <c:spPr>
-            <a:solidFill>
-              <a:schemeClr val="accent1"/>
-            </a:solidFill>
-            <a:ln>
-              <a:noFill/>
-            </a:ln>
-            <a:effectLst/>
-          </c:spPr>
-          <c:invertIfNegative val="0"/>
-          <c:cat>
-            <c:strRef>
-              <c:f>Sheet1!$A$2:$A$5</c:f>
-              <c:strCache>
-                <c:ptCount val="4"/>
-                <c:pt idx="0">
-                  <c:v>Module 1</c:v>
-                </c:pt>
-                <c:pt idx="1">
-                  <c:v>Module 2</c:v>
-                </c:pt>
-                <c:pt idx="2">
-                  <c:v>Module 3</c:v>
-                </c:pt>
-                <c:pt idx="3">
-                  <c:v>Module 4</c:v>
-                </c:pt>
-              </c:strCache>
-            </c:strRef>
-          </c:cat>
-          <c:val>
-            <c:numRef>
-              <c:f>Sheet1!$B$2:$B$5</c:f>
-              <c:numCache>
-                <c:formatCode>General</c:formatCode>
-                <c:ptCount val="4"/>
-                <c:pt idx="0">
-                  <c:v>30</c:v>
-                </c:pt>
-                <c:pt idx="1">
-                  <c:v>30</c:v>
-                </c:pt>
-                <c:pt idx="2">
-                  <c:v>30</c:v>
-                </c:pt>
-                <c:pt idx="3">
-                  <c:v>30</c:v>
-                </c:pt>
-              </c:numCache>
-            </c:numRef>
-          </c:val>
-          <c:extLst>
-            <c:ext xmlns:c16="http://schemas.microsoft.com/office/drawing/2014/chart" uri="{C3380CC4-5D6E-409C-BE32-E72D297353CC}">
-              <c16:uniqueId val="{00000000-3332-4F3C-99BE-F7E77DEDD538}"/>
-            </c:ext>
-          </c:extLst>
-        </c:ser>
-        <c:ser>
-          <c:idx val="1"/>
-          <c:order val="1"/>
-          <c:tx>
-            <c:strRef>
-              <c:f>Sheet1!$C$1</c:f>
-              <c:strCache>
-                <c:ptCount val="1"/>
-                <c:pt idx="0">
-                  <c:v>Added</c:v>
-                </c:pt>
-              </c:strCache>
-            </c:strRef>
-          </c:tx>
-          <c:spPr>
-            <a:solidFill>
-              <a:schemeClr val="accent2"/>
-            </a:solidFill>
-            <a:ln>
-              <a:noFill/>
-            </a:ln>
-            <a:effectLst/>
-          </c:spPr>
-          <c:invertIfNegative val="0"/>
-          <c:cat>
-            <c:strRef>
-              <c:f>Sheet1!$A$2:$A$5</c:f>
-              <c:strCache>
-                <c:ptCount val="4"/>
-                <c:pt idx="0">
-                  <c:v>Module 1</c:v>
-                </c:pt>
-                <c:pt idx="1">
-                  <c:v>Module 2</c:v>
-                </c:pt>
-                <c:pt idx="2">
-                  <c:v>Module 3</c:v>
-                </c:pt>
-                <c:pt idx="3">
-                  <c:v>Module 4</c:v>
-                </c:pt>
-              </c:strCache>
-            </c:strRef>
-          </c:cat>
-          <c:val>
-            <c:numRef>
-              <c:f>Sheet1!$C$2:$C$5</c:f>
-              <c:numCache>
-                <c:formatCode>General</c:formatCode>
-                <c:ptCount val="4"/>
-                <c:pt idx="0">
-                  <c:v>10</c:v>
-                </c:pt>
-                <c:pt idx="1">
-                  <c:v>10</c:v>
-                </c:pt>
-                <c:pt idx="2">
-                  <c:v>10</c:v>
-                </c:pt>
-                <c:pt idx="3">
-                  <c:v>10</c:v>
-                </c:pt>
-              </c:numCache>
-            </c:numRef>
-          </c:val>
-          <c:extLst>
-            <c:ext xmlns:c16="http://schemas.microsoft.com/office/drawing/2014/chart" uri="{C3380CC4-5D6E-409C-BE32-E72D297353CC}">
-              <c16:uniqueId val="{00000001-3332-4F3C-99BE-F7E77DEDD538}"/>
-            </c:ext>
-          </c:extLst>
-        </c:ser>
-        <c:ser>
-          <c:idx val="2"/>
-          <c:order val="2"/>
-          <c:tx>
-            <c:strRef>
-              <c:f>Sheet1!$D$1</c:f>
-              <c:strCache>
-                <c:ptCount val="1"/>
-                <c:pt idx="0">
-                  <c:v>Removed</c:v>
-                </c:pt>
-              </c:strCache>
-            </c:strRef>
-          </c:tx>
-          <c:spPr>
-            <a:solidFill>
-              <a:schemeClr val="accent3"/>
-            </a:solidFill>
-            <a:ln>
-              <a:noFill/>
-            </a:ln>
-            <a:effectLst/>
-          </c:spPr>
-          <c:invertIfNegative val="0"/>
-          <c:cat>
-            <c:strRef>
-              <c:f>Sheet1!$A$2:$A$5</c:f>
-              <c:strCache>
-                <c:ptCount val="4"/>
-                <c:pt idx="0">
-                  <c:v>Module 1</c:v>
-                </c:pt>
-                <c:pt idx="1">
-                  <c:v>Module 2</c:v>
-                </c:pt>
-                <c:pt idx="2">
-                  <c:v>Module 3</c:v>
-                </c:pt>
-                <c:pt idx="3">
-                  <c:v>Module 4</c:v>
-                </c:pt>
-              </c:strCache>
-            </c:strRef>
-          </c:cat>
-          <c:val>
-            <c:numRef>
-              <c:f>Sheet1!$D$2:$D$5</c:f>
-              <c:numCache>
-                <c:formatCode>General</c:formatCode>
-                <c:ptCount val="4"/>
-                <c:pt idx="0">
-                  <c:v>10</c:v>
-                </c:pt>
-                <c:pt idx="1">
-                  <c:v>10</c:v>
-                </c:pt>
-                <c:pt idx="2">
-                  <c:v>10</c:v>
-                </c:pt>
-                <c:pt idx="3">
-                  <c:v>10</c:v>
-                </c:pt>
-              </c:numCache>
-            </c:numRef>
-          </c:val>
-          <c:extLst>
-            <c:ext xmlns:c16="http://schemas.microsoft.com/office/drawing/2014/chart" uri="{C3380CC4-5D6E-409C-BE32-E72D297353CC}">
-              <c16:uniqueId val="{00000002-3332-4F3C-99BE-F7E77DEDD538}"/>
-            </c:ext>
-          </c:extLst>
-        </c:ser>
-        <c:dLbls>
-          <c:showLegendKey val="0"/>
-          <c:showVal val="0"/>
-          <c:showCatName val="0"/>
-          <c:showSerName val="0"/>
-          <c:showPercent val="0"/>
-          <c:showBubbleSize val="0"/>
-        </c:dLbls>
-        <c:gapWidth val="219"/>
-        <c:axId val="461299216"/>
-        <c:axId val="461299544"/>
-      </c:barChart>
-      <c:catAx>
-        <c:axId val="461299216"/>
-        <c:scaling>
-          <c:orientation val="minMax"/>
-        </c:scaling>
-        <c:delete val="0"/>
-        <c:axPos val="l"/>
-        <c:numFmt formatCode="General" sourceLinked="1"/>
-        <c:majorTickMark val="none"/>
-        <c:minorTickMark val="none"/>
-        <c:tickLblPos val="nextTo"/>
-        <c:spPr>
-          <a:noFill/>
-          <a:ln w="9525" cap="flat" cmpd="sng" algn="ctr">
-            <a:solidFill>
-              <a:schemeClr val="tx1">
-                <a:lumMod val="15000"/>
-                <a:lumOff val="85000"/>
-              </a:schemeClr>
-            </a:solidFill>
-            <a:round/>
-          </a:ln>
-          <a:effectLst/>
-        </c:spPr>
-        <c:txPr>
-          <a:bodyPr rot="-60000000" spcFirstLastPara="1" vertOverflow="ellipsis" vert="horz" wrap="square" anchor="ctr" anchorCtr="1"/>
-          <a:lstStyle/>
-          <a:p>
-            <a:pPr>
-              <a:defRPr sz="1197" b="0" i="0" u="none" strike="noStrike" kern="1200" baseline="0">
-                <a:solidFill>
-                  <a:schemeClr val="tx1">
-                    <a:lumMod val="65000"/>
-                    <a:lumOff val="35000"/>
-                  </a:schemeClr>
-                </a:solidFill>
-                <a:latin typeface="+mn-lt"/>
-                <a:ea typeface="+mn-ea"/>
-                <a:cs typeface="+mn-cs"/>
-              </a:defRPr>
-            </a:pPr>
-            <a:endParaRPr lang="en-US"/>
-          </a:p>
-        </c:txPr>
-        <c:crossAx val="461299544"/>
-        <c:crosses val="autoZero"/>
-        <c:auto val="1"/>
-        <c:lblAlgn val="ctr"/>
-        <c:lblOffset val="100"/>
-        <c:noMultiLvlLbl val="0"/>
-      </c:catAx>
-      <c:valAx>
-        <c:axId val="461299544"/>
-        <c:scaling>
-          <c:orientation val="minMax"/>
-        </c:scaling>
-        <c:delete val="0"/>
-        <c:axPos val="b"/>
-        <c:majorGridlines>
-          <c:spPr>
-            <a:ln w="9525" cap="flat" cmpd="sng" algn="ctr">
-              <a:solidFill>
-                <a:schemeClr val="tx1">
-                  <a:lumMod val="15000"/>
-                  <a:lumOff val="85000"/>
-                </a:schemeClr>
-              </a:solidFill>
-              <a:round/>
-            </a:ln>
-            <a:effectLst/>
-          </c:spPr>
-        </c:majorGridlines>
-        <c:numFmt formatCode="General" sourceLinked="1"/>
-        <c:majorTickMark val="none"/>
-        <c:minorTickMark val="none"/>
-        <c:tickLblPos val="nextTo"/>
-        <c:spPr>
-          <a:noFill/>
-          <a:ln>
-            <a:noFill/>
-          </a:ln>
-          <a:effectLst/>
-        </c:spPr>
-        <c:txPr>
-          <a:bodyPr rot="-60000000" spcFirstLastPara="1" vertOverflow="ellipsis" vert="horz" wrap="square" anchor="ctr" anchorCtr="1"/>
-          <a:lstStyle/>
-          <a:p>
-            <a:pPr>
-              <a:defRPr sz="1197" b="0" i="0" u="none" strike="noStrike" kern="1200" baseline="0">
-                <a:solidFill>
-                  <a:schemeClr val="tx1">
-                    <a:lumMod val="65000"/>
-                    <a:lumOff val="35000"/>
-                  </a:schemeClr>
-                </a:solidFill>
-                <a:latin typeface="+mn-lt"/>
-                <a:ea typeface="+mn-ea"/>
-                <a:cs typeface="+mn-cs"/>
-              </a:defRPr>
-            </a:pPr>
-            <a:endParaRPr lang="en-US"/>
-          </a:p>
-        </c:txPr>
-        <c:crossAx val="461299216"/>
-        <c:crosses val="autoZero"/>
-        <c:crossBetween val="between"/>
-      </c:valAx>
-      <c:spPr>
-        <a:noFill/>
-        <a:ln>
-          <a:noFill/>
-        </a:ln>
-        <a:effectLst/>
-      </c:spPr>
-    </c:plotArea>
-    <c:legend>
-      <c:legendPos val="b"/>
-      <c:overlay val="0"/>
-      <c:spPr>
-        <a:noFill/>
-        <a:ln>
-          <a:noFill/>
-        </a:ln>
-        <a:effectLst/>
-      </c:spPr>
-      <c:txPr>
-        <a:bodyPr rot="0" spcFirstLastPara="1" vertOverflow="ellipsis" vert="horz" wrap="square" anchor="ctr" anchorCtr="1"/>
-        <a:lstStyle/>
-        <a:p>
-          <a:pPr>
-            <a:defRPr sz="1197" b="0" i="0" u="none" strike="noStrike" kern="1200" baseline="0">
-              <a:solidFill>
-                <a:schemeClr val="tx1">
-                  <a:lumMod val="65000"/>
-                  <a:lumOff val="35000"/>
-                </a:schemeClr>
-              </a:solidFill>
-              <a:latin typeface="+mn-lt"/>
-              <a:ea typeface="+mn-ea"/>
-              <a:cs typeface="+mn-cs"/>
-            </a:defRPr>
-          </a:pPr>
-          <a:endParaRPr lang="en-US"/>
-        </a:p>
-      </c:txPr>
-    </c:legend>
     <c:plotVisOnly val="1"/>
     <c:dispBlanksAs val="gap"/>
     <c:showDLblsOverMax val="0"/>
@@ -6103,46 +5623,6 @@
 </cs:colorStyle>
 </file>
 
-<file path=ppt/charts/colors11.xml><?xml version="1.0" encoding="utf-8"?>
-<cs:colorStyle xmlns:cs="http://schemas.microsoft.com/office/drawing/2012/chartStyle" xmlns:a="http://schemas.openxmlformats.org/drawingml/2006/main" meth="cycle" id="10">
-  <a:schemeClr val="accent1"/>
-  <a:schemeClr val="accent2"/>
-  <a:schemeClr val="accent3"/>
-  <a:schemeClr val="accent4"/>
-  <a:schemeClr val="accent5"/>
-  <a:schemeClr val="accent6"/>
-  <cs:variation/>
-  <cs:variation>
-    <a:lumMod val="60000"/>
-  </cs:variation>
-  <cs:variation>
-    <a:lumMod val="80000"/>
-    <a:lumOff val="20000"/>
-  </cs:variation>
-  <cs:variation>
-    <a:lumMod val="80000"/>
-  </cs:variation>
-  <cs:variation>
-    <a:lumMod val="60000"/>
-    <a:lumOff val="40000"/>
-  </cs:variation>
-  <cs:variation>
-    <a:lumMod val="50000"/>
-  </cs:variation>
-  <cs:variation>
-    <a:lumMod val="70000"/>
-    <a:lumOff val="30000"/>
-  </cs:variation>
-  <cs:variation>
-    <a:lumMod val="70000"/>
-  </cs:variation>
-  <cs:variation>
-    <a:lumMod val="50000"/>
-    <a:lumOff val="50000"/>
-  </cs:variation>
-</cs:colorStyle>
-</file>
-
 <file path=ppt/charts/colors2.xml><?xml version="1.0" encoding="utf-8"?>
 <cs:colorStyle xmlns:cs="http://schemas.microsoft.com/office/drawing/2012/chartStyle" xmlns:a="http://schemas.openxmlformats.org/drawingml/2006/main" meth="cycle" id="10">
   <a:schemeClr val="accent1"/>
@@ -7483,509 +6963,6 @@
 </cs:chartStyle>
 </file>
 
-<file path=ppt/charts/style11.xml><?xml version="1.0" encoding="utf-8"?>
-<cs:chartStyle xmlns:cs="http://schemas.microsoft.com/office/drawing/2012/chartStyle" xmlns:a="http://schemas.openxmlformats.org/drawingml/2006/main" id="201">
-  <cs:axisTitle>
-    <cs:lnRef idx="0"/>
-    <cs:fillRef idx="0"/>
-    <cs:effectRef idx="0"/>
-    <cs:fontRef idx="minor">
-      <a:schemeClr val="tx1">
-        <a:lumMod val="65000"/>
-        <a:lumOff val="35000"/>
-      </a:schemeClr>
-    </cs:fontRef>
-    <cs:defRPr sz="1330" kern="1200"/>
-  </cs:axisTitle>
-  <cs:categoryAxis>
-    <cs:lnRef idx="0"/>
-    <cs:fillRef idx="0"/>
-    <cs:effectRef idx="0"/>
-    <cs:fontRef idx="minor">
-      <a:schemeClr val="tx1">
-        <a:lumMod val="65000"/>
-        <a:lumOff val="35000"/>
-      </a:schemeClr>
-    </cs:fontRef>
-    <cs:spPr>
-      <a:ln w="9525" cap="flat" cmpd="sng" algn="ctr">
-        <a:solidFill>
-          <a:schemeClr val="tx1">
-            <a:lumMod val="15000"/>
-            <a:lumOff val="85000"/>
-          </a:schemeClr>
-        </a:solidFill>
-        <a:round/>
-      </a:ln>
-    </cs:spPr>
-    <cs:defRPr sz="1197" kern="1200"/>
-  </cs:categoryAxis>
-  <cs:chartArea mods="allowNoFillOverride allowNoLineOverride">
-    <cs:lnRef idx="0"/>
-    <cs:fillRef idx="0"/>
-    <cs:effectRef idx="0"/>
-    <cs:fontRef idx="minor">
-      <a:schemeClr val="tx1"/>
-    </cs:fontRef>
-    <cs:spPr>
-      <a:solidFill>
-        <a:schemeClr val="bg1"/>
-      </a:solidFill>
-      <a:ln w="9525" cap="flat" cmpd="sng" algn="ctr">
-        <a:solidFill>
-          <a:schemeClr val="tx1">
-            <a:lumMod val="15000"/>
-            <a:lumOff val="85000"/>
-          </a:schemeClr>
-        </a:solidFill>
-        <a:round/>
-      </a:ln>
-    </cs:spPr>
-    <cs:defRPr sz="1330" kern="1200"/>
-  </cs:chartArea>
-  <cs:dataLabel>
-    <cs:lnRef idx="0"/>
-    <cs:fillRef idx="0"/>
-    <cs:effectRef idx="0"/>
-    <cs:fontRef idx="minor">
-      <a:schemeClr val="tx1">
-        <a:lumMod val="75000"/>
-        <a:lumOff val="25000"/>
-      </a:schemeClr>
-    </cs:fontRef>
-    <cs:defRPr sz="1197" kern="1200"/>
-  </cs:dataLabel>
-  <cs:dataLabelCallout>
-    <cs:lnRef idx="0"/>
-    <cs:fillRef idx="0"/>
-    <cs:effectRef idx="0"/>
-    <cs:fontRef idx="minor">
-      <a:schemeClr val="dk1">
-        <a:lumMod val="65000"/>
-        <a:lumOff val="35000"/>
-      </a:schemeClr>
-    </cs:fontRef>
-    <cs:spPr>
-      <a:solidFill>
-        <a:schemeClr val="lt1"/>
-      </a:solidFill>
-      <a:ln>
-        <a:solidFill>
-          <a:schemeClr val="dk1">
-            <a:lumMod val="25000"/>
-            <a:lumOff val="75000"/>
-          </a:schemeClr>
-        </a:solidFill>
-      </a:ln>
-    </cs:spPr>
-    <cs:defRPr sz="1197" kern="1200"/>
-    <cs:bodyPr rot="0" spcFirstLastPara="1" vertOverflow="clip" horzOverflow="clip" vert="horz" wrap="square" lIns="36576" tIns="18288" rIns="36576" bIns="18288" anchor="ctr" anchorCtr="1">
-      <a:spAutoFit/>
-    </cs:bodyPr>
-  </cs:dataLabelCallout>
-  <cs:dataPoint>
-    <cs:lnRef idx="0"/>
-    <cs:fillRef idx="1">
-      <cs:styleClr val="auto"/>
-    </cs:fillRef>
-    <cs:effectRef idx="0"/>
-    <cs:fontRef idx="minor">
-      <a:schemeClr val="tx1"/>
-    </cs:fontRef>
-  </cs:dataPoint>
-  <cs:dataPoint3D>
-    <cs:lnRef idx="0"/>
-    <cs:fillRef idx="1">
-      <cs:styleClr val="auto"/>
-    </cs:fillRef>
-    <cs:effectRef idx="0"/>
-    <cs:fontRef idx="minor">
-      <a:schemeClr val="tx1"/>
-    </cs:fontRef>
-  </cs:dataPoint3D>
-  <cs:dataPointLine>
-    <cs:lnRef idx="0">
-      <cs:styleClr val="auto"/>
-    </cs:lnRef>
-    <cs:fillRef idx="1"/>
-    <cs:effectRef idx="0"/>
-    <cs:fontRef idx="minor">
-      <a:schemeClr val="tx1"/>
-    </cs:fontRef>
-    <cs:spPr>
-      <a:ln w="28575" cap="rnd">
-        <a:solidFill>
-          <a:schemeClr val="phClr"/>
-        </a:solidFill>
-        <a:round/>
-      </a:ln>
-    </cs:spPr>
-  </cs:dataPointLine>
-  <cs:dataPointMarker>
-    <cs:lnRef idx="0">
-      <cs:styleClr val="auto"/>
-    </cs:lnRef>
-    <cs:fillRef idx="1">
-      <cs:styleClr val="auto"/>
-    </cs:fillRef>
-    <cs:effectRef idx="0"/>
-    <cs:fontRef idx="minor">
-      <a:schemeClr val="tx1"/>
-    </cs:fontRef>
-    <cs:spPr>
-      <a:ln w="9525">
-        <a:solidFill>
-          <a:schemeClr val="phClr"/>
-        </a:solidFill>
-      </a:ln>
-    </cs:spPr>
-  </cs:dataPointMarker>
-  <cs:dataPointMarkerLayout symbol="circle" size="5"/>
-  <cs:dataPointWireframe>
-    <cs:lnRef idx="0">
-      <cs:styleClr val="auto"/>
-    </cs:lnRef>
-    <cs:fillRef idx="1"/>
-    <cs:effectRef idx="0"/>
-    <cs:fontRef idx="minor">
-      <a:schemeClr val="tx1"/>
-    </cs:fontRef>
-    <cs:spPr>
-      <a:ln w="9525" cap="rnd">
-        <a:solidFill>
-          <a:schemeClr val="phClr"/>
-        </a:solidFill>
-        <a:round/>
-      </a:ln>
-    </cs:spPr>
-  </cs:dataPointWireframe>
-  <cs:dataTable>
-    <cs:lnRef idx="0"/>
-    <cs:fillRef idx="0"/>
-    <cs:effectRef idx="0"/>
-    <cs:fontRef idx="minor">
-      <a:schemeClr val="tx1">
-        <a:lumMod val="65000"/>
-        <a:lumOff val="35000"/>
-      </a:schemeClr>
-    </cs:fontRef>
-    <cs:spPr>
-      <a:noFill/>
-      <a:ln w="9525" cap="flat" cmpd="sng" algn="ctr">
-        <a:solidFill>
-          <a:schemeClr val="tx1">
-            <a:lumMod val="15000"/>
-            <a:lumOff val="85000"/>
-          </a:schemeClr>
-        </a:solidFill>
-        <a:round/>
-      </a:ln>
-    </cs:spPr>
-    <cs:defRPr sz="1197" kern="1200"/>
-  </cs:dataTable>
-  <cs:downBar>
-    <cs:lnRef idx="0"/>
-    <cs:fillRef idx="0"/>
-    <cs:effectRef idx="0"/>
-    <cs:fontRef idx="minor">
-      <a:schemeClr val="dk1"/>
-    </cs:fontRef>
-    <cs:spPr>
-      <a:solidFill>
-        <a:schemeClr val="dk1">
-          <a:lumMod val="65000"/>
-          <a:lumOff val="35000"/>
-        </a:schemeClr>
-      </a:solidFill>
-      <a:ln w="9525">
-        <a:solidFill>
-          <a:schemeClr val="tx1">
-            <a:lumMod val="65000"/>
-            <a:lumOff val="35000"/>
-          </a:schemeClr>
-        </a:solidFill>
-      </a:ln>
-    </cs:spPr>
-  </cs:downBar>
-  <cs:dropLine>
-    <cs:lnRef idx="0"/>
-    <cs:fillRef idx="0"/>
-    <cs:effectRef idx="0"/>
-    <cs:fontRef idx="minor">
-      <a:schemeClr val="tx1"/>
-    </cs:fontRef>
-    <cs:spPr>
-      <a:ln w="9525" cap="flat" cmpd="sng" algn="ctr">
-        <a:solidFill>
-          <a:schemeClr val="tx1">
-            <a:lumMod val="35000"/>
-            <a:lumOff val="65000"/>
-          </a:schemeClr>
-        </a:solidFill>
-        <a:round/>
-      </a:ln>
-    </cs:spPr>
-  </cs:dropLine>
-  <cs:errorBar>
-    <cs:lnRef idx="0"/>
-    <cs:fillRef idx="0"/>
-    <cs:effectRef idx="0"/>
-    <cs:fontRef idx="minor">
-      <a:schemeClr val="tx1"/>
-    </cs:fontRef>
-    <cs:spPr>
-      <a:ln w="9525" cap="flat" cmpd="sng" algn="ctr">
-        <a:solidFill>
-          <a:schemeClr val="tx1">
-            <a:lumMod val="65000"/>
-            <a:lumOff val="35000"/>
-          </a:schemeClr>
-        </a:solidFill>
-        <a:round/>
-      </a:ln>
-    </cs:spPr>
-  </cs:errorBar>
-  <cs:floor>
-    <cs:lnRef idx="0"/>
-    <cs:fillRef idx="0"/>
-    <cs:effectRef idx="0"/>
-    <cs:fontRef idx="minor">
-      <a:schemeClr val="tx1"/>
-    </cs:fontRef>
-    <cs:spPr>
-      <a:noFill/>
-      <a:ln>
-        <a:noFill/>
-      </a:ln>
-    </cs:spPr>
-  </cs:floor>
-  <cs:gridlineMajor>
-    <cs:lnRef idx="0"/>
-    <cs:fillRef idx="0"/>
-    <cs:effectRef idx="0"/>
-    <cs:fontRef idx="minor">
-      <a:schemeClr val="tx1"/>
-    </cs:fontRef>
-    <cs:spPr>
-      <a:ln w="9525" cap="flat" cmpd="sng" algn="ctr">
-        <a:solidFill>
-          <a:schemeClr val="tx1">
-            <a:lumMod val="15000"/>
-            <a:lumOff val="85000"/>
-          </a:schemeClr>
-        </a:solidFill>
-        <a:round/>
-      </a:ln>
-    </cs:spPr>
-  </cs:gridlineMajor>
-  <cs:gridlineMinor>
-    <cs:lnRef idx="0"/>
-    <cs:fillRef idx="0"/>
-    <cs:effectRef idx="0"/>
-    <cs:fontRef idx="minor">
-      <a:schemeClr val="tx1"/>
-    </cs:fontRef>
-    <cs:spPr>
-      <a:ln w="9525" cap="flat" cmpd="sng" algn="ctr">
-        <a:solidFill>
-          <a:schemeClr val="tx1">
-            <a:lumMod val="5000"/>
-            <a:lumOff val="95000"/>
-          </a:schemeClr>
-        </a:solidFill>
-        <a:round/>
-      </a:ln>
-    </cs:spPr>
-  </cs:gridlineMinor>
-  <cs:hiLoLine>
-    <cs:lnRef idx="0"/>
-    <cs:fillRef idx="0"/>
-    <cs:effectRef idx="0"/>
-    <cs:fontRef idx="minor">
-      <a:schemeClr val="tx1"/>
-    </cs:fontRef>
-    <cs:spPr>
-      <a:ln w="9525" cap="flat" cmpd="sng" algn="ctr">
-        <a:solidFill>
-          <a:schemeClr val="tx1">
-            <a:lumMod val="75000"/>
-            <a:lumOff val="25000"/>
-          </a:schemeClr>
-        </a:solidFill>
-        <a:round/>
-      </a:ln>
-    </cs:spPr>
-  </cs:hiLoLine>
-  <cs:leaderLine>
-    <cs:lnRef idx="0"/>
-    <cs:fillRef idx="0"/>
-    <cs:effectRef idx="0"/>
-    <cs:fontRef idx="minor">
-      <a:schemeClr val="tx1"/>
-    </cs:fontRef>
-    <cs:spPr>
-      <a:ln w="9525" cap="flat" cmpd="sng" algn="ctr">
-        <a:solidFill>
-          <a:schemeClr val="tx1">
-            <a:lumMod val="35000"/>
-            <a:lumOff val="65000"/>
-          </a:schemeClr>
-        </a:solidFill>
-        <a:round/>
-      </a:ln>
-    </cs:spPr>
-  </cs:leaderLine>
-  <cs:legend>
-    <cs:lnRef idx="0"/>
-    <cs:fillRef idx="0"/>
-    <cs:effectRef idx="0"/>
-    <cs:fontRef idx="minor">
-      <a:schemeClr val="tx1">
-        <a:lumMod val="65000"/>
-        <a:lumOff val="35000"/>
-      </a:schemeClr>
-    </cs:fontRef>
-    <cs:defRPr sz="1197" kern="1200"/>
-  </cs:legend>
-  <cs:plotArea mods="allowNoFillOverride allowNoLineOverride">
-    <cs:lnRef idx="0"/>
-    <cs:fillRef idx="0"/>
-    <cs:effectRef idx="0"/>
-    <cs:fontRef idx="minor">
-      <a:schemeClr val="tx1"/>
-    </cs:fontRef>
-  </cs:plotArea>
-  <cs:plotArea3D mods="allowNoFillOverride allowNoLineOverride">
-    <cs:lnRef idx="0"/>
-    <cs:fillRef idx="0"/>
-    <cs:effectRef idx="0"/>
-    <cs:fontRef idx="minor">
-      <a:schemeClr val="tx1"/>
-    </cs:fontRef>
-  </cs:plotArea3D>
-  <cs:seriesAxis>
-    <cs:lnRef idx="0"/>
-    <cs:fillRef idx="0"/>
-    <cs:effectRef idx="0"/>
-    <cs:fontRef idx="minor">
-      <a:schemeClr val="tx1">
-        <a:lumMod val="65000"/>
-        <a:lumOff val="35000"/>
-      </a:schemeClr>
-    </cs:fontRef>
-    <cs:defRPr sz="1197" kern="1200"/>
-  </cs:seriesAxis>
-  <cs:seriesLine>
-    <cs:lnRef idx="0"/>
-    <cs:fillRef idx="0"/>
-    <cs:effectRef idx="0"/>
-    <cs:fontRef idx="minor">
-      <a:schemeClr val="tx1"/>
-    </cs:fontRef>
-    <cs:spPr>
-      <a:ln w="9525" cap="flat" cmpd="sng" algn="ctr">
-        <a:solidFill>
-          <a:schemeClr val="tx1">
-            <a:lumMod val="35000"/>
-            <a:lumOff val="65000"/>
-          </a:schemeClr>
-        </a:solidFill>
-        <a:round/>
-      </a:ln>
-    </cs:spPr>
-  </cs:seriesLine>
-  <cs:title>
-    <cs:lnRef idx="0"/>
-    <cs:fillRef idx="0"/>
-    <cs:effectRef idx="0"/>
-    <cs:fontRef idx="minor">
-      <a:schemeClr val="tx1">
-        <a:lumMod val="65000"/>
-        <a:lumOff val="35000"/>
-      </a:schemeClr>
-    </cs:fontRef>
-    <cs:defRPr sz="1862" b="0" kern="1200" spc="0" baseline="0"/>
-  </cs:title>
-  <cs:trendline>
-    <cs:lnRef idx="0">
-      <cs:styleClr val="auto"/>
-    </cs:lnRef>
-    <cs:fillRef idx="0"/>
-    <cs:effectRef idx="0"/>
-    <cs:fontRef idx="minor">
-      <a:schemeClr val="tx1"/>
-    </cs:fontRef>
-    <cs:spPr>
-      <a:ln w="19050" cap="rnd">
-        <a:solidFill>
-          <a:schemeClr val="phClr"/>
-        </a:solidFill>
-        <a:prstDash val="sysDot"/>
-      </a:ln>
-    </cs:spPr>
-  </cs:trendline>
-  <cs:trendlineLabel>
-    <cs:lnRef idx="0"/>
-    <cs:fillRef idx="0"/>
-    <cs:effectRef idx="0"/>
-    <cs:fontRef idx="minor">
-      <a:schemeClr val="tx1">
-        <a:lumMod val="65000"/>
-        <a:lumOff val="35000"/>
-      </a:schemeClr>
-    </cs:fontRef>
-    <cs:defRPr sz="1197" kern="1200"/>
-  </cs:trendlineLabel>
-  <cs:upBar>
-    <cs:lnRef idx="0"/>
-    <cs:fillRef idx="0"/>
-    <cs:effectRef idx="0"/>
-    <cs:fontRef idx="minor">
-      <a:schemeClr val="dk1"/>
-    </cs:fontRef>
-    <cs:spPr>
-      <a:solidFill>
-        <a:schemeClr val="lt1"/>
-      </a:solidFill>
-      <a:ln w="9525">
-        <a:solidFill>
-          <a:schemeClr val="tx1">
-            <a:lumMod val="15000"/>
-            <a:lumOff val="85000"/>
-          </a:schemeClr>
-        </a:solidFill>
-      </a:ln>
-    </cs:spPr>
-  </cs:upBar>
-  <cs:valueAxis>
-    <cs:lnRef idx="0"/>
-    <cs:fillRef idx="0"/>
-    <cs:effectRef idx="0"/>
-    <cs:fontRef idx="minor">
-      <a:schemeClr val="tx1">
-        <a:lumMod val="65000"/>
-        <a:lumOff val="35000"/>
-      </a:schemeClr>
-    </cs:fontRef>
-    <cs:defRPr sz="1197" kern="1200"/>
-  </cs:valueAxis>
-  <cs:wall>
-    <cs:lnRef idx="0"/>
-    <cs:fillRef idx="0"/>
-    <cs:effectRef idx="0"/>
-    <cs:fontRef idx="minor">
-      <a:schemeClr val="tx1"/>
-    </cs:fontRef>
-    <cs:spPr>
-      <a:noFill/>
-      <a:ln>
-        <a:noFill/>
-      </a:ln>
-    </cs:spPr>
-  </cs:wall>
-</cs:chartStyle>
-</file>
-
 <file path=ppt/charts/style2.xml><?xml version="1.0" encoding="utf-8"?>
 <cs:chartStyle xmlns:cs="http://schemas.microsoft.com/office/drawing/2012/chartStyle" xmlns:a="http://schemas.openxmlformats.org/drawingml/2006/main" id="201">
   <cs:axisTitle>
@@ -12109,7 +11086,7 @@
           <a:p>
             <a:fld id="{BE7CF963-E58D-FC4D-BA9E-60A980752DC6}" type="datetimeFigureOut">
               <a:rPr lang="en-US" smtClean="0"/>
-              <a:t>10/22/2021</a:t>
+              <a:t>7/21/2020</a:t>
             </a:fld>
             <a:endParaRPr lang="en-US"/>
           </a:p>
@@ -12598,7 +11575,7 @@
           <a:p>
             <a:fld id="{B590C078-9131-4E49-8A0D-400FEE8377B5}" type="datetimeFigureOut">
               <a:rPr lang="en-US" smtClean="0"/>
-              <a:t>10/22/2021</a:t>
+              <a:t>7/21/2020</a:t>
             </a:fld>
             <a:endParaRPr lang="en-US"/>
           </a:p>
@@ -16183,7 +15160,7 @@
           <a:p>
             <a:fld id="{B590C078-9131-4E49-8A0D-400FEE8377B5}" type="datetimeFigureOut">
               <a:rPr lang="en-US" smtClean="0"/>
-              <a:t>10/22/2021</a:t>
+              <a:t>7/21/2020</a:t>
             </a:fld>
             <a:endParaRPr lang="en-US"/>
           </a:p>
@@ -20261,7 +19238,7 @@
           <a:p>
             <a:fld id="{B590C078-9131-4E49-8A0D-400FEE8377B5}" type="datetimeFigureOut">
               <a:rPr lang="en-US" smtClean="0"/>
-              <a:t>10/22/2021</a:t>
+              <a:t>7/21/2020</a:t>
             </a:fld>
             <a:endParaRPr lang="en-US"/>
           </a:p>
@@ -24086,7 +23063,7 @@
           <a:p>
             <a:fld id="{B590C078-9131-4E49-8A0D-400FEE8377B5}" type="datetimeFigureOut">
               <a:rPr lang="en-US" smtClean="0"/>
-              <a:t>10/22/2021</a:t>
+              <a:t>7/21/2020</a:t>
             </a:fld>
             <a:endParaRPr lang="en-US"/>
           </a:p>
@@ -24913,175 +23890,6 @@
 </p:sld>
 </file>
 
-<file path=ppt/slides/slide12.xml><?xml version="1.0" encoding="utf-8"?>
-<p:sld xmlns:a="http://schemas.openxmlformats.org/drawingml/2006/main" xmlns:r="http://schemas.openxmlformats.org/officeDocument/2006/relationships" xmlns:p="http://schemas.openxmlformats.org/presentationml/2006/main">
-  <p:cSld>
-    <p:spTree>
-      <p:nvGrpSpPr>
-        <p:cNvPr id="1" name=""/>
-        <p:cNvGrpSpPr/>
-        <p:nvPr/>
-      </p:nvGrpSpPr>
-      <p:grpSpPr>
-        <a:xfrm>
-          <a:off x="0" y="0"/>
-          <a:ext cx="0" cy="0"/>
-          <a:chOff x="0" y="0"/>
-          <a:chExt cx="0" cy="0"/>
-        </a:xfrm>
-      </p:grpSpPr>
-      <p:sp>
-        <p:nvSpPr>
-          <p:cNvPr id="2" name="Title 1"/>
-          <p:cNvSpPr>
-            <a:spLocks noGrp="1"/>
-          </p:cNvSpPr>
-          <p:nvPr>
-            <p:ph type="title"/>
-          </p:nvPr>
-        </p:nvSpPr>
-        <p:spPr/>
-        <p:txBody>
-          <a:bodyPr/>
-          <a:lstStyle/>
-          <a:p>
-            <a:r>
-              <a:rPr lang="en-US" dirty="0"/>
-              <a:t>Stacked Bar</a:t>
-            </a:r>
-          </a:p>
-        </p:txBody>
-      </p:sp>
-      <p:sp>
-        <p:nvSpPr>
-          <p:cNvPr id="4" name="Text Placeholder 2"/>
-          <p:cNvSpPr>
-            <a:spLocks noGrp="1"/>
-          </p:cNvSpPr>
-          <p:nvPr>
-            <p:ph type="body" sz="quarter" idx="13"/>
-          </p:nvPr>
-        </p:nvSpPr>
-        <p:spPr>
-          <a:xfrm>
-            <a:off x="642730" y="980148"/>
-            <a:ext cx="10939670" cy="400110"/>
-          </a:xfrm>
-        </p:spPr>
-        <p:txBody>
-          <a:bodyPr>
-            <a:normAutofit/>
-          </a:bodyPr>
-          <a:lstStyle/>
-          <a:p>
-            <a:r>
-              <a:rPr lang="en-US" sz="1200" dirty="0"/>
-              <a:t>GRAPH;GENERIC_GRAPH;COL1=OMG_TECHNICAL_DEBT,ROW1=MODULES,MODULES=ALL,OMG_TECHNICAL_DEBT=ALL,METRICS=ISO</a:t>
-            </a:r>
-          </a:p>
-        </p:txBody>
-      </p:sp>
-      <p:graphicFrame>
-        <p:nvGraphicFramePr>
-          <p:cNvPr id="6" name="Chart 5" descr="GRAPH;GENERIC_GRAPH;COL1=OMG_TECHNICAL_DEBT,ROW1=MODULES,MODULES=ALL,OMG_TECHNICAL_DEBT=ALL,METRICS=ISO"/>
-          <p:cNvGraphicFramePr/>
-          <p:nvPr>
-            <p:extLst>
-              <p:ext uri="{D42A27DB-BD31-4B8C-83A1-F6EECF244321}">
-                <p14:modId xmlns:p14="http://schemas.microsoft.com/office/powerpoint/2010/main" val="3323507612"/>
-              </p:ext>
-            </p:extLst>
-          </p:nvPr>
-        </p:nvGraphicFramePr>
-        <p:xfrm>
-          <a:off x="3030070" y="2207640"/>
-          <a:ext cx="5486399" cy="3081535"/>
-        </p:xfrm>
-        <a:graphic>
-          <a:graphicData uri="http://schemas.openxmlformats.org/drawingml/2006/chart">
-            <c:chart xmlns:c="http://schemas.openxmlformats.org/drawingml/2006/chart" xmlns:r="http://schemas.openxmlformats.org/officeDocument/2006/relationships" r:id="rId2"/>
-          </a:graphicData>
-        </a:graphic>
-      </p:graphicFrame>
-      <p:sp>
-        <p:nvSpPr>
-          <p:cNvPr id="5" name="TextBox 4">
-            <a:extLst>
-              <a:ext uri="{FF2B5EF4-FFF2-40B4-BE49-F238E27FC236}">
-                <a16:creationId xmlns:a16="http://schemas.microsoft.com/office/drawing/2014/main" id="{4297E9E4-3047-4638-9BBD-767D8D1A1D78}"/>
-              </a:ext>
-            </a:extLst>
-          </p:cNvPr>
-          <p:cNvSpPr txBox="1"/>
-          <p:nvPr/>
-        </p:nvSpPr>
-        <p:spPr>
-          <a:xfrm>
-            <a:off x="1069344" y="1380258"/>
-            <a:ext cx="10703859" cy="447383"/>
-          </a:xfrm>
-          <a:prstGeom prst="rect">
-            <a:avLst/>
-          </a:prstGeom>
-        </p:spPr>
-        <p:txBody>
-          <a:bodyPr vert="horz" wrap="square" lIns="91440" tIns="45720" rIns="91440" bIns="45720" rtlCol="0" anchor="t">
-            <a:noAutofit/>
-          </a:bodyPr>
-          <a:lstStyle>
-            <a:defPPr>
-              <a:defRPr lang="en-US"/>
-            </a:defPPr>
-            <a:lvl1pPr>
-              <a:defRPr sz="1200">
-                <a:solidFill>
-                  <a:schemeClr val="tx1">
-                    <a:lumMod val="50000"/>
-                    <a:lumOff val="50000"/>
-                  </a:schemeClr>
-                </a:solidFill>
-              </a:defRPr>
-            </a:lvl1pPr>
-          </a:lstStyle>
-          <a:p>
-            <a:r>
-              <a:rPr lang="en-US" sz="1100" dirty="0"/>
-              <a:t>*** Requires installation of OMG Technical Debt Measure (&gt;2.0.0 </a:t>
-            </a:r>
-            <a:r>
-              <a:rPr lang="en-US" sz="1100" dirty="0" err="1"/>
-              <a:t>funcrel</a:t>
-            </a:r>
-            <a:r>
-              <a:rPr lang="en-US" sz="1100" dirty="0"/>
-              <a:t>) (and ISO-5055 Index extensions and/or CISQ Index extensions)</a:t>
-            </a:r>
-          </a:p>
-          <a:p>
-            <a:r>
-              <a:rPr lang="en-US" sz="1100" dirty="0"/>
-              <a:t>To get results on Omg Technical Debt on a specific metric, add the axis "METRICS=M" where M is the index id (ISO, CISQ or AIP)</a:t>
-            </a:r>
-            <a:endParaRPr lang="en-GB" sz="1100" dirty="0"/>
-          </a:p>
-          <a:p>
-            <a:endParaRPr lang="en-US" sz="1100" dirty="0"/>
-          </a:p>
-        </p:txBody>
-      </p:sp>
-    </p:spTree>
-    <p:extLst>
-      <p:ext uri="{BB962C8B-B14F-4D97-AF65-F5344CB8AC3E}">
-        <p14:creationId xmlns:p14="http://schemas.microsoft.com/office/powerpoint/2010/main" val="2256376819"/>
-      </p:ext>
-    </p:extLst>
-  </p:cSld>
-  <p:clrMapOvr>
-    <a:masterClrMapping/>
-  </p:clrMapOvr>
-</p:sld>
-</file>
-
 <file path=ppt/slides/slide2.xml><?xml version="1.0" encoding="utf-8"?>
 <p:sld xmlns:a="http://schemas.openxmlformats.org/drawingml/2006/main" xmlns:r="http://schemas.openxmlformats.org/officeDocument/2006/relationships" xmlns:p="http://schemas.openxmlformats.org/presentationml/2006/main">
   <p:cSld>
@@ -25159,7 +23967,7 @@
         </p:nvSpPr>
         <p:spPr>
           <a:xfrm>
-            <a:off x="744070" y="5378752"/>
+            <a:off x="744070" y="5764646"/>
             <a:ext cx="10703859" cy="367553"/>
           </a:xfrm>
           <a:prstGeom prst="rect">
@@ -25173,7 +23981,7 @@
           <a:lstStyle/>
           <a:p>
             <a:r>
-              <a:rPr lang="en-US" sz="1050" dirty="0">
+              <a:rPr lang="en-US" sz="1200" dirty="0">
                 <a:solidFill>
                   <a:schemeClr val="tx1">
                     <a:lumMod val="50000"/>
@@ -25184,7 +23992,7 @@
               <a:t>* To get results on violations or critical violations on a specific metrics, add the axis “METRICS=M” where M is a metric id from quality model (</a:t>
             </a:r>
             <a:r>
-              <a:rPr lang="en-US" sz="1050" dirty="0" err="1">
+              <a:rPr lang="en-US" sz="1200" dirty="0" err="1">
                 <a:solidFill>
                   <a:schemeClr val="tx1">
                     <a:lumMod val="50000"/>
@@ -25195,7 +24003,7 @@
               <a:t>eg</a:t>
             </a:r>
             <a:r>
-              <a:rPr lang="en-US" sz="1050" dirty="0">
+              <a:rPr lang="en-US" sz="1200" dirty="0">
                 <a:solidFill>
                   <a:schemeClr val="tx1">
                     <a:lumMod val="50000"/>
@@ -25227,7 +24035,7 @@
         <p:spPr>
           <a:xfrm>
             <a:off x="328706" y="1333500"/>
-            <a:ext cx="11253694" cy="4063593"/>
+            <a:ext cx="11253694" cy="4351338"/>
           </a:xfrm>
         </p:spPr>
         <p:txBody>
@@ -25240,13 +24048,13 @@
               <a:buNone/>
             </a:pPr>
             <a:r>
-              <a:rPr lang="en-US" sz="1600" dirty="0"/>
+              <a:rPr lang="en-US" dirty="0"/>
               <a:t>AXIS					VALUES</a:t>
             </a:r>
           </a:p>
           <a:p>
             <a:r>
-              <a:rPr lang="fr-FR" sz="1600" dirty="0">
+              <a:rPr lang="fr-FR" dirty="0">
                 <a:solidFill>
                   <a:schemeClr val="accent5">
                     <a:lumMod val="75000"/>
@@ -25258,7 +24066,7 @@
           </a:p>
           <a:p>
             <a:r>
-              <a:rPr lang="fr-FR" sz="1600" dirty="0">
+              <a:rPr lang="fr-FR" dirty="0">
                 <a:solidFill>
                   <a:schemeClr val="accent2"/>
                 </a:solidFill>
@@ -25267,22 +24075,29 @@
             </a:r>
           </a:p>
           <a:p>
-            <a:endParaRPr lang="fr-FR" sz="1600" dirty="0">
+            <a:endParaRPr lang="fr-FR" dirty="0">
               <a:solidFill>
                 <a:schemeClr val="accent3"/>
               </a:solidFill>
             </a:endParaRPr>
           </a:p>
           <a:p>
-            <a:endParaRPr lang="fr-FR" sz="1600" dirty="0">
+            <a:endParaRPr lang="fr-FR" dirty="0">
               <a:solidFill>
                 <a:schemeClr val="accent3"/>
               </a:solidFill>
             </a:endParaRPr>
           </a:p>
           <a:p>
-            <a:r>
-              <a:rPr lang="fr-FR" sz="1600" dirty="0">
+            <a:endParaRPr lang="fr-FR" dirty="0">
+              <a:solidFill>
+                <a:schemeClr val="accent3"/>
+              </a:solidFill>
+            </a:endParaRPr>
+          </a:p>
+          <a:p>
+            <a:r>
+              <a:rPr lang="fr-FR" dirty="0">
                 <a:solidFill>
                   <a:schemeClr val="accent3"/>
                 </a:solidFill>
@@ -25292,7 +24107,7 @@
           </a:p>
           <a:p>
             <a:r>
-              <a:rPr lang="fr-FR" sz="1600" dirty="0">
+              <a:rPr lang="fr-FR" dirty="0">
                 <a:solidFill>
                   <a:schemeClr val="accent6"/>
                 </a:solidFill>
@@ -25302,7 +24117,7 @@
           </a:p>
           <a:p>
             <a:r>
-              <a:rPr lang="fr-FR" sz="1600" dirty="0">
+              <a:rPr lang="fr-FR" dirty="0">
                 <a:solidFill>
                   <a:srgbClr val="00B0F0"/>
                 </a:solidFill>
@@ -25312,22 +24127,12 @@
           </a:p>
           <a:p>
             <a:r>
-              <a:rPr lang="fr-FR" sz="1600" dirty="0">
+              <a:rPr lang="fr-FR" dirty="0">
                 <a:solidFill>
                   <a:schemeClr val="accent1"/>
                 </a:solidFill>
               </a:rPr>
               <a:t>CRITICAL_VIOLATIONS *</a:t>
-            </a:r>
-          </a:p>
-          <a:p>
-            <a:r>
-              <a:rPr lang="fr-FR" sz="1600" dirty="0">
-                <a:solidFill>
-                  <a:srgbClr val="7F7F7F"/>
-                </a:solidFill>
-              </a:rPr>
-              <a:t>OMG_TECHNICAL_DEBT***</a:t>
             </a:r>
           </a:p>
         </p:txBody>
@@ -25347,7 +24152,7 @@
         <p:spPr>
           <a:xfrm>
             <a:off x="3477775" y="1767155"/>
-            <a:ext cx="998420" cy="183689"/>
+            <a:ext cx="998420" cy="322080"/>
           </a:xfrm>
           <a:prstGeom prst="roundRect">
             <a:avLst/>
@@ -25383,10 +24188,10 @@
           <a:p>
             <a:pPr algn="ctr"/>
             <a:r>
-              <a:rPr lang="en-US" sz="1100" dirty="0"/>
+              <a:rPr lang="en-US" sz="1200" dirty="0"/>
               <a:t>CURRENT</a:t>
             </a:r>
-            <a:endParaRPr lang="en-US" sz="1600" dirty="0"/>
+            <a:endParaRPr lang="en-US" dirty="0"/>
           </a:p>
         </p:txBody>
       </p:sp>
@@ -25405,7 +24210,7 @@
         <p:spPr>
           <a:xfrm>
             <a:off x="4540657" y="1767155"/>
-            <a:ext cx="1102877" cy="183689"/>
+            <a:ext cx="1102877" cy="322080"/>
           </a:xfrm>
           <a:prstGeom prst="roundRect">
             <a:avLst/>
@@ -25441,10 +24246,10 @@
           <a:p>
             <a:pPr algn="ctr"/>
             <a:r>
-              <a:rPr lang="en-US" sz="1100" dirty="0"/>
+              <a:rPr lang="en-US" sz="1200" dirty="0"/>
               <a:t>PREVIOUS</a:t>
             </a:r>
-            <a:endParaRPr lang="en-US" sz="1600" dirty="0"/>
+            <a:endParaRPr lang="en-US" dirty="0"/>
           </a:p>
         </p:txBody>
       </p:sp>
@@ -25463,7 +24268,7 @@
         <p:spPr>
           <a:xfrm>
             <a:off x="5707996" y="1767155"/>
-            <a:ext cx="719193" cy="183689"/>
+            <a:ext cx="719193" cy="322080"/>
           </a:xfrm>
           <a:prstGeom prst="roundRect">
             <a:avLst/>
@@ -25499,10 +24304,10 @@
           <a:p>
             <a:pPr algn="ctr"/>
             <a:r>
-              <a:rPr lang="en-US" sz="1100" dirty="0"/>
+              <a:rPr lang="en-US" sz="1200" dirty="0"/>
               <a:t>EVOL</a:t>
             </a:r>
-            <a:endParaRPr lang="en-US" sz="1600" dirty="0"/>
+            <a:endParaRPr lang="en-US" dirty="0"/>
           </a:p>
         </p:txBody>
       </p:sp>
@@ -25521,7 +24326,7 @@
         <p:spPr>
           <a:xfrm>
             <a:off x="6491651" y="1767155"/>
-            <a:ext cx="1510302" cy="183689"/>
+            <a:ext cx="1510302" cy="322080"/>
           </a:xfrm>
           <a:prstGeom prst="roundRect">
             <a:avLst/>
@@ -25557,10 +24362,10 @@
           <a:p>
             <a:pPr algn="ctr"/>
             <a:r>
-              <a:rPr lang="en-US" sz="1100" dirty="0"/>
+              <a:rPr lang="en-US" sz="1200" dirty="0"/>
               <a:t>EVOL_PERCENT</a:t>
             </a:r>
-            <a:endParaRPr lang="en-US" sz="1600" dirty="0"/>
+            <a:endParaRPr lang="en-US" dirty="0"/>
           </a:p>
         </p:txBody>
       </p:sp>
@@ -25579,7 +24384,7 @@
         <p:spPr>
           <a:xfrm>
             <a:off x="8066415" y="1767155"/>
-            <a:ext cx="539991" cy="183689"/>
+            <a:ext cx="539991" cy="322080"/>
           </a:xfrm>
           <a:prstGeom prst="roundRect">
             <a:avLst/>
@@ -25615,10 +24420,10 @@
           <a:p>
             <a:pPr algn="ctr"/>
             <a:r>
-              <a:rPr lang="en-US" sz="1100" dirty="0"/>
+              <a:rPr lang="en-US" sz="1200" dirty="0"/>
               <a:t>ALL</a:t>
             </a:r>
-            <a:endParaRPr lang="en-US" sz="1600" dirty="0"/>
+            <a:endParaRPr lang="en-US" dirty="0"/>
           </a:p>
         </p:txBody>
       </p:sp>
@@ -25637,7 +24442,7 @@
         <p:spPr>
           <a:xfrm>
             <a:off x="3493539" y="2203333"/>
-            <a:ext cx="560589" cy="183689"/>
+            <a:ext cx="560589" cy="322080"/>
           </a:xfrm>
           <a:prstGeom prst="roundRect">
             <a:avLst/>
@@ -25671,10 +24476,10 @@
           <a:p>
             <a:pPr algn="ctr"/>
             <a:r>
-              <a:rPr lang="en-US" sz="1100" dirty="0"/>
+              <a:rPr lang="en-US" sz="1200" dirty="0"/>
               <a:t>&lt;ID&gt;</a:t>
             </a:r>
-            <a:endParaRPr lang="en-US" sz="1600" dirty="0"/>
+            <a:endParaRPr lang="en-US" dirty="0"/>
           </a:p>
         </p:txBody>
       </p:sp>
@@ -25693,7 +24498,7 @@
         <p:spPr>
           <a:xfrm>
             <a:off x="4121612" y="2203333"/>
-            <a:ext cx="1540708" cy="183689"/>
+            <a:ext cx="1540708" cy="322080"/>
           </a:xfrm>
           <a:prstGeom prst="roundRect">
             <a:avLst/>
@@ -25727,10 +24532,10 @@
           <a:p>
             <a:pPr algn="ctr"/>
             <a:r>
-              <a:rPr lang="en-US" sz="1100" dirty="0"/>
+              <a:rPr lang="en-US" sz="1200" dirty="0"/>
               <a:t>HEALTH_FACTOR</a:t>
             </a:r>
-            <a:endParaRPr lang="en-US" sz="1600" dirty="0"/>
+            <a:endParaRPr lang="en-US" dirty="0"/>
           </a:p>
         </p:txBody>
       </p:sp>
@@ -25749,7 +24554,7 @@
         <p:spPr>
           <a:xfrm>
             <a:off x="5729804" y="2203333"/>
-            <a:ext cx="1790858" cy="183689"/>
+            <a:ext cx="1790858" cy="322080"/>
           </a:xfrm>
           <a:prstGeom prst="roundRect">
             <a:avLst/>
@@ -25783,10 +24588,10 @@
           <a:p>
             <a:pPr algn="ctr"/>
             <a:r>
-              <a:rPr lang="en-US" sz="1100" dirty="0"/>
+              <a:rPr lang="en-US" sz="1200" dirty="0"/>
               <a:t>BUSINESS_CRITERIA</a:t>
             </a:r>
-            <a:endParaRPr lang="en-US" sz="1600" dirty="0"/>
+            <a:endParaRPr lang="en-US" dirty="0"/>
           </a:p>
         </p:txBody>
       </p:sp>
@@ -25805,7 +24610,7 @@
         <p:spPr>
           <a:xfrm>
             <a:off x="7588146" y="2203333"/>
-            <a:ext cx="1887485" cy="183689"/>
+            <a:ext cx="1887485" cy="322080"/>
           </a:xfrm>
           <a:prstGeom prst="roundRect">
             <a:avLst/>
@@ -25839,10 +24644,10 @@
           <a:p>
             <a:pPr algn="ctr"/>
             <a:r>
-              <a:rPr lang="en-US" sz="1100" dirty="0"/>
+              <a:rPr lang="en-US" sz="1200" dirty="0"/>
               <a:t>TECHNICAL_CRITERIA</a:t>
             </a:r>
-            <a:endParaRPr lang="en-US" sz="1600" dirty="0"/>
+            <a:endParaRPr lang="en-US" dirty="0"/>
           </a:p>
         </p:txBody>
       </p:sp>
@@ -25860,8 +24665,8 @@
         </p:nvSpPr>
         <p:spPr>
           <a:xfrm>
-            <a:off x="3505085" y="2505152"/>
-            <a:ext cx="1500390" cy="183689"/>
+            <a:off x="3505085" y="2639376"/>
+            <a:ext cx="1500390" cy="322080"/>
           </a:xfrm>
           <a:prstGeom prst="roundRect">
             <a:avLst/>
@@ -25895,10 +24700,10 @@
           <a:p>
             <a:pPr algn="ctr"/>
             <a:r>
-              <a:rPr lang="en-US" sz="1100" dirty="0"/>
+              <a:rPr lang="en-US" sz="1200" dirty="0"/>
               <a:t>QUALITY_RULES</a:t>
             </a:r>
-            <a:endParaRPr lang="en-US" sz="1600" dirty="0"/>
+            <a:endParaRPr lang="en-US" dirty="0"/>
           </a:p>
         </p:txBody>
       </p:sp>
@@ -25916,8 +24721,8 @@
         </p:nvSpPr>
         <p:spPr>
           <a:xfrm>
-            <a:off x="3505706" y="2822339"/>
-            <a:ext cx="1769278" cy="183689"/>
+            <a:off x="3505706" y="3074009"/>
+            <a:ext cx="1769278" cy="322080"/>
           </a:xfrm>
           <a:prstGeom prst="roundRect">
             <a:avLst/>
@@ -25951,10 +24756,10 @@
           <a:p>
             <a:pPr algn="ctr"/>
             <a:r>
-              <a:rPr lang="en-US" sz="1100" dirty="0"/>
+              <a:rPr lang="en-US" sz="1200" dirty="0"/>
               <a:t>TECHNICAL_SIZING</a:t>
             </a:r>
-            <a:endParaRPr lang="en-US" sz="1600" dirty="0"/>
+            <a:endParaRPr lang="en-US" dirty="0"/>
           </a:p>
         </p:txBody>
       </p:sp>
@@ -25972,8 +24777,8 @@
         </p:nvSpPr>
         <p:spPr>
           <a:xfrm>
-            <a:off x="5336329" y="2822339"/>
-            <a:ext cx="1913713" cy="183689"/>
+            <a:off x="5336329" y="3074009"/>
+            <a:ext cx="1913713" cy="322080"/>
           </a:xfrm>
           <a:prstGeom prst="roundRect">
             <a:avLst/>
@@ -26007,10 +24812,10 @@
           <a:p>
             <a:pPr algn="ctr"/>
             <a:r>
-              <a:rPr lang="en-US" sz="1100" dirty="0"/>
+              <a:rPr lang="en-US" sz="1200" dirty="0"/>
               <a:t>FUNCTIONAL_WEIGHT</a:t>
             </a:r>
-            <a:endParaRPr lang="en-US" sz="1600" dirty="0"/>
+            <a:endParaRPr lang="en-US" dirty="0"/>
           </a:p>
         </p:txBody>
       </p:sp>
@@ -26028,8 +24833,8 @@
         </p:nvSpPr>
         <p:spPr>
           <a:xfrm>
-            <a:off x="7311387" y="2822339"/>
-            <a:ext cx="1608804" cy="183689"/>
+            <a:off x="7311387" y="3074009"/>
+            <a:ext cx="1608804" cy="322080"/>
           </a:xfrm>
           <a:prstGeom prst="roundRect">
             <a:avLst/>
@@ -26063,10 +24868,10 @@
           <a:p>
             <a:pPr algn="ctr"/>
             <a:r>
-              <a:rPr lang="en-US" sz="1100" strike="sngStrike" dirty="0"/>
+              <a:rPr lang="en-US" sz="1200" dirty="0"/>
               <a:t>TECHNICAL_DEBT</a:t>
             </a:r>
-            <a:endParaRPr lang="en-US" sz="1600" strike="sngStrike" dirty="0"/>
+            <a:endParaRPr lang="en-US" dirty="0"/>
           </a:p>
         </p:txBody>
       </p:sp>
@@ -26084,8 +24889,8 @@
         </p:nvSpPr>
         <p:spPr>
           <a:xfrm>
-            <a:off x="8981536" y="2822339"/>
-            <a:ext cx="1064968" cy="183689"/>
+            <a:off x="8981536" y="3074009"/>
+            <a:ext cx="1064968" cy="322080"/>
           </a:xfrm>
           <a:prstGeom prst="roundRect">
             <a:avLst/>
@@ -26119,10 +24924,10 @@
           <a:p>
             <a:pPr algn="ctr"/>
             <a:r>
-              <a:rPr lang="en-US" sz="1100" dirty="0"/>
+              <a:rPr lang="en-US" sz="1200" dirty="0"/>
               <a:t>VIOLATION</a:t>
             </a:r>
-            <a:endParaRPr lang="en-US" sz="1600" dirty="0"/>
+            <a:endParaRPr lang="en-US" dirty="0"/>
           </a:p>
         </p:txBody>
       </p:sp>
@@ -26140,8 +24945,8 @@
         </p:nvSpPr>
         <p:spPr>
           <a:xfrm>
-            <a:off x="10107848" y="2822339"/>
-            <a:ext cx="1813035" cy="183689"/>
+            <a:off x="10107848" y="3074009"/>
+            <a:ext cx="1813035" cy="322080"/>
           </a:xfrm>
           <a:prstGeom prst="roundRect">
             <a:avLst/>
@@ -26175,10 +24980,10 @@
           <a:p>
             <a:pPr algn="ctr"/>
             <a:r>
-              <a:rPr lang="en-US" sz="1100" dirty="0"/>
+              <a:rPr lang="en-US" sz="1200" dirty="0"/>
               <a:t>CRITICAL_VIOLATION</a:t>
             </a:r>
-            <a:endParaRPr lang="en-US" sz="1600" dirty="0"/>
+            <a:endParaRPr lang="en-US" dirty="0"/>
           </a:p>
         </p:txBody>
       </p:sp>
@@ -26196,8 +25001,8 @@
         </p:nvSpPr>
         <p:spPr>
           <a:xfrm>
-            <a:off x="10093898" y="2516215"/>
-            <a:ext cx="1064968" cy="183689"/>
+            <a:off x="3505706" y="3486840"/>
+            <a:ext cx="1064968" cy="322080"/>
           </a:xfrm>
           <a:prstGeom prst="roundRect">
             <a:avLst/>
@@ -26231,10 +25036,10 @@
           <a:p>
             <a:pPr algn="ctr"/>
             <a:r>
-              <a:rPr lang="en-US" sz="1100" dirty="0"/>
+              <a:rPr lang="en-US" sz="1200" dirty="0"/>
               <a:t>RUN_TIME</a:t>
             </a:r>
-            <a:endParaRPr lang="en-US" sz="1600" dirty="0"/>
+            <a:endParaRPr lang="en-US" dirty="0"/>
           </a:p>
         </p:txBody>
       </p:sp>
@@ -26252,8 +25057,8 @@
         </p:nvSpPr>
         <p:spPr>
           <a:xfrm>
-            <a:off x="3502534" y="3383059"/>
-            <a:ext cx="998420" cy="183689"/>
+            <a:off x="3502534" y="3978678"/>
+            <a:ext cx="998420" cy="322080"/>
           </a:xfrm>
           <a:prstGeom prst="roundRect">
             <a:avLst/>
@@ -26287,10 +25092,10 @@
           <a:p>
             <a:pPr algn="ctr"/>
             <a:r>
-              <a:rPr lang="en-US" sz="1100" dirty="0"/>
+              <a:rPr lang="en-US" sz="1200" dirty="0"/>
               <a:t>&lt;NAME&gt;</a:t>
             </a:r>
-            <a:endParaRPr lang="en-US" sz="1600" dirty="0"/>
+            <a:endParaRPr lang="en-US" dirty="0"/>
           </a:p>
         </p:txBody>
       </p:sp>
@@ -26308,8 +25113,8 @@
         </p:nvSpPr>
         <p:spPr>
           <a:xfrm>
-            <a:off x="4565416" y="3383059"/>
-            <a:ext cx="524699" cy="183689"/>
+            <a:off x="4565416" y="3978678"/>
+            <a:ext cx="524699" cy="322080"/>
           </a:xfrm>
           <a:prstGeom prst="roundRect">
             <a:avLst/>
@@ -26343,10 +25148,10 @@
           <a:p>
             <a:pPr algn="ctr"/>
             <a:r>
-              <a:rPr lang="en-US" sz="1100" dirty="0"/>
+              <a:rPr lang="en-US" sz="1200" dirty="0"/>
               <a:t>ALL</a:t>
             </a:r>
-            <a:endParaRPr lang="en-US" sz="1600" dirty="0"/>
+            <a:endParaRPr lang="en-US" dirty="0"/>
           </a:p>
         </p:txBody>
       </p:sp>
@@ -26364,8 +25169,8 @@
         </p:nvSpPr>
         <p:spPr>
           <a:xfrm>
-            <a:off x="3507792" y="3762539"/>
-            <a:ext cx="998420" cy="183689"/>
+            <a:off x="3507792" y="4383325"/>
+            <a:ext cx="998420" cy="322080"/>
           </a:xfrm>
           <a:prstGeom prst="roundRect">
             <a:avLst/>
@@ -26399,10 +25204,10 @@
           <a:p>
             <a:pPr algn="ctr"/>
             <a:r>
-              <a:rPr lang="en-US" sz="1100" dirty="0"/>
+              <a:rPr lang="en-US" sz="1200" dirty="0"/>
               <a:t>&lt;NAME&gt;</a:t>
             </a:r>
-            <a:endParaRPr lang="en-US" sz="1600" dirty="0"/>
+            <a:endParaRPr lang="en-US" dirty="0"/>
           </a:p>
         </p:txBody>
       </p:sp>
@@ -26420,8 +25225,8 @@
         </p:nvSpPr>
         <p:spPr>
           <a:xfrm>
-            <a:off x="4570674" y="3762539"/>
-            <a:ext cx="524699" cy="183689"/>
+            <a:off x="4570674" y="4383325"/>
+            <a:ext cx="524699" cy="322080"/>
           </a:xfrm>
           <a:prstGeom prst="roundRect">
             <a:avLst/>
@@ -26455,10 +25260,10 @@
           <a:p>
             <a:pPr algn="ctr"/>
             <a:r>
-              <a:rPr lang="en-US" sz="1100" dirty="0"/>
+              <a:rPr lang="en-US" sz="1200" dirty="0"/>
               <a:t>ALL</a:t>
             </a:r>
-            <a:endParaRPr lang="en-US" sz="1600" dirty="0"/>
+            <a:endParaRPr lang="en-US" dirty="0"/>
           </a:p>
         </p:txBody>
       </p:sp>
@@ -26476,8 +25281,8 @@
         </p:nvSpPr>
         <p:spPr>
           <a:xfrm>
-            <a:off x="3509445" y="4184550"/>
-            <a:ext cx="998420" cy="183689"/>
+            <a:off x="3509445" y="4780169"/>
+            <a:ext cx="998420" cy="322080"/>
           </a:xfrm>
           <a:prstGeom prst="roundRect">
             <a:avLst/>
@@ -26511,10 +25316,10 @@
           <a:p>
             <a:pPr algn="ctr"/>
             <a:r>
-              <a:rPr lang="en-US" sz="1100" dirty="0"/>
+              <a:rPr lang="en-US" sz="1200" dirty="0"/>
               <a:t>TOTAL</a:t>
             </a:r>
-            <a:endParaRPr lang="en-US" sz="1600" dirty="0"/>
+            <a:endParaRPr lang="en-US" dirty="0"/>
           </a:p>
         </p:txBody>
       </p:sp>
@@ -26532,8 +25337,8 @@
         </p:nvSpPr>
         <p:spPr>
           <a:xfrm>
-            <a:off x="4572327" y="4184550"/>
-            <a:ext cx="757808" cy="183689"/>
+            <a:off x="4572327" y="4780169"/>
+            <a:ext cx="757808" cy="322080"/>
           </a:xfrm>
           <a:prstGeom prst="roundRect">
             <a:avLst/>
@@ -26567,10 +25372,10 @@
           <a:p>
             <a:pPr algn="ctr"/>
             <a:r>
-              <a:rPr lang="en-US" sz="1100" dirty="0"/>
+              <a:rPr lang="en-US" sz="1200" dirty="0"/>
               <a:t>ADDED</a:t>
             </a:r>
-            <a:endParaRPr lang="en-US" sz="1600" dirty="0"/>
+            <a:endParaRPr lang="en-US" dirty="0"/>
           </a:p>
         </p:txBody>
       </p:sp>
@@ -26588,8 +25393,8 @@
         </p:nvSpPr>
         <p:spPr>
           <a:xfrm>
-            <a:off x="5396478" y="4184550"/>
-            <a:ext cx="1036683" cy="183689"/>
+            <a:off x="5396478" y="4780169"/>
+            <a:ext cx="1036683" cy="322080"/>
           </a:xfrm>
           <a:prstGeom prst="roundRect">
             <a:avLst/>
@@ -26623,10 +25428,10 @@
           <a:p>
             <a:pPr algn="ctr"/>
             <a:r>
-              <a:rPr lang="en-US" sz="1100" dirty="0"/>
+              <a:rPr lang="en-US" sz="1200" dirty="0"/>
               <a:t>REMOVED</a:t>
             </a:r>
-            <a:endParaRPr lang="en-US" sz="1600" dirty="0"/>
+            <a:endParaRPr lang="en-US" dirty="0"/>
           </a:p>
         </p:txBody>
       </p:sp>
@@ -26644,8 +25449,8 @@
         </p:nvSpPr>
         <p:spPr>
           <a:xfrm>
-            <a:off x="6497624" y="4175910"/>
-            <a:ext cx="484353" cy="183689"/>
+            <a:off x="6497624" y="4771529"/>
+            <a:ext cx="484353" cy="322080"/>
           </a:xfrm>
           <a:prstGeom prst="roundRect">
             <a:avLst/>
@@ -26679,10 +25484,10 @@
           <a:p>
             <a:pPr algn="ctr"/>
             <a:r>
-              <a:rPr lang="en-US" sz="1100" dirty="0"/>
+              <a:rPr lang="en-US" sz="1200" dirty="0"/>
               <a:t>ALL</a:t>
             </a:r>
-            <a:endParaRPr lang="en-US" sz="1600" dirty="0"/>
+            <a:endParaRPr lang="en-US" dirty="0"/>
           </a:p>
         </p:txBody>
       </p:sp>
@@ -26700,8 +25505,8 @@
         </p:nvSpPr>
         <p:spPr>
           <a:xfrm>
-            <a:off x="3502534" y="4555687"/>
-            <a:ext cx="998420" cy="183689"/>
+            <a:off x="3502534" y="5201640"/>
+            <a:ext cx="998420" cy="322080"/>
           </a:xfrm>
           <a:prstGeom prst="roundRect">
             <a:avLst/>
@@ -26735,10 +25540,10 @@
           <a:p>
             <a:pPr algn="ctr"/>
             <a:r>
-              <a:rPr lang="en-US" sz="1100" dirty="0"/>
+              <a:rPr lang="en-US" sz="1200" dirty="0"/>
               <a:t>TOTAL</a:t>
             </a:r>
-            <a:endParaRPr lang="en-US" sz="1600" dirty="0"/>
+            <a:endParaRPr lang="en-US" dirty="0"/>
           </a:p>
         </p:txBody>
       </p:sp>
@@ -26756,8 +25561,8 @@
         </p:nvSpPr>
         <p:spPr>
           <a:xfrm>
-            <a:off x="4565416" y="4555687"/>
-            <a:ext cx="757808" cy="183689"/>
+            <a:off x="4565416" y="5201640"/>
+            <a:ext cx="757808" cy="322080"/>
           </a:xfrm>
           <a:prstGeom prst="roundRect">
             <a:avLst/>
@@ -26791,10 +25596,10 @@
           <a:p>
             <a:pPr algn="ctr"/>
             <a:r>
-              <a:rPr lang="en-US" sz="1100" dirty="0"/>
+              <a:rPr lang="en-US" sz="1200" dirty="0"/>
               <a:t>ADDED</a:t>
             </a:r>
-            <a:endParaRPr lang="en-US" sz="1600" dirty="0"/>
+            <a:endParaRPr lang="en-US" dirty="0"/>
           </a:p>
         </p:txBody>
       </p:sp>
@@ -26812,8 +25617,8 @@
         </p:nvSpPr>
         <p:spPr>
           <a:xfrm>
-            <a:off x="5389567" y="4555687"/>
-            <a:ext cx="1036683" cy="183689"/>
+            <a:off x="5389567" y="5201640"/>
+            <a:ext cx="1036683" cy="322080"/>
           </a:xfrm>
           <a:prstGeom prst="roundRect">
             <a:avLst/>
@@ -26847,10 +25652,10 @@
           <a:p>
             <a:pPr algn="ctr"/>
             <a:r>
-              <a:rPr lang="en-US" sz="1100" dirty="0"/>
+              <a:rPr lang="en-US" sz="1200" dirty="0"/>
               <a:t>REMOVED</a:t>
             </a:r>
-            <a:endParaRPr lang="en-US" sz="1600" dirty="0"/>
+            <a:endParaRPr lang="en-US" dirty="0"/>
           </a:p>
         </p:txBody>
       </p:sp>
@@ -26868,8 +25673,8 @@
         </p:nvSpPr>
         <p:spPr>
           <a:xfrm>
-            <a:off x="6490713" y="4547047"/>
-            <a:ext cx="484353" cy="183689"/>
+            <a:off x="6490713" y="5193000"/>
+            <a:ext cx="484353" cy="322080"/>
           </a:xfrm>
           <a:prstGeom prst="roundRect">
             <a:avLst/>
@@ -26903,10 +25708,10 @@
           <a:p>
             <a:pPr algn="ctr"/>
             <a:r>
-              <a:rPr lang="en-US" sz="1100" dirty="0"/>
+              <a:rPr lang="en-US" sz="1200" dirty="0"/>
               <a:t>ALL</a:t>
             </a:r>
-            <a:endParaRPr lang="en-US" sz="1600" dirty="0"/>
+            <a:endParaRPr lang="en-US" dirty="0"/>
           </a:p>
         </p:txBody>
       </p:sp>
@@ -26924,8 +25729,8 @@
         </p:nvSpPr>
         <p:spPr>
           <a:xfrm>
-            <a:off x="5122359" y="2515346"/>
-            <a:ext cx="2296753" cy="183689"/>
+            <a:off x="5122359" y="2649570"/>
+            <a:ext cx="2296753" cy="322080"/>
           </a:xfrm>
           <a:prstGeom prst="roundRect">
             <a:avLst/>
@@ -26959,10 +25764,10 @@
           <a:p>
             <a:pPr algn="ctr"/>
             <a:r>
-              <a:rPr lang="en-US" sz="1100" dirty="0"/>
+              <a:rPr lang="en-US" sz="1200" dirty="0"/>
               <a:t>CRITICAL_QUALITY_RULES</a:t>
             </a:r>
-            <a:endParaRPr lang="en-US" sz="1600" dirty="0"/>
+            <a:endParaRPr lang="en-US" dirty="0"/>
           </a:p>
         </p:txBody>
       </p:sp>
@@ -26980,8 +25785,8 @@
         </p:nvSpPr>
         <p:spPr>
           <a:xfrm>
-            <a:off x="7565336" y="2516215"/>
-            <a:ext cx="2382338" cy="183689"/>
+            <a:off x="4686677" y="3490689"/>
+            <a:ext cx="2382338" cy="322080"/>
           </a:xfrm>
           <a:prstGeom prst="roundRect">
             <a:avLst/>
@@ -27015,7 +25820,7 @@
           <a:p>
             <a:pPr algn="ctr"/>
             <a:r>
-              <a:rPr lang="en-US" sz="1100" dirty="0"/>
+              <a:rPr lang="en-US" sz="1200" dirty="0"/>
               <a:t>&lt;STANDARD TAG NAME&gt;**</a:t>
             </a:r>
           </a:p>
@@ -27035,7 +25840,7 @@
         </p:nvSpPr>
         <p:spPr>
           <a:xfrm>
-            <a:off x="715662" y="5607752"/>
+            <a:off x="715662" y="6052369"/>
             <a:ext cx="10703859" cy="447383"/>
           </a:xfrm>
           <a:prstGeom prst="rect">
@@ -27063,312 +25868,22 @@
           </a:lstStyle>
           <a:p>
             <a:r>
-              <a:rPr lang="en-US" sz="1050" dirty="0"/>
+              <a:rPr lang="en-US" dirty="0"/>
               <a:t>** </a:t>
             </a:r>
             <a:r>
-              <a:rPr lang="en-GB" sz="1050" dirty="0"/>
+              <a:rPr lang="en-GB" dirty="0"/>
               <a:t>The selection of metrics by standard quality tag name should only be used for an application where the extension “Quality Standards Support” is installed. If not, no metrics will be selected and </a:t>
             </a:r>
             <a:r>
-              <a:rPr lang="en-US" sz="1050" dirty="0"/>
+              <a:rPr lang="en-US" dirty="0"/>
               <a:t>graph</a:t>
             </a:r>
             <a:r>
-              <a:rPr lang="en-GB" sz="1050" dirty="0"/>
+              <a:rPr lang="en-GB" dirty="0"/>
               <a:t> will be empty.</a:t>
             </a:r>
-            <a:endParaRPr lang="en-US" sz="1050" dirty="0"/>
-          </a:p>
-        </p:txBody>
-      </p:sp>
-      <p:sp>
-        <p:nvSpPr>
-          <p:cNvPr id="37" name="Rectangle: Rounded Corners 36">
-            <a:extLst>
-              <a:ext uri="{FF2B5EF4-FFF2-40B4-BE49-F238E27FC236}">
-                <a16:creationId xmlns:a16="http://schemas.microsoft.com/office/drawing/2014/main" id="{C396BBBA-7974-438E-80F8-9D5738774B7F}"/>
-              </a:ext>
-            </a:extLst>
-          </p:cNvPr>
-          <p:cNvSpPr/>
-          <p:nvPr/>
-        </p:nvSpPr>
-        <p:spPr>
-          <a:xfrm>
-            <a:off x="3503932" y="4993313"/>
-            <a:ext cx="998420" cy="183689"/>
-          </a:xfrm>
-          <a:prstGeom prst="roundRect">
-            <a:avLst/>
-          </a:prstGeom>
-          <a:solidFill>
-            <a:srgbClr val="7F7F7F"/>
-          </a:solidFill>
-          <a:ln>
-            <a:noFill/>
-          </a:ln>
-        </p:spPr>
-        <p:style>
-          <a:lnRef idx="2">
-            <a:schemeClr val="accent1">
-              <a:shade val="50000"/>
-            </a:schemeClr>
-          </a:lnRef>
-          <a:fillRef idx="1">
-            <a:schemeClr val="accent1"/>
-          </a:fillRef>
-          <a:effectRef idx="0">
-            <a:schemeClr val="accent1"/>
-          </a:effectRef>
-          <a:fontRef idx="minor">
-            <a:schemeClr val="lt1"/>
-          </a:fontRef>
-        </p:style>
-        <p:txBody>
-          <a:bodyPr rtlCol="0" anchor="ctr"/>
-          <a:lstStyle/>
-          <a:p>
-            <a:pPr algn="ctr"/>
-            <a:r>
-              <a:rPr lang="en-US" sz="1100" dirty="0"/>
-              <a:t>TOTAL</a:t>
-            </a:r>
-            <a:endParaRPr lang="en-US" sz="1600" dirty="0"/>
-          </a:p>
-        </p:txBody>
-      </p:sp>
-      <p:sp>
-        <p:nvSpPr>
-          <p:cNvPr id="38" name="Rectangle: Rounded Corners 37">
-            <a:extLst>
-              <a:ext uri="{FF2B5EF4-FFF2-40B4-BE49-F238E27FC236}">
-                <a16:creationId xmlns:a16="http://schemas.microsoft.com/office/drawing/2014/main" id="{3BD185FD-4AF2-4DE6-A55E-F09901FD58AF}"/>
-              </a:ext>
-            </a:extLst>
-          </p:cNvPr>
-          <p:cNvSpPr/>
-          <p:nvPr/>
-        </p:nvSpPr>
-        <p:spPr>
-          <a:xfrm>
-            <a:off x="4566814" y="4993313"/>
-            <a:ext cx="757808" cy="183689"/>
-          </a:xfrm>
-          <a:prstGeom prst="roundRect">
-            <a:avLst/>
-          </a:prstGeom>
-          <a:solidFill>
-            <a:srgbClr val="7F7F7F"/>
-          </a:solidFill>
-          <a:ln>
-            <a:noFill/>
-          </a:ln>
-        </p:spPr>
-        <p:style>
-          <a:lnRef idx="2">
-            <a:schemeClr val="accent1">
-              <a:shade val="50000"/>
-            </a:schemeClr>
-          </a:lnRef>
-          <a:fillRef idx="1">
-            <a:schemeClr val="accent1"/>
-          </a:fillRef>
-          <a:effectRef idx="0">
-            <a:schemeClr val="accent1"/>
-          </a:effectRef>
-          <a:fontRef idx="minor">
-            <a:schemeClr val="lt1"/>
-          </a:fontRef>
-        </p:style>
-        <p:txBody>
-          <a:bodyPr rtlCol="0" anchor="ctr"/>
-          <a:lstStyle/>
-          <a:p>
-            <a:pPr algn="ctr"/>
-            <a:r>
-              <a:rPr lang="en-US" sz="1100" dirty="0"/>
-              <a:t>ADDED</a:t>
-            </a:r>
-            <a:endParaRPr lang="en-US" sz="1600" dirty="0"/>
-          </a:p>
-        </p:txBody>
-      </p:sp>
-      <p:sp>
-        <p:nvSpPr>
-          <p:cNvPr id="39" name="Rectangle: Rounded Corners 38">
-            <a:extLst>
-              <a:ext uri="{FF2B5EF4-FFF2-40B4-BE49-F238E27FC236}">
-                <a16:creationId xmlns:a16="http://schemas.microsoft.com/office/drawing/2014/main" id="{3009B6B9-9E64-4D18-886D-9B154F45B614}"/>
-              </a:ext>
-            </a:extLst>
-          </p:cNvPr>
-          <p:cNvSpPr/>
-          <p:nvPr/>
-        </p:nvSpPr>
-        <p:spPr>
-          <a:xfrm>
-            <a:off x="5390965" y="4993313"/>
-            <a:ext cx="1036683" cy="183689"/>
-          </a:xfrm>
-          <a:prstGeom prst="roundRect">
-            <a:avLst/>
-          </a:prstGeom>
-          <a:solidFill>
-            <a:srgbClr val="7F7F7F"/>
-          </a:solidFill>
-          <a:ln>
-            <a:noFill/>
-          </a:ln>
-        </p:spPr>
-        <p:style>
-          <a:lnRef idx="2">
-            <a:schemeClr val="accent1">
-              <a:shade val="50000"/>
-            </a:schemeClr>
-          </a:lnRef>
-          <a:fillRef idx="1">
-            <a:schemeClr val="accent1"/>
-          </a:fillRef>
-          <a:effectRef idx="0">
-            <a:schemeClr val="accent1"/>
-          </a:effectRef>
-          <a:fontRef idx="minor">
-            <a:schemeClr val="lt1"/>
-          </a:fontRef>
-        </p:style>
-        <p:txBody>
-          <a:bodyPr rtlCol="0" anchor="ctr"/>
-          <a:lstStyle/>
-          <a:p>
-            <a:pPr algn="ctr"/>
-            <a:r>
-              <a:rPr lang="en-US" sz="1100" dirty="0"/>
-              <a:t>REMOVED</a:t>
-            </a:r>
-            <a:endParaRPr lang="en-US" sz="1600" dirty="0"/>
-          </a:p>
-        </p:txBody>
-      </p:sp>
-      <p:sp>
-        <p:nvSpPr>
-          <p:cNvPr id="40" name="Rectangle: Rounded Corners 39">
-            <a:extLst>
-              <a:ext uri="{FF2B5EF4-FFF2-40B4-BE49-F238E27FC236}">
-                <a16:creationId xmlns:a16="http://schemas.microsoft.com/office/drawing/2014/main" id="{5DA30AA2-4EBB-4EA3-BB6D-76B53008F6F3}"/>
-              </a:ext>
-            </a:extLst>
-          </p:cNvPr>
-          <p:cNvSpPr/>
-          <p:nvPr/>
-        </p:nvSpPr>
-        <p:spPr>
-          <a:xfrm>
-            <a:off x="6492111" y="4984673"/>
-            <a:ext cx="484353" cy="183689"/>
-          </a:xfrm>
-          <a:prstGeom prst="roundRect">
-            <a:avLst/>
-          </a:prstGeom>
-          <a:solidFill>
-            <a:srgbClr val="7F7F7F"/>
-          </a:solidFill>
-          <a:ln>
-            <a:noFill/>
-          </a:ln>
-        </p:spPr>
-        <p:style>
-          <a:lnRef idx="2">
-            <a:schemeClr val="accent1">
-              <a:shade val="50000"/>
-            </a:schemeClr>
-          </a:lnRef>
-          <a:fillRef idx="1">
-            <a:schemeClr val="accent1"/>
-          </a:fillRef>
-          <a:effectRef idx="0">
-            <a:schemeClr val="accent1"/>
-          </a:effectRef>
-          <a:fontRef idx="minor">
-            <a:schemeClr val="lt1"/>
-          </a:fontRef>
-        </p:style>
-        <p:txBody>
-          <a:bodyPr rtlCol="0" anchor="ctr"/>
-          <a:lstStyle/>
-          <a:p>
-            <a:pPr algn="ctr"/>
-            <a:r>
-              <a:rPr lang="en-US" sz="1100" dirty="0"/>
-              <a:t>ALL</a:t>
-            </a:r>
-            <a:endParaRPr lang="en-US" sz="1600" dirty="0"/>
-          </a:p>
-        </p:txBody>
-      </p:sp>
-      <p:sp>
-        <p:nvSpPr>
-          <p:cNvPr id="41" name="TextBox 40">
-            <a:extLst>
-              <a:ext uri="{FF2B5EF4-FFF2-40B4-BE49-F238E27FC236}">
-                <a16:creationId xmlns:a16="http://schemas.microsoft.com/office/drawing/2014/main" id="{A95BBD19-162B-4418-8A8B-34FCC1EB9E93}"/>
-              </a:ext>
-            </a:extLst>
-          </p:cNvPr>
-          <p:cNvSpPr txBox="1"/>
-          <p:nvPr/>
-        </p:nvSpPr>
-        <p:spPr>
-          <a:xfrm>
-            <a:off x="715661" y="6091311"/>
-            <a:ext cx="10703859" cy="447383"/>
-          </a:xfrm>
-          <a:prstGeom prst="rect">
-            <a:avLst/>
-          </a:prstGeom>
-        </p:spPr>
-        <p:txBody>
-          <a:bodyPr vert="horz" wrap="square" lIns="91440" tIns="45720" rIns="91440" bIns="45720" rtlCol="0" anchor="t">
-            <a:noAutofit/>
-          </a:bodyPr>
-          <a:lstStyle>
-            <a:defPPr>
-              <a:defRPr lang="en-US"/>
-            </a:defPPr>
-            <a:lvl1pPr>
-              <a:defRPr sz="1200">
-                <a:solidFill>
-                  <a:schemeClr val="tx1">
-                    <a:lumMod val="50000"/>
-                    <a:lumOff val="50000"/>
-                  </a:schemeClr>
-                </a:solidFill>
-              </a:defRPr>
-            </a:lvl1pPr>
-          </a:lstStyle>
-          <a:p>
-            <a:r>
-              <a:rPr lang="en-US" sz="1050" dirty="0"/>
-              <a:t>*** Requires installation of OMG Technical Debt Measure (&gt;2.0.0 </a:t>
-            </a:r>
-            <a:r>
-              <a:rPr lang="en-US" sz="1050" dirty="0" err="1"/>
-              <a:t>funcrel</a:t>
-            </a:r>
-            <a:r>
-              <a:rPr lang="en-US" sz="1050" dirty="0"/>
-              <a:t>) (and ISO-5055 Index extensions and/or CISQ Index extensions)</a:t>
-            </a:r>
-          </a:p>
-          <a:p>
-            <a:r>
-              <a:rPr lang="en-US" sz="1050" dirty="0"/>
-              <a:t>To get results on Omg Technical Debt on a specific metric, add the axis "METRICS=M" where M is the index id (ISO, CISQ or AIP)</a:t>
-            </a:r>
-            <a:endParaRPr lang="en-GB" sz="1050" dirty="0"/>
-          </a:p>
-          <a:p>
-            <a:endParaRPr lang="en-US" sz="1050" dirty="0"/>
+            <a:endParaRPr lang="en-US" dirty="0"/>
           </a:p>
         </p:txBody>
       </p:sp>

</xml_diff>

<commit_message>
Revert "REPORTGEN-1070: update chinese templates"
This reverts commit 7392b9584352ba8611823a9512c39b62e9cdc85d.
</commit_message>
<xml_diff>
--- a/CastReporting.Reporting.Core/Templates/zh-CN/Application/Component library/Generic Graph Definition.pptx
+++ b/CastReporting.Reporting.Core/Templates/zh-CN/Application/Component library/Generic Graph Definition.pptx
@@ -5,7 +5,7 @@
     <p:sldMasterId id="2147483648" r:id="rId1"/>
   </p:sldMasterIdLst>
   <p:notesMasterIdLst>
-    <p:notesMasterId r:id="rId13"/>
+    <p:notesMasterId r:id="rId14"/>
   </p:notesMasterIdLst>
   <p:sldIdLst>
     <p:sldId id="342" r:id="rId2"/>
@@ -19,6 +19,7 @@
     <p:sldId id="382" r:id="rId10"/>
     <p:sldId id="385" r:id="rId11"/>
     <p:sldId id="387" r:id="rId12"/>
+    <p:sldId id="388" r:id="rId13"/>
   </p:sldIdLst>
   <p:sldSz cx="12192000" cy="6858000"/>
   <p:notesSz cx="6858000" cy="9144000"/>
@@ -1083,6 +1084,485 @@
         <a:effectLst/>
       </c:spPr>
     </c:plotArea>
+    <c:plotVisOnly val="1"/>
+    <c:dispBlanksAs val="gap"/>
+    <c:showDLblsOverMax val="0"/>
+  </c:chart>
+  <c:spPr>
+    <a:noFill/>
+    <a:ln>
+      <a:noFill/>
+    </a:ln>
+    <a:effectLst/>
+  </c:spPr>
+  <c:txPr>
+    <a:bodyPr/>
+    <a:lstStyle/>
+    <a:p>
+      <a:pPr>
+        <a:defRPr/>
+      </a:pPr>
+      <a:endParaRPr lang="en-US"/>
+    </a:p>
+  </c:txPr>
+  <c:externalData r:id="rId3">
+    <c:autoUpdate val="0"/>
+  </c:externalData>
+</c:chartSpace>
+</file>
+
+<file path=ppt/charts/chart11.xml><?xml version="1.0" encoding="utf-8"?>
+<c:chartSpace xmlns:c="http://schemas.openxmlformats.org/drawingml/2006/chart" xmlns:a="http://schemas.openxmlformats.org/drawingml/2006/main" xmlns:r="http://schemas.openxmlformats.org/officeDocument/2006/relationships" xmlns:c16r2="http://schemas.microsoft.com/office/drawing/2015/06/chart">
+  <c:date1904 val="0"/>
+  <c:lang val="en-US"/>
+  <c:roundedCorners val="0"/>
+  <mc:AlternateContent xmlns:mc="http://schemas.openxmlformats.org/markup-compatibility/2006">
+    <mc:Choice xmlns:c14="http://schemas.microsoft.com/office/drawing/2007/8/2/chart" Requires="c14">
+      <c14:style val="102"/>
+    </mc:Choice>
+    <mc:Fallback>
+      <c:style val="2"/>
+    </mc:Fallback>
+  </mc:AlternateContent>
+  <c:chart>
+    <c:title>
+      <c:tx>
+        <c:rich>
+          <a:bodyPr rot="0" spcFirstLastPara="1" vertOverflow="ellipsis" vert="horz" wrap="square" anchor="ctr" anchorCtr="1"/>
+          <a:lstStyle/>
+          <a:p>
+            <a:pPr>
+              <a:defRPr sz="1000" b="1" i="0" u="none" strike="noStrike" kern="1200" spc="0" baseline="0">
+                <a:solidFill>
+                  <a:schemeClr val="tx1">
+                    <a:lumMod val="65000"/>
+                    <a:lumOff val="35000"/>
+                  </a:schemeClr>
+                </a:solidFill>
+                <a:latin typeface="+mn-lt"/>
+                <a:ea typeface="+mn-ea"/>
+                <a:cs typeface="+mn-cs"/>
+              </a:defRPr>
+            </a:pPr>
+            <a:r>
+              <a:rPr lang="fr-FR" sz="1000" b="1" dirty="0">
+                <a:effectLst/>
+              </a:rPr>
+              <a:t>ADDED AND REMOVED ISO TECHNICAL DEBT BY MODULE</a:t>
+            </a:r>
+            <a:endParaRPr lang="en-US" sz="1000" b="1" dirty="0">
+              <a:effectLst/>
+            </a:endParaRPr>
+          </a:p>
+        </c:rich>
+      </c:tx>
+      <c:overlay val="0"/>
+      <c:spPr>
+        <a:noFill/>
+        <a:ln>
+          <a:noFill/>
+        </a:ln>
+        <a:effectLst/>
+      </c:spPr>
+      <c:txPr>
+        <a:bodyPr rot="0" spcFirstLastPara="1" vertOverflow="ellipsis" vert="horz" wrap="square" anchor="ctr" anchorCtr="1"/>
+        <a:lstStyle/>
+        <a:p>
+          <a:pPr>
+            <a:defRPr sz="1000" b="1" i="0" u="none" strike="noStrike" kern="1200" spc="0" baseline="0">
+              <a:solidFill>
+                <a:schemeClr val="tx1">
+                  <a:lumMod val="65000"/>
+                  <a:lumOff val="35000"/>
+                </a:schemeClr>
+              </a:solidFill>
+              <a:latin typeface="+mn-lt"/>
+              <a:ea typeface="+mn-ea"/>
+              <a:cs typeface="+mn-cs"/>
+            </a:defRPr>
+          </a:pPr>
+          <a:endParaRPr lang="en-US"/>
+        </a:p>
+      </c:txPr>
+    </c:title>
+    <c:autoTitleDeleted val="0"/>
+    <c:plotArea>
+      <c:layout/>
+      <c:barChart>
+        <c:barDir val="bar"/>
+        <c:grouping val="clustered"/>
+        <c:varyColors val="0"/>
+        <c:ser>
+          <c:idx val="0"/>
+          <c:order val="0"/>
+          <c:tx>
+            <c:strRef>
+              <c:f>Sheet1!$B$1</c:f>
+              <c:strCache>
+                <c:ptCount val="1"/>
+                <c:pt idx="0">
+                  <c:v>Total</c:v>
+                </c:pt>
+              </c:strCache>
+            </c:strRef>
+          </c:tx>
+          <c:spPr>
+            <a:solidFill>
+              <a:schemeClr val="accent1"/>
+            </a:solidFill>
+            <a:ln>
+              <a:noFill/>
+            </a:ln>
+            <a:effectLst/>
+          </c:spPr>
+          <c:invertIfNegative val="0"/>
+          <c:cat>
+            <c:strRef>
+              <c:f>Sheet1!$A$2:$A$5</c:f>
+              <c:strCache>
+                <c:ptCount val="4"/>
+                <c:pt idx="0">
+                  <c:v>Module 1</c:v>
+                </c:pt>
+                <c:pt idx="1">
+                  <c:v>Module 2</c:v>
+                </c:pt>
+                <c:pt idx="2">
+                  <c:v>Module 3</c:v>
+                </c:pt>
+                <c:pt idx="3">
+                  <c:v>Module 4</c:v>
+                </c:pt>
+              </c:strCache>
+            </c:strRef>
+          </c:cat>
+          <c:val>
+            <c:numRef>
+              <c:f>Sheet1!$B$2:$B$5</c:f>
+              <c:numCache>
+                <c:formatCode>General</c:formatCode>
+                <c:ptCount val="4"/>
+                <c:pt idx="0">
+                  <c:v>30</c:v>
+                </c:pt>
+                <c:pt idx="1">
+                  <c:v>30</c:v>
+                </c:pt>
+                <c:pt idx="2">
+                  <c:v>30</c:v>
+                </c:pt>
+                <c:pt idx="3">
+                  <c:v>30</c:v>
+                </c:pt>
+              </c:numCache>
+            </c:numRef>
+          </c:val>
+          <c:extLst>
+            <c:ext xmlns:c16="http://schemas.microsoft.com/office/drawing/2014/chart" uri="{C3380CC4-5D6E-409C-BE32-E72D297353CC}">
+              <c16:uniqueId val="{00000000-3332-4F3C-99BE-F7E77DEDD538}"/>
+            </c:ext>
+          </c:extLst>
+        </c:ser>
+        <c:ser>
+          <c:idx val="1"/>
+          <c:order val="1"/>
+          <c:tx>
+            <c:strRef>
+              <c:f>Sheet1!$C$1</c:f>
+              <c:strCache>
+                <c:ptCount val="1"/>
+                <c:pt idx="0">
+                  <c:v>Added</c:v>
+                </c:pt>
+              </c:strCache>
+            </c:strRef>
+          </c:tx>
+          <c:spPr>
+            <a:solidFill>
+              <a:schemeClr val="accent2"/>
+            </a:solidFill>
+            <a:ln>
+              <a:noFill/>
+            </a:ln>
+            <a:effectLst/>
+          </c:spPr>
+          <c:invertIfNegative val="0"/>
+          <c:cat>
+            <c:strRef>
+              <c:f>Sheet1!$A$2:$A$5</c:f>
+              <c:strCache>
+                <c:ptCount val="4"/>
+                <c:pt idx="0">
+                  <c:v>Module 1</c:v>
+                </c:pt>
+                <c:pt idx="1">
+                  <c:v>Module 2</c:v>
+                </c:pt>
+                <c:pt idx="2">
+                  <c:v>Module 3</c:v>
+                </c:pt>
+                <c:pt idx="3">
+                  <c:v>Module 4</c:v>
+                </c:pt>
+              </c:strCache>
+            </c:strRef>
+          </c:cat>
+          <c:val>
+            <c:numRef>
+              <c:f>Sheet1!$C$2:$C$5</c:f>
+              <c:numCache>
+                <c:formatCode>General</c:formatCode>
+                <c:ptCount val="4"/>
+                <c:pt idx="0">
+                  <c:v>10</c:v>
+                </c:pt>
+                <c:pt idx="1">
+                  <c:v>10</c:v>
+                </c:pt>
+                <c:pt idx="2">
+                  <c:v>10</c:v>
+                </c:pt>
+                <c:pt idx="3">
+                  <c:v>10</c:v>
+                </c:pt>
+              </c:numCache>
+            </c:numRef>
+          </c:val>
+          <c:extLst>
+            <c:ext xmlns:c16="http://schemas.microsoft.com/office/drawing/2014/chart" uri="{C3380CC4-5D6E-409C-BE32-E72D297353CC}">
+              <c16:uniqueId val="{00000001-3332-4F3C-99BE-F7E77DEDD538}"/>
+            </c:ext>
+          </c:extLst>
+        </c:ser>
+        <c:ser>
+          <c:idx val="2"/>
+          <c:order val="2"/>
+          <c:tx>
+            <c:strRef>
+              <c:f>Sheet1!$D$1</c:f>
+              <c:strCache>
+                <c:ptCount val="1"/>
+                <c:pt idx="0">
+                  <c:v>Removed</c:v>
+                </c:pt>
+              </c:strCache>
+            </c:strRef>
+          </c:tx>
+          <c:spPr>
+            <a:solidFill>
+              <a:schemeClr val="accent3"/>
+            </a:solidFill>
+            <a:ln>
+              <a:noFill/>
+            </a:ln>
+            <a:effectLst/>
+          </c:spPr>
+          <c:invertIfNegative val="0"/>
+          <c:cat>
+            <c:strRef>
+              <c:f>Sheet1!$A$2:$A$5</c:f>
+              <c:strCache>
+                <c:ptCount val="4"/>
+                <c:pt idx="0">
+                  <c:v>Module 1</c:v>
+                </c:pt>
+                <c:pt idx="1">
+                  <c:v>Module 2</c:v>
+                </c:pt>
+                <c:pt idx="2">
+                  <c:v>Module 3</c:v>
+                </c:pt>
+                <c:pt idx="3">
+                  <c:v>Module 4</c:v>
+                </c:pt>
+              </c:strCache>
+            </c:strRef>
+          </c:cat>
+          <c:val>
+            <c:numRef>
+              <c:f>Sheet1!$D$2:$D$5</c:f>
+              <c:numCache>
+                <c:formatCode>General</c:formatCode>
+                <c:ptCount val="4"/>
+                <c:pt idx="0">
+                  <c:v>10</c:v>
+                </c:pt>
+                <c:pt idx="1">
+                  <c:v>10</c:v>
+                </c:pt>
+                <c:pt idx="2">
+                  <c:v>10</c:v>
+                </c:pt>
+                <c:pt idx="3">
+                  <c:v>10</c:v>
+                </c:pt>
+              </c:numCache>
+            </c:numRef>
+          </c:val>
+          <c:extLst>
+            <c:ext xmlns:c16="http://schemas.microsoft.com/office/drawing/2014/chart" uri="{C3380CC4-5D6E-409C-BE32-E72D297353CC}">
+              <c16:uniqueId val="{00000002-3332-4F3C-99BE-F7E77DEDD538}"/>
+            </c:ext>
+          </c:extLst>
+        </c:ser>
+        <c:dLbls>
+          <c:showLegendKey val="0"/>
+          <c:showVal val="0"/>
+          <c:showCatName val="0"/>
+          <c:showSerName val="0"/>
+          <c:showPercent val="0"/>
+          <c:showBubbleSize val="0"/>
+        </c:dLbls>
+        <c:gapWidth val="219"/>
+        <c:axId val="461299216"/>
+        <c:axId val="461299544"/>
+      </c:barChart>
+      <c:catAx>
+        <c:axId val="461299216"/>
+        <c:scaling>
+          <c:orientation val="minMax"/>
+        </c:scaling>
+        <c:delete val="0"/>
+        <c:axPos val="l"/>
+        <c:numFmt formatCode="General" sourceLinked="1"/>
+        <c:majorTickMark val="none"/>
+        <c:minorTickMark val="none"/>
+        <c:tickLblPos val="nextTo"/>
+        <c:spPr>
+          <a:noFill/>
+          <a:ln w="9525" cap="flat" cmpd="sng" algn="ctr">
+            <a:solidFill>
+              <a:schemeClr val="tx1">
+                <a:lumMod val="15000"/>
+                <a:lumOff val="85000"/>
+              </a:schemeClr>
+            </a:solidFill>
+            <a:round/>
+          </a:ln>
+          <a:effectLst/>
+        </c:spPr>
+        <c:txPr>
+          <a:bodyPr rot="-60000000" spcFirstLastPara="1" vertOverflow="ellipsis" vert="horz" wrap="square" anchor="ctr" anchorCtr="1"/>
+          <a:lstStyle/>
+          <a:p>
+            <a:pPr>
+              <a:defRPr sz="1197" b="0" i="0" u="none" strike="noStrike" kern="1200" baseline="0">
+                <a:solidFill>
+                  <a:schemeClr val="tx1">
+                    <a:lumMod val="65000"/>
+                    <a:lumOff val="35000"/>
+                  </a:schemeClr>
+                </a:solidFill>
+                <a:latin typeface="+mn-lt"/>
+                <a:ea typeface="+mn-ea"/>
+                <a:cs typeface="+mn-cs"/>
+              </a:defRPr>
+            </a:pPr>
+            <a:endParaRPr lang="en-US"/>
+          </a:p>
+        </c:txPr>
+        <c:crossAx val="461299544"/>
+        <c:crosses val="autoZero"/>
+        <c:auto val="1"/>
+        <c:lblAlgn val="ctr"/>
+        <c:lblOffset val="100"/>
+        <c:noMultiLvlLbl val="0"/>
+      </c:catAx>
+      <c:valAx>
+        <c:axId val="461299544"/>
+        <c:scaling>
+          <c:orientation val="minMax"/>
+        </c:scaling>
+        <c:delete val="0"/>
+        <c:axPos val="b"/>
+        <c:majorGridlines>
+          <c:spPr>
+            <a:ln w="9525" cap="flat" cmpd="sng" algn="ctr">
+              <a:solidFill>
+                <a:schemeClr val="tx1">
+                  <a:lumMod val="15000"/>
+                  <a:lumOff val="85000"/>
+                </a:schemeClr>
+              </a:solidFill>
+              <a:round/>
+            </a:ln>
+            <a:effectLst/>
+          </c:spPr>
+        </c:majorGridlines>
+        <c:numFmt formatCode="General" sourceLinked="1"/>
+        <c:majorTickMark val="none"/>
+        <c:minorTickMark val="none"/>
+        <c:tickLblPos val="nextTo"/>
+        <c:spPr>
+          <a:noFill/>
+          <a:ln>
+            <a:noFill/>
+          </a:ln>
+          <a:effectLst/>
+        </c:spPr>
+        <c:txPr>
+          <a:bodyPr rot="-60000000" spcFirstLastPara="1" vertOverflow="ellipsis" vert="horz" wrap="square" anchor="ctr" anchorCtr="1"/>
+          <a:lstStyle/>
+          <a:p>
+            <a:pPr>
+              <a:defRPr sz="1197" b="0" i="0" u="none" strike="noStrike" kern="1200" baseline="0">
+                <a:solidFill>
+                  <a:schemeClr val="tx1">
+                    <a:lumMod val="65000"/>
+                    <a:lumOff val="35000"/>
+                  </a:schemeClr>
+                </a:solidFill>
+                <a:latin typeface="+mn-lt"/>
+                <a:ea typeface="+mn-ea"/>
+                <a:cs typeface="+mn-cs"/>
+              </a:defRPr>
+            </a:pPr>
+            <a:endParaRPr lang="en-US"/>
+          </a:p>
+        </c:txPr>
+        <c:crossAx val="461299216"/>
+        <c:crosses val="autoZero"/>
+        <c:crossBetween val="between"/>
+      </c:valAx>
+      <c:spPr>
+        <a:noFill/>
+        <a:ln>
+          <a:noFill/>
+        </a:ln>
+        <a:effectLst/>
+      </c:spPr>
+    </c:plotArea>
+    <c:legend>
+      <c:legendPos val="b"/>
+      <c:overlay val="0"/>
+      <c:spPr>
+        <a:noFill/>
+        <a:ln>
+          <a:noFill/>
+        </a:ln>
+        <a:effectLst/>
+      </c:spPr>
+      <c:txPr>
+        <a:bodyPr rot="0" spcFirstLastPara="1" vertOverflow="ellipsis" vert="horz" wrap="square" anchor="ctr" anchorCtr="1"/>
+        <a:lstStyle/>
+        <a:p>
+          <a:pPr>
+            <a:defRPr sz="1197" b="0" i="0" u="none" strike="noStrike" kern="1200" baseline="0">
+              <a:solidFill>
+                <a:schemeClr val="tx1">
+                  <a:lumMod val="65000"/>
+                  <a:lumOff val="35000"/>
+                </a:schemeClr>
+              </a:solidFill>
+              <a:latin typeface="+mn-lt"/>
+              <a:ea typeface="+mn-ea"/>
+              <a:cs typeface="+mn-cs"/>
+            </a:defRPr>
+          </a:pPr>
+          <a:endParaRPr lang="en-US"/>
+        </a:p>
+      </c:txPr>
+    </c:legend>
     <c:plotVisOnly val="1"/>
     <c:dispBlanksAs val="gap"/>
     <c:showDLblsOverMax val="0"/>
@@ -5623,6 +6103,46 @@
 </cs:colorStyle>
 </file>
 
+<file path=ppt/charts/colors11.xml><?xml version="1.0" encoding="utf-8"?>
+<cs:colorStyle xmlns:cs="http://schemas.microsoft.com/office/drawing/2012/chartStyle" xmlns:a="http://schemas.openxmlformats.org/drawingml/2006/main" meth="cycle" id="10">
+  <a:schemeClr val="accent1"/>
+  <a:schemeClr val="accent2"/>
+  <a:schemeClr val="accent3"/>
+  <a:schemeClr val="accent4"/>
+  <a:schemeClr val="accent5"/>
+  <a:schemeClr val="accent6"/>
+  <cs:variation/>
+  <cs:variation>
+    <a:lumMod val="60000"/>
+  </cs:variation>
+  <cs:variation>
+    <a:lumMod val="80000"/>
+    <a:lumOff val="20000"/>
+  </cs:variation>
+  <cs:variation>
+    <a:lumMod val="80000"/>
+  </cs:variation>
+  <cs:variation>
+    <a:lumMod val="60000"/>
+    <a:lumOff val="40000"/>
+  </cs:variation>
+  <cs:variation>
+    <a:lumMod val="50000"/>
+  </cs:variation>
+  <cs:variation>
+    <a:lumMod val="70000"/>
+    <a:lumOff val="30000"/>
+  </cs:variation>
+  <cs:variation>
+    <a:lumMod val="70000"/>
+  </cs:variation>
+  <cs:variation>
+    <a:lumMod val="50000"/>
+    <a:lumOff val="50000"/>
+  </cs:variation>
+</cs:colorStyle>
+</file>
+
 <file path=ppt/charts/colors2.xml><?xml version="1.0" encoding="utf-8"?>
 <cs:colorStyle xmlns:cs="http://schemas.microsoft.com/office/drawing/2012/chartStyle" xmlns:a="http://schemas.openxmlformats.org/drawingml/2006/main" meth="cycle" id="10">
   <a:schemeClr val="accent1"/>
@@ -6963,6 +7483,509 @@
 </cs:chartStyle>
 </file>
 
+<file path=ppt/charts/style11.xml><?xml version="1.0" encoding="utf-8"?>
+<cs:chartStyle xmlns:cs="http://schemas.microsoft.com/office/drawing/2012/chartStyle" xmlns:a="http://schemas.openxmlformats.org/drawingml/2006/main" id="201">
+  <cs:axisTitle>
+    <cs:lnRef idx="0"/>
+    <cs:fillRef idx="0"/>
+    <cs:effectRef idx="0"/>
+    <cs:fontRef idx="minor">
+      <a:schemeClr val="tx1">
+        <a:lumMod val="65000"/>
+        <a:lumOff val="35000"/>
+      </a:schemeClr>
+    </cs:fontRef>
+    <cs:defRPr sz="1330" kern="1200"/>
+  </cs:axisTitle>
+  <cs:categoryAxis>
+    <cs:lnRef idx="0"/>
+    <cs:fillRef idx="0"/>
+    <cs:effectRef idx="0"/>
+    <cs:fontRef idx="minor">
+      <a:schemeClr val="tx1">
+        <a:lumMod val="65000"/>
+        <a:lumOff val="35000"/>
+      </a:schemeClr>
+    </cs:fontRef>
+    <cs:spPr>
+      <a:ln w="9525" cap="flat" cmpd="sng" algn="ctr">
+        <a:solidFill>
+          <a:schemeClr val="tx1">
+            <a:lumMod val="15000"/>
+            <a:lumOff val="85000"/>
+          </a:schemeClr>
+        </a:solidFill>
+        <a:round/>
+      </a:ln>
+    </cs:spPr>
+    <cs:defRPr sz="1197" kern="1200"/>
+  </cs:categoryAxis>
+  <cs:chartArea mods="allowNoFillOverride allowNoLineOverride">
+    <cs:lnRef idx="0"/>
+    <cs:fillRef idx="0"/>
+    <cs:effectRef idx="0"/>
+    <cs:fontRef idx="minor">
+      <a:schemeClr val="tx1"/>
+    </cs:fontRef>
+    <cs:spPr>
+      <a:solidFill>
+        <a:schemeClr val="bg1"/>
+      </a:solidFill>
+      <a:ln w="9525" cap="flat" cmpd="sng" algn="ctr">
+        <a:solidFill>
+          <a:schemeClr val="tx1">
+            <a:lumMod val="15000"/>
+            <a:lumOff val="85000"/>
+          </a:schemeClr>
+        </a:solidFill>
+        <a:round/>
+      </a:ln>
+    </cs:spPr>
+    <cs:defRPr sz="1330" kern="1200"/>
+  </cs:chartArea>
+  <cs:dataLabel>
+    <cs:lnRef idx="0"/>
+    <cs:fillRef idx="0"/>
+    <cs:effectRef idx="0"/>
+    <cs:fontRef idx="minor">
+      <a:schemeClr val="tx1">
+        <a:lumMod val="75000"/>
+        <a:lumOff val="25000"/>
+      </a:schemeClr>
+    </cs:fontRef>
+    <cs:defRPr sz="1197" kern="1200"/>
+  </cs:dataLabel>
+  <cs:dataLabelCallout>
+    <cs:lnRef idx="0"/>
+    <cs:fillRef idx="0"/>
+    <cs:effectRef idx="0"/>
+    <cs:fontRef idx="minor">
+      <a:schemeClr val="dk1">
+        <a:lumMod val="65000"/>
+        <a:lumOff val="35000"/>
+      </a:schemeClr>
+    </cs:fontRef>
+    <cs:spPr>
+      <a:solidFill>
+        <a:schemeClr val="lt1"/>
+      </a:solidFill>
+      <a:ln>
+        <a:solidFill>
+          <a:schemeClr val="dk1">
+            <a:lumMod val="25000"/>
+            <a:lumOff val="75000"/>
+          </a:schemeClr>
+        </a:solidFill>
+      </a:ln>
+    </cs:spPr>
+    <cs:defRPr sz="1197" kern="1200"/>
+    <cs:bodyPr rot="0" spcFirstLastPara="1" vertOverflow="clip" horzOverflow="clip" vert="horz" wrap="square" lIns="36576" tIns="18288" rIns="36576" bIns="18288" anchor="ctr" anchorCtr="1">
+      <a:spAutoFit/>
+    </cs:bodyPr>
+  </cs:dataLabelCallout>
+  <cs:dataPoint>
+    <cs:lnRef idx="0"/>
+    <cs:fillRef idx="1">
+      <cs:styleClr val="auto"/>
+    </cs:fillRef>
+    <cs:effectRef idx="0"/>
+    <cs:fontRef idx="minor">
+      <a:schemeClr val="tx1"/>
+    </cs:fontRef>
+  </cs:dataPoint>
+  <cs:dataPoint3D>
+    <cs:lnRef idx="0"/>
+    <cs:fillRef idx="1">
+      <cs:styleClr val="auto"/>
+    </cs:fillRef>
+    <cs:effectRef idx="0"/>
+    <cs:fontRef idx="minor">
+      <a:schemeClr val="tx1"/>
+    </cs:fontRef>
+  </cs:dataPoint3D>
+  <cs:dataPointLine>
+    <cs:lnRef idx="0">
+      <cs:styleClr val="auto"/>
+    </cs:lnRef>
+    <cs:fillRef idx="1"/>
+    <cs:effectRef idx="0"/>
+    <cs:fontRef idx="minor">
+      <a:schemeClr val="tx1"/>
+    </cs:fontRef>
+    <cs:spPr>
+      <a:ln w="28575" cap="rnd">
+        <a:solidFill>
+          <a:schemeClr val="phClr"/>
+        </a:solidFill>
+        <a:round/>
+      </a:ln>
+    </cs:spPr>
+  </cs:dataPointLine>
+  <cs:dataPointMarker>
+    <cs:lnRef idx="0">
+      <cs:styleClr val="auto"/>
+    </cs:lnRef>
+    <cs:fillRef idx="1">
+      <cs:styleClr val="auto"/>
+    </cs:fillRef>
+    <cs:effectRef idx="0"/>
+    <cs:fontRef idx="minor">
+      <a:schemeClr val="tx1"/>
+    </cs:fontRef>
+    <cs:spPr>
+      <a:ln w="9525">
+        <a:solidFill>
+          <a:schemeClr val="phClr"/>
+        </a:solidFill>
+      </a:ln>
+    </cs:spPr>
+  </cs:dataPointMarker>
+  <cs:dataPointMarkerLayout symbol="circle" size="5"/>
+  <cs:dataPointWireframe>
+    <cs:lnRef idx="0">
+      <cs:styleClr val="auto"/>
+    </cs:lnRef>
+    <cs:fillRef idx="1"/>
+    <cs:effectRef idx="0"/>
+    <cs:fontRef idx="minor">
+      <a:schemeClr val="tx1"/>
+    </cs:fontRef>
+    <cs:spPr>
+      <a:ln w="9525" cap="rnd">
+        <a:solidFill>
+          <a:schemeClr val="phClr"/>
+        </a:solidFill>
+        <a:round/>
+      </a:ln>
+    </cs:spPr>
+  </cs:dataPointWireframe>
+  <cs:dataTable>
+    <cs:lnRef idx="0"/>
+    <cs:fillRef idx="0"/>
+    <cs:effectRef idx="0"/>
+    <cs:fontRef idx="minor">
+      <a:schemeClr val="tx1">
+        <a:lumMod val="65000"/>
+        <a:lumOff val="35000"/>
+      </a:schemeClr>
+    </cs:fontRef>
+    <cs:spPr>
+      <a:noFill/>
+      <a:ln w="9525" cap="flat" cmpd="sng" algn="ctr">
+        <a:solidFill>
+          <a:schemeClr val="tx1">
+            <a:lumMod val="15000"/>
+            <a:lumOff val="85000"/>
+          </a:schemeClr>
+        </a:solidFill>
+        <a:round/>
+      </a:ln>
+    </cs:spPr>
+    <cs:defRPr sz="1197" kern="1200"/>
+  </cs:dataTable>
+  <cs:downBar>
+    <cs:lnRef idx="0"/>
+    <cs:fillRef idx="0"/>
+    <cs:effectRef idx="0"/>
+    <cs:fontRef idx="minor">
+      <a:schemeClr val="dk1"/>
+    </cs:fontRef>
+    <cs:spPr>
+      <a:solidFill>
+        <a:schemeClr val="dk1">
+          <a:lumMod val="65000"/>
+          <a:lumOff val="35000"/>
+        </a:schemeClr>
+      </a:solidFill>
+      <a:ln w="9525">
+        <a:solidFill>
+          <a:schemeClr val="tx1">
+            <a:lumMod val="65000"/>
+            <a:lumOff val="35000"/>
+          </a:schemeClr>
+        </a:solidFill>
+      </a:ln>
+    </cs:spPr>
+  </cs:downBar>
+  <cs:dropLine>
+    <cs:lnRef idx="0"/>
+    <cs:fillRef idx="0"/>
+    <cs:effectRef idx="0"/>
+    <cs:fontRef idx="minor">
+      <a:schemeClr val="tx1"/>
+    </cs:fontRef>
+    <cs:spPr>
+      <a:ln w="9525" cap="flat" cmpd="sng" algn="ctr">
+        <a:solidFill>
+          <a:schemeClr val="tx1">
+            <a:lumMod val="35000"/>
+            <a:lumOff val="65000"/>
+          </a:schemeClr>
+        </a:solidFill>
+        <a:round/>
+      </a:ln>
+    </cs:spPr>
+  </cs:dropLine>
+  <cs:errorBar>
+    <cs:lnRef idx="0"/>
+    <cs:fillRef idx="0"/>
+    <cs:effectRef idx="0"/>
+    <cs:fontRef idx="minor">
+      <a:schemeClr val="tx1"/>
+    </cs:fontRef>
+    <cs:spPr>
+      <a:ln w="9525" cap="flat" cmpd="sng" algn="ctr">
+        <a:solidFill>
+          <a:schemeClr val="tx1">
+            <a:lumMod val="65000"/>
+            <a:lumOff val="35000"/>
+          </a:schemeClr>
+        </a:solidFill>
+        <a:round/>
+      </a:ln>
+    </cs:spPr>
+  </cs:errorBar>
+  <cs:floor>
+    <cs:lnRef idx="0"/>
+    <cs:fillRef idx="0"/>
+    <cs:effectRef idx="0"/>
+    <cs:fontRef idx="minor">
+      <a:schemeClr val="tx1"/>
+    </cs:fontRef>
+    <cs:spPr>
+      <a:noFill/>
+      <a:ln>
+        <a:noFill/>
+      </a:ln>
+    </cs:spPr>
+  </cs:floor>
+  <cs:gridlineMajor>
+    <cs:lnRef idx="0"/>
+    <cs:fillRef idx="0"/>
+    <cs:effectRef idx="0"/>
+    <cs:fontRef idx="minor">
+      <a:schemeClr val="tx1"/>
+    </cs:fontRef>
+    <cs:spPr>
+      <a:ln w="9525" cap="flat" cmpd="sng" algn="ctr">
+        <a:solidFill>
+          <a:schemeClr val="tx1">
+            <a:lumMod val="15000"/>
+            <a:lumOff val="85000"/>
+          </a:schemeClr>
+        </a:solidFill>
+        <a:round/>
+      </a:ln>
+    </cs:spPr>
+  </cs:gridlineMajor>
+  <cs:gridlineMinor>
+    <cs:lnRef idx="0"/>
+    <cs:fillRef idx="0"/>
+    <cs:effectRef idx="0"/>
+    <cs:fontRef idx="minor">
+      <a:schemeClr val="tx1"/>
+    </cs:fontRef>
+    <cs:spPr>
+      <a:ln w="9525" cap="flat" cmpd="sng" algn="ctr">
+        <a:solidFill>
+          <a:schemeClr val="tx1">
+            <a:lumMod val="5000"/>
+            <a:lumOff val="95000"/>
+          </a:schemeClr>
+        </a:solidFill>
+        <a:round/>
+      </a:ln>
+    </cs:spPr>
+  </cs:gridlineMinor>
+  <cs:hiLoLine>
+    <cs:lnRef idx="0"/>
+    <cs:fillRef idx="0"/>
+    <cs:effectRef idx="0"/>
+    <cs:fontRef idx="minor">
+      <a:schemeClr val="tx1"/>
+    </cs:fontRef>
+    <cs:spPr>
+      <a:ln w="9525" cap="flat" cmpd="sng" algn="ctr">
+        <a:solidFill>
+          <a:schemeClr val="tx1">
+            <a:lumMod val="75000"/>
+            <a:lumOff val="25000"/>
+          </a:schemeClr>
+        </a:solidFill>
+        <a:round/>
+      </a:ln>
+    </cs:spPr>
+  </cs:hiLoLine>
+  <cs:leaderLine>
+    <cs:lnRef idx="0"/>
+    <cs:fillRef idx="0"/>
+    <cs:effectRef idx="0"/>
+    <cs:fontRef idx="minor">
+      <a:schemeClr val="tx1"/>
+    </cs:fontRef>
+    <cs:spPr>
+      <a:ln w="9525" cap="flat" cmpd="sng" algn="ctr">
+        <a:solidFill>
+          <a:schemeClr val="tx1">
+            <a:lumMod val="35000"/>
+            <a:lumOff val="65000"/>
+          </a:schemeClr>
+        </a:solidFill>
+        <a:round/>
+      </a:ln>
+    </cs:spPr>
+  </cs:leaderLine>
+  <cs:legend>
+    <cs:lnRef idx="0"/>
+    <cs:fillRef idx="0"/>
+    <cs:effectRef idx="0"/>
+    <cs:fontRef idx="minor">
+      <a:schemeClr val="tx1">
+        <a:lumMod val="65000"/>
+        <a:lumOff val="35000"/>
+      </a:schemeClr>
+    </cs:fontRef>
+    <cs:defRPr sz="1197" kern="1200"/>
+  </cs:legend>
+  <cs:plotArea mods="allowNoFillOverride allowNoLineOverride">
+    <cs:lnRef idx="0"/>
+    <cs:fillRef idx="0"/>
+    <cs:effectRef idx="0"/>
+    <cs:fontRef idx="minor">
+      <a:schemeClr val="tx1"/>
+    </cs:fontRef>
+  </cs:plotArea>
+  <cs:plotArea3D mods="allowNoFillOverride allowNoLineOverride">
+    <cs:lnRef idx="0"/>
+    <cs:fillRef idx="0"/>
+    <cs:effectRef idx="0"/>
+    <cs:fontRef idx="minor">
+      <a:schemeClr val="tx1"/>
+    </cs:fontRef>
+  </cs:plotArea3D>
+  <cs:seriesAxis>
+    <cs:lnRef idx="0"/>
+    <cs:fillRef idx="0"/>
+    <cs:effectRef idx="0"/>
+    <cs:fontRef idx="minor">
+      <a:schemeClr val="tx1">
+        <a:lumMod val="65000"/>
+        <a:lumOff val="35000"/>
+      </a:schemeClr>
+    </cs:fontRef>
+    <cs:defRPr sz="1197" kern="1200"/>
+  </cs:seriesAxis>
+  <cs:seriesLine>
+    <cs:lnRef idx="0"/>
+    <cs:fillRef idx="0"/>
+    <cs:effectRef idx="0"/>
+    <cs:fontRef idx="minor">
+      <a:schemeClr val="tx1"/>
+    </cs:fontRef>
+    <cs:spPr>
+      <a:ln w="9525" cap="flat" cmpd="sng" algn="ctr">
+        <a:solidFill>
+          <a:schemeClr val="tx1">
+            <a:lumMod val="35000"/>
+            <a:lumOff val="65000"/>
+          </a:schemeClr>
+        </a:solidFill>
+        <a:round/>
+      </a:ln>
+    </cs:spPr>
+  </cs:seriesLine>
+  <cs:title>
+    <cs:lnRef idx="0"/>
+    <cs:fillRef idx="0"/>
+    <cs:effectRef idx="0"/>
+    <cs:fontRef idx="minor">
+      <a:schemeClr val="tx1">
+        <a:lumMod val="65000"/>
+        <a:lumOff val="35000"/>
+      </a:schemeClr>
+    </cs:fontRef>
+    <cs:defRPr sz="1862" b="0" kern="1200" spc="0" baseline="0"/>
+  </cs:title>
+  <cs:trendline>
+    <cs:lnRef idx="0">
+      <cs:styleClr val="auto"/>
+    </cs:lnRef>
+    <cs:fillRef idx="0"/>
+    <cs:effectRef idx="0"/>
+    <cs:fontRef idx="minor">
+      <a:schemeClr val="tx1"/>
+    </cs:fontRef>
+    <cs:spPr>
+      <a:ln w="19050" cap="rnd">
+        <a:solidFill>
+          <a:schemeClr val="phClr"/>
+        </a:solidFill>
+        <a:prstDash val="sysDot"/>
+      </a:ln>
+    </cs:spPr>
+  </cs:trendline>
+  <cs:trendlineLabel>
+    <cs:lnRef idx="0"/>
+    <cs:fillRef idx="0"/>
+    <cs:effectRef idx="0"/>
+    <cs:fontRef idx="minor">
+      <a:schemeClr val="tx1">
+        <a:lumMod val="65000"/>
+        <a:lumOff val="35000"/>
+      </a:schemeClr>
+    </cs:fontRef>
+    <cs:defRPr sz="1197" kern="1200"/>
+  </cs:trendlineLabel>
+  <cs:upBar>
+    <cs:lnRef idx="0"/>
+    <cs:fillRef idx="0"/>
+    <cs:effectRef idx="0"/>
+    <cs:fontRef idx="minor">
+      <a:schemeClr val="dk1"/>
+    </cs:fontRef>
+    <cs:spPr>
+      <a:solidFill>
+        <a:schemeClr val="lt1"/>
+      </a:solidFill>
+      <a:ln w="9525">
+        <a:solidFill>
+          <a:schemeClr val="tx1">
+            <a:lumMod val="15000"/>
+            <a:lumOff val="85000"/>
+          </a:schemeClr>
+        </a:solidFill>
+      </a:ln>
+    </cs:spPr>
+  </cs:upBar>
+  <cs:valueAxis>
+    <cs:lnRef idx="0"/>
+    <cs:fillRef idx="0"/>
+    <cs:effectRef idx="0"/>
+    <cs:fontRef idx="minor">
+      <a:schemeClr val="tx1">
+        <a:lumMod val="65000"/>
+        <a:lumOff val="35000"/>
+      </a:schemeClr>
+    </cs:fontRef>
+    <cs:defRPr sz="1197" kern="1200"/>
+  </cs:valueAxis>
+  <cs:wall>
+    <cs:lnRef idx="0"/>
+    <cs:fillRef idx="0"/>
+    <cs:effectRef idx="0"/>
+    <cs:fontRef idx="minor">
+      <a:schemeClr val="tx1"/>
+    </cs:fontRef>
+    <cs:spPr>
+      <a:noFill/>
+      <a:ln>
+        <a:noFill/>
+      </a:ln>
+    </cs:spPr>
+  </cs:wall>
+</cs:chartStyle>
+</file>
+
 <file path=ppt/charts/style2.xml><?xml version="1.0" encoding="utf-8"?>
 <cs:chartStyle xmlns:cs="http://schemas.microsoft.com/office/drawing/2012/chartStyle" xmlns:a="http://schemas.openxmlformats.org/drawingml/2006/main" id="201">
   <cs:axisTitle>
@@ -11086,7 +12109,7 @@
           <a:p>
             <a:fld id="{BE7CF963-E58D-FC4D-BA9E-60A980752DC6}" type="datetimeFigureOut">
               <a:rPr lang="en-US" smtClean="0"/>
-              <a:t>7/21/2020</a:t>
+              <a:t>10/22/2021</a:t>
             </a:fld>
             <a:endParaRPr lang="en-US"/>
           </a:p>
@@ -11575,7 +12598,7 @@
           <a:p>
             <a:fld id="{B590C078-9131-4E49-8A0D-400FEE8377B5}" type="datetimeFigureOut">
               <a:rPr lang="en-US" smtClean="0"/>
-              <a:t>7/21/2020</a:t>
+              <a:t>10/22/2021</a:t>
             </a:fld>
             <a:endParaRPr lang="en-US"/>
           </a:p>
@@ -15160,7 +16183,7 @@
           <a:p>
             <a:fld id="{B590C078-9131-4E49-8A0D-400FEE8377B5}" type="datetimeFigureOut">
               <a:rPr lang="en-US" smtClean="0"/>
-              <a:t>7/21/2020</a:t>
+              <a:t>10/22/2021</a:t>
             </a:fld>
             <a:endParaRPr lang="en-US"/>
           </a:p>
@@ -19238,7 +20261,7 @@
           <a:p>
             <a:fld id="{B590C078-9131-4E49-8A0D-400FEE8377B5}" type="datetimeFigureOut">
               <a:rPr lang="en-US" smtClean="0"/>
-              <a:t>7/21/2020</a:t>
+              <a:t>10/22/2021</a:t>
             </a:fld>
             <a:endParaRPr lang="en-US"/>
           </a:p>
@@ -23063,7 +24086,7 @@
           <a:p>
             <a:fld id="{B590C078-9131-4E49-8A0D-400FEE8377B5}" type="datetimeFigureOut">
               <a:rPr lang="en-US" smtClean="0"/>
-              <a:t>7/21/2020</a:t>
+              <a:t>10/22/2021</a:t>
             </a:fld>
             <a:endParaRPr lang="en-US"/>
           </a:p>
@@ -23890,6 +24913,175 @@
 </p:sld>
 </file>
 
+<file path=ppt/slides/slide12.xml><?xml version="1.0" encoding="utf-8"?>
+<p:sld xmlns:a="http://schemas.openxmlformats.org/drawingml/2006/main" xmlns:r="http://schemas.openxmlformats.org/officeDocument/2006/relationships" xmlns:p="http://schemas.openxmlformats.org/presentationml/2006/main">
+  <p:cSld>
+    <p:spTree>
+      <p:nvGrpSpPr>
+        <p:cNvPr id="1" name=""/>
+        <p:cNvGrpSpPr/>
+        <p:nvPr/>
+      </p:nvGrpSpPr>
+      <p:grpSpPr>
+        <a:xfrm>
+          <a:off x="0" y="0"/>
+          <a:ext cx="0" cy="0"/>
+          <a:chOff x="0" y="0"/>
+          <a:chExt cx="0" cy="0"/>
+        </a:xfrm>
+      </p:grpSpPr>
+      <p:sp>
+        <p:nvSpPr>
+          <p:cNvPr id="2" name="Title 1"/>
+          <p:cNvSpPr>
+            <a:spLocks noGrp="1"/>
+          </p:cNvSpPr>
+          <p:nvPr>
+            <p:ph type="title"/>
+          </p:nvPr>
+        </p:nvSpPr>
+        <p:spPr/>
+        <p:txBody>
+          <a:bodyPr/>
+          <a:lstStyle/>
+          <a:p>
+            <a:r>
+              <a:rPr lang="en-US" dirty="0"/>
+              <a:t>Stacked Bar</a:t>
+            </a:r>
+          </a:p>
+        </p:txBody>
+      </p:sp>
+      <p:sp>
+        <p:nvSpPr>
+          <p:cNvPr id="4" name="Text Placeholder 2"/>
+          <p:cNvSpPr>
+            <a:spLocks noGrp="1"/>
+          </p:cNvSpPr>
+          <p:nvPr>
+            <p:ph type="body" sz="quarter" idx="13"/>
+          </p:nvPr>
+        </p:nvSpPr>
+        <p:spPr>
+          <a:xfrm>
+            <a:off x="642730" y="980148"/>
+            <a:ext cx="10939670" cy="400110"/>
+          </a:xfrm>
+        </p:spPr>
+        <p:txBody>
+          <a:bodyPr>
+            <a:normAutofit/>
+          </a:bodyPr>
+          <a:lstStyle/>
+          <a:p>
+            <a:r>
+              <a:rPr lang="en-US" sz="1200" dirty="0"/>
+              <a:t>GRAPH;GENERIC_GRAPH;COL1=OMG_TECHNICAL_DEBT,ROW1=MODULES,MODULES=ALL,OMG_TECHNICAL_DEBT=ALL,METRICS=ISO</a:t>
+            </a:r>
+          </a:p>
+        </p:txBody>
+      </p:sp>
+      <p:graphicFrame>
+        <p:nvGraphicFramePr>
+          <p:cNvPr id="6" name="Chart 5" descr="GRAPH;GENERIC_GRAPH;COL1=OMG_TECHNICAL_DEBT,ROW1=MODULES,MODULES=ALL,OMG_TECHNICAL_DEBT=ALL,METRICS=ISO"/>
+          <p:cNvGraphicFramePr/>
+          <p:nvPr>
+            <p:extLst>
+              <p:ext uri="{D42A27DB-BD31-4B8C-83A1-F6EECF244321}">
+                <p14:modId xmlns:p14="http://schemas.microsoft.com/office/powerpoint/2010/main" val="3323507612"/>
+              </p:ext>
+            </p:extLst>
+          </p:nvPr>
+        </p:nvGraphicFramePr>
+        <p:xfrm>
+          <a:off x="3030070" y="2207640"/>
+          <a:ext cx="5486399" cy="3081535"/>
+        </p:xfrm>
+        <a:graphic>
+          <a:graphicData uri="http://schemas.openxmlformats.org/drawingml/2006/chart">
+            <c:chart xmlns:c="http://schemas.openxmlformats.org/drawingml/2006/chart" xmlns:r="http://schemas.openxmlformats.org/officeDocument/2006/relationships" r:id="rId2"/>
+          </a:graphicData>
+        </a:graphic>
+      </p:graphicFrame>
+      <p:sp>
+        <p:nvSpPr>
+          <p:cNvPr id="5" name="TextBox 4">
+            <a:extLst>
+              <a:ext uri="{FF2B5EF4-FFF2-40B4-BE49-F238E27FC236}">
+                <a16:creationId xmlns:a16="http://schemas.microsoft.com/office/drawing/2014/main" id="{4297E9E4-3047-4638-9BBD-767D8D1A1D78}"/>
+              </a:ext>
+            </a:extLst>
+          </p:cNvPr>
+          <p:cNvSpPr txBox="1"/>
+          <p:nvPr/>
+        </p:nvSpPr>
+        <p:spPr>
+          <a:xfrm>
+            <a:off x="1069344" y="1380258"/>
+            <a:ext cx="10703859" cy="447383"/>
+          </a:xfrm>
+          <a:prstGeom prst="rect">
+            <a:avLst/>
+          </a:prstGeom>
+        </p:spPr>
+        <p:txBody>
+          <a:bodyPr vert="horz" wrap="square" lIns="91440" tIns="45720" rIns="91440" bIns="45720" rtlCol="0" anchor="t">
+            <a:noAutofit/>
+          </a:bodyPr>
+          <a:lstStyle>
+            <a:defPPr>
+              <a:defRPr lang="en-US"/>
+            </a:defPPr>
+            <a:lvl1pPr>
+              <a:defRPr sz="1200">
+                <a:solidFill>
+                  <a:schemeClr val="tx1">
+                    <a:lumMod val="50000"/>
+                    <a:lumOff val="50000"/>
+                  </a:schemeClr>
+                </a:solidFill>
+              </a:defRPr>
+            </a:lvl1pPr>
+          </a:lstStyle>
+          <a:p>
+            <a:r>
+              <a:rPr lang="en-US" sz="1100" dirty="0"/>
+              <a:t>*** Requires installation of OMG Technical Debt Measure (&gt;2.0.0 </a:t>
+            </a:r>
+            <a:r>
+              <a:rPr lang="en-US" sz="1100" dirty="0" err="1"/>
+              <a:t>funcrel</a:t>
+            </a:r>
+            <a:r>
+              <a:rPr lang="en-US" sz="1100" dirty="0"/>
+              <a:t>) (and ISO-5055 Index extensions and/or CISQ Index extensions)</a:t>
+            </a:r>
+          </a:p>
+          <a:p>
+            <a:r>
+              <a:rPr lang="en-US" sz="1100" dirty="0"/>
+              <a:t>To get results on Omg Technical Debt on a specific metric, add the axis "METRICS=M" where M is the index id (ISO, CISQ or AIP)</a:t>
+            </a:r>
+            <a:endParaRPr lang="en-GB" sz="1100" dirty="0"/>
+          </a:p>
+          <a:p>
+            <a:endParaRPr lang="en-US" sz="1100" dirty="0"/>
+          </a:p>
+        </p:txBody>
+      </p:sp>
+    </p:spTree>
+    <p:extLst>
+      <p:ext uri="{BB962C8B-B14F-4D97-AF65-F5344CB8AC3E}">
+        <p14:creationId xmlns:p14="http://schemas.microsoft.com/office/powerpoint/2010/main" val="2256376819"/>
+      </p:ext>
+    </p:extLst>
+  </p:cSld>
+  <p:clrMapOvr>
+    <a:masterClrMapping/>
+  </p:clrMapOvr>
+</p:sld>
+</file>
+
 <file path=ppt/slides/slide2.xml><?xml version="1.0" encoding="utf-8"?>
 <p:sld xmlns:a="http://schemas.openxmlformats.org/drawingml/2006/main" xmlns:r="http://schemas.openxmlformats.org/officeDocument/2006/relationships" xmlns:p="http://schemas.openxmlformats.org/presentationml/2006/main">
   <p:cSld>
@@ -23967,7 +25159,7 @@
         </p:nvSpPr>
         <p:spPr>
           <a:xfrm>
-            <a:off x="744070" y="5764646"/>
+            <a:off x="744070" y="5378752"/>
             <a:ext cx="10703859" cy="367553"/>
           </a:xfrm>
           <a:prstGeom prst="rect">
@@ -23981,7 +25173,7 @@
           <a:lstStyle/>
           <a:p>
             <a:r>
-              <a:rPr lang="en-US" sz="1200" dirty="0">
+              <a:rPr lang="en-US" sz="1050" dirty="0">
                 <a:solidFill>
                   <a:schemeClr val="tx1">
                     <a:lumMod val="50000"/>
@@ -23992,7 +25184,7 @@
               <a:t>* To get results on violations or critical violations on a specific metrics, add the axis “METRICS=M” where M is a metric id from quality model (</a:t>
             </a:r>
             <a:r>
-              <a:rPr lang="en-US" sz="1200" dirty="0" err="1">
+              <a:rPr lang="en-US" sz="1050" dirty="0" err="1">
                 <a:solidFill>
                   <a:schemeClr val="tx1">
                     <a:lumMod val="50000"/>
@@ -24003,7 +25195,7 @@
               <a:t>eg</a:t>
             </a:r>
             <a:r>
-              <a:rPr lang="en-US" sz="1200" dirty="0">
+              <a:rPr lang="en-US" sz="1050" dirty="0">
                 <a:solidFill>
                   <a:schemeClr val="tx1">
                     <a:lumMod val="50000"/>
@@ -24035,7 +25227,7 @@
         <p:spPr>
           <a:xfrm>
             <a:off x="328706" y="1333500"/>
-            <a:ext cx="11253694" cy="4351338"/>
+            <a:ext cx="11253694" cy="4063593"/>
           </a:xfrm>
         </p:spPr>
         <p:txBody>
@@ -24048,13 +25240,13 @@
               <a:buNone/>
             </a:pPr>
             <a:r>
-              <a:rPr lang="en-US" dirty="0"/>
+              <a:rPr lang="en-US" sz="1600" dirty="0"/>
               <a:t>AXIS					VALUES</a:t>
             </a:r>
           </a:p>
           <a:p>
             <a:r>
-              <a:rPr lang="fr-FR" dirty="0">
+              <a:rPr lang="fr-FR" sz="1600" dirty="0">
                 <a:solidFill>
                   <a:schemeClr val="accent5">
                     <a:lumMod val="75000"/>
@@ -24066,7 +25258,7 @@
           </a:p>
           <a:p>
             <a:r>
-              <a:rPr lang="fr-FR" dirty="0">
+              <a:rPr lang="fr-FR" sz="1600" dirty="0">
                 <a:solidFill>
                   <a:schemeClr val="accent2"/>
                 </a:solidFill>
@@ -24075,29 +25267,22 @@
             </a:r>
           </a:p>
           <a:p>
-            <a:endParaRPr lang="fr-FR" dirty="0">
+            <a:endParaRPr lang="fr-FR" sz="1600" dirty="0">
               <a:solidFill>
                 <a:schemeClr val="accent3"/>
               </a:solidFill>
             </a:endParaRPr>
           </a:p>
           <a:p>
-            <a:endParaRPr lang="fr-FR" dirty="0">
+            <a:endParaRPr lang="fr-FR" sz="1600" dirty="0">
               <a:solidFill>
                 <a:schemeClr val="accent3"/>
               </a:solidFill>
             </a:endParaRPr>
           </a:p>
           <a:p>
-            <a:endParaRPr lang="fr-FR" dirty="0">
-              <a:solidFill>
-                <a:schemeClr val="accent3"/>
-              </a:solidFill>
-            </a:endParaRPr>
-          </a:p>
-          <a:p>
-            <a:r>
-              <a:rPr lang="fr-FR" dirty="0">
+            <a:r>
+              <a:rPr lang="fr-FR" sz="1600" dirty="0">
                 <a:solidFill>
                   <a:schemeClr val="accent3"/>
                 </a:solidFill>
@@ -24107,7 +25292,7 @@
           </a:p>
           <a:p>
             <a:r>
-              <a:rPr lang="fr-FR" dirty="0">
+              <a:rPr lang="fr-FR" sz="1600" dirty="0">
                 <a:solidFill>
                   <a:schemeClr val="accent6"/>
                 </a:solidFill>
@@ -24117,7 +25302,7 @@
           </a:p>
           <a:p>
             <a:r>
-              <a:rPr lang="fr-FR" dirty="0">
+              <a:rPr lang="fr-FR" sz="1600" dirty="0">
                 <a:solidFill>
                   <a:srgbClr val="00B0F0"/>
                 </a:solidFill>
@@ -24127,12 +25312,22 @@
           </a:p>
           <a:p>
             <a:r>
-              <a:rPr lang="fr-FR" dirty="0">
+              <a:rPr lang="fr-FR" sz="1600" dirty="0">
                 <a:solidFill>
                   <a:schemeClr val="accent1"/>
                 </a:solidFill>
               </a:rPr>
               <a:t>CRITICAL_VIOLATIONS *</a:t>
+            </a:r>
+          </a:p>
+          <a:p>
+            <a:r>
+              <a:rPr lang="fr-FR" sz="1600" dirty="0">
+                <a:solidFill>
+                  <a:srgbClr val="7F7F7F"/>
+                </a:solidFill>
+              </a:rPr>
+              <a:t>OMG_TECHNICAL_DEBT***</a:t>
             </a:r>
           </a:p>
         </p:txBody>
@@ -24152,7 +25347,7 @@
         <p:spPr>
           <a:xfrm>
             <a:off x="3477775" y="1767155"/>
-            <a:ext cx="998420" cy="322080"/>
+            <a:ext cx="998420" cy="183689"/>
           </a:xfrm>
           <a:prstGeom prst="roundRect">
             <a:avLst/>
@@ -24188,10 +25383,10 @@
           <a:p>
             <a:pPr algn="ctr"/>
             <a:r>
-              <a:rPr lang="en-US" sz="1200" dirty="0"/>
+              <a:rPr lang="en-US" sz="1100" dirty="0"/>
               <a:t>CURRENT</a:t>
             </a:r>
-            <a:endParaRPr lang="en-US" dirty="0"/>
+            <a:endParaRPr lang="en-US" sz="1600" dirty="0"/>
           </a:p>
         </p:txBody>
       </p:sp>
@@ -24210,7 +25405,7 @@
         <p:spPr>
           <a:xfrm>
             <a:off x="4540657" y="1767155"/>
-            <a:ext cx="1102877" cy="322080"/>
+            <a:ext cx="1102877" cy="183689"/>
           </a:xfrm>
           <a:prstGeom prst="roundRect">
             <a:avLst/>
@@ -24246,10 +25441,10 @@
           <a:p>
             <a:pPr algn="ctr"/>
             <a:r>
-              <a:rPr lang="en-US" sz="1200" dirty="0"/>
+              <a:rPr lang="en-US" sz="1100" dirty="0"/>
               <a:t>PREVIOUS</a:t>
             </a:r>
-            <a:endParaRPr lang="en-US" dirty="0"/>
+            <a:endParaRPr lang="en-US" sz="1600" dirty="0"/>
           </a:p>
         </p:txBody>
       </p:sp>
@@ -24268,7 +25463,7 @@
         <p:spPr>
           <a:xfrm>
             <a:off x="5707996" y="1767155"/>
-            <a:ext cx="719193" cy="322080"/>
+            <a:ext cx="719193" cy="183689"/>
           </a:xfrm>
           <a:prstGeom prst="roundRect">
             <a:avLst/>
@@ -24304,10 +25499,10 @@
           <a:p>
             <a:pPr algn="ctr"/>
             <a:r>
-              <a:rPr lang="en-US" sz="1200" dirty="0"/>
+              <a:rPr lang="en-US" sz="1100" dirty="0"/>
               <a:t>EVOL</a:t>
             </a:r>
-            <a:endParaRPr lang="en-US" dirty="0"/>
+            <a:endParaRPr lang="en-US" sz="1600" dirty="0"/>
           </a:p>
         </p:txBody>
       </p:sp>
@@ -24326,7 +25521,7 @@
         <p:spPr>
           <a:xfrm>
             <a:off x="6491651" y="1767155"/>
-            <a:ext cx="1510302" cy="322080"/>
+            <a:ext cx="1510302" cy="183689"/>
           </a:xfrm>
           <a:prstGeom prst="roundRect">
             <a:avLst/>
@@ -24362,10 +25557,10 @@
           <a:p>
             <a:pPr algn="ctr"/>
             <a:r>
-              <a:rPr lang="en-US" sz="1200" dirty="0"/>
+              <a:rPr lang="en-US" sz="1100" dirty="0"/>
               <a:t>EVOL_PERCENT</a:t>
             </a:r>
-            <a:endParaRPr lang="en-US" dirty="0"/>
+            <a:endParaRPr lang="en-US" sz="1600" dirty="0"/>
           </a:p>
         </p:txBody>
       </p:sp>
@@ -24384,7 +25579,7 @@
         <p:spPr>
           <a:xfrm>
             <a:off x="8066415" y="1767155"/>
-            <a:ext cx="539991" cy="322080"/>
+            <a:ext cx="539991" cy="183689"/>
           </a:xfrm>
           <a:prstGeom prst="roundRect">
             <a:avLst/>
@@ -24420,10 +25615,10 @@
           <a:p>
             <a:pPr algn="ctr"/>
             <a:r>
-              <a:rPr lang="en-US" sz="1200" dirty="0"/>
+              <a:rPr lang="en-US" sz="1100" dirty="0"/>
               <a:t>ALL</a:t>
             </a:r>
-            <a:endParaRPr lang="en-US" dirty="0"/>
+            <a:endParaRPr lang="en-US" sz="1600" dirty="0"/>
           </a:p>
         </p:txBody>
       </p:sp>
@@ -24442,7 +25637,7 @@
         <p:spPr>
           <a:xfrm>
             <a:off x="3493539" y="2203333"/>
-            <a:ext cx="560589" cy="322080"/>
+            <a:ext cx="560589" cy="183689"/>
           </a:xfrm>
           <a:prstGeom prst="roundRect">
             <a:avLst/>
@@ -24476,10 +25671,10 @@
           <a:p>
             <a:pPr algn="ctr"/>
             <a:r>
-              <a:rPr lang="en-US" sz="1200" dirty="0"/>
+              <a:rPr lang="en-US" sz="1100" dirty="0"/>
               <a:t>&lt;ID&gt;</a:t>
             </a:r>
-            <a:endParaRPr lang="en-US" dirty="0"/>
+            <a:endParaRPr lang="en-US" sz="1600" dirty="0"/>
           </a:p>
         </p:txBody>
       </p:sp>
@@ -24498,7 +25693,7 @@
         <p:spPr>
           <a:xfrm>
             <a:off x="4121612" y="2203333"/>
-            <a:ext cx="1540708" cy="322080"/>
+            <a:ext cx="1540708" cy="183689"/>
           </a:xfrm>
           <a:prstGeom prst="roundRect">
             <a:avLst/>
@@ -24532,10 +25727,10 @@
           <a:p>
             <a:pPr algn="ctr"/>
             <a:r>
-              <a:rPr lang="en-US" sz="1200" dirty="0"/>
+              <a:rPr lang="en-US" sz="1100" dirty="0"/>
               <a:t>HEALTH_FACTOR</a:t>
             </a:r>
-            <a:endParaRPr lang="en-US" dirty="0"/>
+            <a:endParaRPr lang="en-US" sz="1600" dirty="0"/>
           </a:p>
         </p:txBody>
       </p:sp>
@@ -24554,7 +25749,7 @@
         <p:spPr>
           <a:xfrm>
             <a:off x="5729804" y="2203333"/>
-            <a:ext cx="1790858" cy="322080"/>
+            <a:ext cx="1790858" cy="183689"/>
           </a:xfrm>
           <a:prstGeom prst="roundRect">
             <a:avLst/>
@@ -24588,10 +25783,10 @@
           <a:p>
             <a:pPr algn="ctr"/>
             <a:r>
-              <a:rPr lang="en-US" sz="1200" dirty="0"/>
+              <a:rPr lang="en-US" sz="1100" dirty="0"/>
               <a:t>BUSINESS_CRITERIA</a:t>
             </a:r>
-            <a:endParaRPr lang="en-US" dirty="0"/>
+            <a:endParaRPr lang="en-US" sz="1600" dirty="0"/>
           </a:p>
         </p:txBody>
       </p:sp>
@@ -24610,7 +25805,7 @@
         <p:spPr>
           <a:xfrm>
             <a:off x="7588146" y="2203333"/>
-            <a:ext cx="1887485" cy="322080"/>
+            <a:ext cx="1887485" cy="183689"/>
           </a:xfrm>
           <a:prstGeom prst="roundRect">
             <a:avLst/>
@@ -24644,10 +25839,10 @@
           <a:p>
             <a:pPr algn="ctr"/>
             <a:r>
-              <a:rPr lang="en-US" sz="1200" dirty="0"/>
+              <a:rPr lang="en-US" sz="1100" dirty="0"/>
               <a:t>TECHNICAL_CRITERIA</a:t>
             </a:r>
-            <a:endParaRPr lang="en-US" dirty="0"/>
+            <a:endParaRPr lang="en-US" sz="1600" dirty="0"/>
           </a:p>
         </p:txBody>
       </p:sp>
@@ -24665,8 +25860,8 @@
         </p:nvSpPr>
         <p:spPr>
           <a:xfrm>
-            <a:off x="3505085" y="2639376"/>
-            <a:ext cx="1500390" cy="322080"/>
+            <a:off x="3505085" y="2505152"/>
+            <a:ext cx="1500390" cy="183689"/>
           </a:xfrm>
           <a:prstGeom prst="roundRect">
             <a:avLst/>
@@ -24700,10 +25895,10 @@
           <a:p>
             <a:pPr algn="ctr"/>
             <a:r>
-              <a:rPr lang="en-US" sz="1200" dirty="0"/>
+              <a:rPr lang="en-US" sz="1100" dirty="0"/>
               <a:t>QUALITY_RULES</a:t>
             </a:r>
-            <a:endParaRPr lang="en-US" dirty="0"/>
+            <a:endParaRPr lang="en-US" sz="1600" dirty="0"/>
           </a:p>
         </p:txBody>
       </p:sp>
@@ -24721,8 +25916,8 @@
         </p:nvSpPr>
         <p:spPr>
           <a:xfrm>
-            <a:off x="3505706" y="3074009"/>
-            <a:ext cx="1769278" cy="322080"/>
+            <a:off x="3505706" y="2822339"/>
+            <a:ext cx="1769278" cy="183689"/>
           </a:xfrm>
           <a:prstGeom prst="roundRect">
             <a:avLst/>
@@ -24756,10 +25951,10 @@
           <a:p>
             <a:pPr algn="ctr"/>
             <a:r>
-              <a:rPr lang="en-US" sz="1200" dirty="0"/>
+              <a:rPr lang="en-US" sz="1100" dirty="0"/>
               <a:t>TECHNICAL_SIZING</a:t>
             </a:r>
-            <a:endParaRPr lang="en-US" dirty="0"/>
+            <a:endParaRPr lang="en-US" sz="1600" dirty="0"/>
           </a:p>
         </p:txBody>
       </p:sp>
@@ -24777,8 +25972,8 @@
         </p:nvSpPr>
         <p:spPr>
           <a:xfrm>
-            <a:off x="5336329" y="3074009"/>
-            <a:ext cx="1913713" cy="322080"/>
+            <a:off x="5336329" y="2822339"/>
+            <a:ext cx="1913713" cy="183689"/>
           </a:xfrm>
           <a:prstGeom prst="roundRect">
             <a:avLst/>
@@ -24812,10 +26007,10 @@
           <a:p>
             <a:pPr algn="ctr"/>
             <a:r>
-              <a:rPr lang="en-US" sz="1200" dirty="0"/>
+              <a:rPr lang="en-US" sz="1100" dirty="0"/>
               <a:t>FUNCTIONAL_WEIGHT</a:t>
             </a:r>
-            <a:endParaRPr lang="en-US" dirty="0"/>
+            <a:endParaRPr lang="en-US" sz="1600" dirty="0"/>
           </a:p>
         </p:txBody>
       </p:sp>
@@ -24833,8 +26028,8 @@
         </p:nvSpPr>
         <p:spPr>
           <a:xfrm>
-            <a:off x="7311387" y="3074009"/>
-            <a:ext cx="1608804" cy="322080"/>
+            <a:off x="7311387" y="2822339"/>
+            <a:ext cx="1608804" cy="183689"/>
           </a:xfrm>
           <a:prstGeom prst="roundRect">
             <a:avLst/>
@@ -24868,10 +26063,10 @@
           <a:p>
             <a:pPr algn="ctr"/>
             <a:r>
-              <a:rPr lang="en-US" sz="1200" dirty="0"/>
+              <a:rPr lang="en-US" sz="1100" strike="sngStrike" dirty="0"/>
               <a:t>TECHNICAL_DEBT</a:t>
             </a:r>
-            <a:endParaRPr lang="en-US" dirty="0"/>
+            <a:endParaRPr lang="en-US" sz="1600" strike="sngStrike" dirty="0"/>
           </a:p>
         </p:txBody>
       </p:sp>
@@ -24889,8 +26084,8 @@
         </p:nvSpPr>
         <p:spPr>
           <a:xfrm>
-            <a:off x="8981536" y="3074009"/>
-            <a:ext cx="1064968" cy="322080"/>
+            <a:off x="8981536" y="2822339"/>
+            <a:ext cx="1064968" cy="183689"/>
           </a:xfrm>
           <a:prstGeom prst="roundRect">
             <a:avLst/>
@@ -24924,10 +26119,10 @@
           <a:p>
             <a:pPr algn="ctr"/>
             <a:r>
-              <a:rPr lang="en-US" sz="1200" dirty="0"/>
+              <a:rPr lang="en-US" sz="1100" dirty="0"/>
               <a:t>VIOLATION</a:t>
             </a:r>
-            <a:endParaRPr lang="en-US" dirty="0"/>
+            <a:endParaRPr lang="en-US" sz="1600" dirty="0"/>
           </a:p>
         </p:txBody>
       </p:sp>
@@ -24945,8 +26140,8 @@
         </p:nvSpPr>
         <p:spPr>
           <a:xfrm>
-            <a:off x="10107848" y="3074009"/>
-            <a:ext cx="1813035" cy="322080"/>
+            <a:off x="10107848" y="2822339"/>
+            <a:ext cx="1813035" cy="183689"/>
           </a:xfrm>
           <a:prstGeom prst="roundRect">
             <a:avLst/>
@@ -24980,10 +26175,10 @@
           <a:p>
             <a:pPr algn="ctr"/>
             <a:r>
-              <a:rPr lang="en-US" sz="1200" dirty="0"/>
+              <a:rPr lang="en-US" sz="1100" dirty="0"/>
               <a:t>CRITICAL_VIOLATION</a:t>
             </a:r>
-            <a:endParaRPr lang="en-US" dirty="0"/>
+            <a:endParaRPr lang="en-US" sz="1600" dirty="0"/>
           </a:p>
         </p:txBody>
       </p:sp>
@@ -25001,8 +26196,8 @@
         </p:nvSpPr>
         <p:spPr>
           <a:xfrm>
-            <a:off x="3505706" y="3486840"/>
-            <a:ext cx="1064968" cy="322080"/>
+            <a:off x="10093898" y="2516215"/>
+            <a:ext cx="1064968" cy="183689"/>
           </a:xfrm>
           <a:prstGeom prst="roundRect">
             <a:avLst/>
@@ -25036,10 +26231,10 @@
           <a:p>
             <a:pPr algn="ctr"/>
             <a:r>
-              <a:rPr lang="en-US" sz="1200" dirty="0"/>
+              <a:rPr lang="en-US" sz="1100" dirty="0"/>
               <a:t>RUN_TIME</a:t>
             </a:r>
-            <a:endParaRPr lang="en-US" dirty="0"/>
+            <a:endParaRPr lang="en-US" sz="1600" dirty="0"/>
           </a:p>
         </p:txBody>
       </p:sp>
@@ -25057,8 +26252,8 @@
         </p:nvSpPr>
         <p:spPr>
           <a:xfrm>
-            <a:off x="3502534" y="3978678"/>
-            <a:ext cx="998420" cy="322080"/>
+            <a:off x="3502534" y="3383059"/>
+            <a:ext cx="998420" cy="183689"/>
           </a:xfrm>
           <a:prstGeom prst="roundRect">
             <a:avLst/>
@@ -25092,10 +26287,10 @@
           <a:p>
             <a:pPr algn="ctr"/>
             <a:r>
-              <a:rPr lang="en-US" sz="1200" dirty="0"/>
+              <a:rPr lang="en-US" sz="1100" dirty="0"/>
               <a:t>&lt;NAME&gt;</a:t>
             </a:r>
-            <a:endParaRPr lang="en-US" dirty="0"/>
+            <a:endParaRPr lang="en-US" sz="1600" dirty="0"/>
           </a:p>
         </p:txBody>
       </p:sp>
@@ -25113,8 +26308,8 @@
         </p:nvSpPr>
         <p:spPr>
           <a:xfrm>
-            <a:off x="4565416" y="3978678"/>
-            <a:ext cx="524699" cy="322080"/>
+            <a:off x="4565416" y="3383059"/>
+            <a:ext cx="524699" cy="183689"/>
           </a:xfrm>
           <a:prstGeom prst="roundRect">
             <a:avLst/>
@@ -25148,10 +26343,10 @@
           <a:p>
             <a:pPr algn="ctr"/>
             <a:r>
-              <a:rPr lang="en-US" sz="1200" dirty="0"/>
+              <a:rPr lang="en-US" sz="1100" dirty="0"/>
               <a:t>ALL</a:t>
             </a:r>
-            <a:endParaRPr lang="en-US" dirty="0"/>
+            <a:endParaRPr lang="en-US" sz="1600" dirty="0"/>
           </a:p>
         </p:txBody>
       </p:sp>
@@ -25169,8 +26364,8 @@
         </p:nvSpPr>
         <p:spPr>
           <a:xfrm>
-            <a:off x="3507792" y="4383325"/>
-            <a:ext cx="998420" cy="322080"/>
+            <a:off x="3507792" y="3762539"/>
+            <a:ext cx="998420" cy="183689"/>
           </a:xfrm>
           <a:prstGeom prst="roundRect">
             <a:avLst/>
@@ -25204,10 +26399,10 @@
           <a:p>
             <a:pPr algn="ctr"/>
             <a:r>
-              <a:rPr lang="en-US" sz="1200" dirty="0"/>
+              <a:rPr lang="en-US" sz="1100" dirty="0"/>
               <a:t>&lt;NAME&gt;</a:t>
             </a:r>
-            <a:endParaRPr lang="en-US" dirty="0"/>
+            <a:endParaRPr lang="en-US" sz="1600" dirty="0"/>
           </a:p>
         </p:txBody>
       </p:sp>
@@ -25225,8 +26420,8 @@
         </p:nvSpPr>
         <p:spPr>
           <a:xfrm>
-            <a:off x="4570674" y="4383325"/>
-            <a:ext cx="524699" cy="322080"/>
+            <a:off x="4570674" y="3762539"/>
+            <a:ext cx="524699" cy="183689"/>
           </a:xfrm>
           <a:prstGeom prst="roundRect">
             <a:avLst/>
@@ -25260,10 +26455,10 @@
           <a:p>
             <a:pPr algn="ctr"/>
             <a:r>
-              <a:rPr lang="en-US" sz="1200" dirty="0"/>
+              <a:rPr lang="en-US" sz="1100" dirty="0"/>
               <a:t>ALL</a:t>
             </a:r>
-            <a:endParaRPr lang="en-US" dirty="0"/>
+            <a:endParaRPr lang="en-US" sz="1600" dirty="0"/>
           </a:p>
         </p:txBody>
       </p:sp>
@@ -25281,8 +26476,8 @@
         </p:nvSpPr>
         <p:spPr>
           <a:xfrm>
-            <a:off x="3509445" y="4780169"/>
-            <a:ext cx="998420" cy="322080"/>
+            <a:off x="3509445" y="4184550"/>
+            <a:ext cx="998420" cy="183689"/>
           </a:xfrm>
           <a:prstGeom prst="roundRect">
             <a:avLst/>
@@ -25316,10 +26511,10 @@
           <a:p>
             <a:pPr algn="ctr"/>
             <a:r>
-              <a:rPr lang="en-US" sz="1200" dirty="0"/>
+              <a:rPr lang="en-US" sz="1100" dirty="0"/>
               <a:t>TOTAL</a:t>
             </a:r>
-            <a:endParaRPr lang="en-US" dirty="0"/>
+            <a:endParaRPr lang="en-US" sz="1600" dirty="0"/>
           </a:p>
         </p:txBody>
       </p:sp>
@@ -25337,8 +26532,8 @@
         </p:nvSpPr>
         <p:spPr>
           <a:xfrm>
-            <a:off x="4572327" y="4780169"/>
-            <a:ext cx="757808" cy="322080"/>
+            <a:off x="4572327" y="4184550"/>
+            <a:ext cx="757808" cy="183689"/>
           </a:xfrm>
           <a:prstGeom prst="roundRect">
             <a:avLst/>
@@ -25372,10 +26567,10 @@
           <a:p>
             <a:pPr algn="ctr"/>
             <a:r>
-              <a:rPr lang="en-US" sz="1200" dirty="0"/>
+              <a:rPr lang="en-US" sz="1100" dirty="0"/>
               <a:t>ADDED</a:t>
             </a:r>
-            <a:endParaRPr lang="en-US" dirty="0"/>
+            <a:endParaRPr lang="en-US" sz="1600" dirty="0"/>
           </a:p>
         </p:txBody>
       </p:sp>
@@ -25393,8 +26588,8 @@
         </p:nvSpPr>
         <p:spPr>
           <a:xfrm>
-            <a:off x="5396478" y="4780169"/>
-            <a:ext cx="1036683" cy="322080"/>
+            <a:off x="5396478" y="4184550"/>
+            <a:ext cx="1036683" cy="183689"/>
           </a:xfrm>
           <a:prstGeom prst="roundRect">
             <a:avLst/>
@@ -25428,10 +26623,10 @@
           <a:p>
             <a:pPr algn="ctr"/>
             <a:r>
-              <a:rPr lang="en-US" sz="1200" dirty="0"/>
+              <a:rPr lang="en-US" sz="1100" dirty="0"/>
               <a:t>REMOVED</a:t>
             </a:r>
-            <a:endParaRPr lang="en-US" dirty="0"/>
+            <a:endParaRPr lang="en-US" sz="1600" dirty="0"/>
           </a:p>
         </p:txBody>
       </p:sp>
@@ -25449,8 +26644,8 @@
         </p:nvSpPr>
         <p:spPr>
           <a:xfrm>
-            <a:off x="6497624" y="4771529"/>
-            <a:ext cx="484353" cy="322080"/>
+            <a:off x="6497624" y="4175910"/>
+            <a:ext cx="484353" cy="183689"/>
           </a:xfrm>
           <a:prstGeom prst="roundRect">
             <a:avLst/>
@@ -25484,10 +26679,10 @@
           <a:p>
             <a:pPr algn="ctr"/>
             <a:r>
-              <a:rPr lang="en-US" sz="1200" dirty="0"/>
+              <a:rPr lang="en-US" sz="1100" dirty="0"/>
               <a:t>ALL</a:t>
             </a:r>
-            <a:endParaRPr lang="en-US" dirty="0"/>
+            <a:endParaRPr lang="en-US" sz="1600" dirty="0"/>
           </a:p>
         </p:txBody>
       </p:sp>
@@ -25505,8 +26700,8 @@
         </p:nvSpPr>
         <p:spPr>
           <a:xfrm>
-            <a:off x="3502534" y="5201640"/>
-            <a:ext cx="998420" cy="322080"/>
+            <a:off x="3502534" y="4555687"/>
+            <a:ext cx="998420" cy="183689"/>
           </a:xfrm>
           <a:prstGeom prst="roundRect">
             <a:avLst/>
@@ -25540,10 +26735,10 @@
           <a:p>
             <a:pPr algn="ctr"/>
             <a:r>
-              <a:rPr lang="en-US" sz="1200" dirty="0"/>
+              <a:rPr lang="en-US" sz="1100" dirty="0"/>
               <a:t>TOTAL</a:t>
             </a:r>
-            <a:endParaRPr lang="en-US" dirty="0"/>
+            <a:endParaRPr lang="en-US" sz="1600" dirty="0"/>
           </a:p>
         </p:txBody>
       </p:sp>
@@ -25561,8 +26756,8 @@
         </p:nvSpPr>
         <p:spPr>
           <a:xfrm>
-            <a:off x="4565416" y="5201640"/>
-            <a:ext cx="757808" cy="322080"/>
+            <a:off x="4565416" y="4555687"/>
+            <a:ext cx="757808" cy="183689"/>
           </a:xfrm>
           <a:prstGeom prst="roundRect">
             <a:avLst/>
@@ -25596,10 +26791,10 @@
           <a:p>
             <a:pPr algn="ctr"/>
             <a:r>
-              <a:rPr lang="en-US" sz="1200" dirty="0"/>
+              <a:rPr lang="en-US" sz="1100" dirty="0"/>
               <a:t>ADDED</a:t>
             </a:r>
-            <a:endParaRPr lang="en-US" dirty="0"/>
+            <a:endParaRPr lang="en-US" sz="1600" dirty="0"/>
           </a:p>
         </p:txBody>
       </p:sp>
@@ -25617,8 +26812,8 @@
         </p:nvSpPr>
         <p:spPr>
           <a:xfrm>
-            <a:off x="5389567" y="5201640"/>
-            <a:ext cx="1036683" cy="322080"/>
+            <a:off x="5389567" y="4555687"/>
+            <a:ext cx="1036683" cy="183689"/>
           </a:xfrm>
           <a:prstGeom prst="roundRect">
             <a:avLst/>
@@ -25652,10 +26847,10 @@
           <a:p>
             <a:pPr algn="ctr"/>
             <a:r>
-              <a:rPr lang="en-US" sz="1200" dirty="0"/>
+              <a:rPr lang="en-US" sz="1100" dirty="0"/>
               <a:t>REMOVED</a:t>
             </a:r>
-            <a:endParaRPr lang="en-US" dirty="0"/>
+            <a:endParaRPr lang="en-US" sz="1600" dirty="0"/>
           </a:p>
         </p:txBody>
       </p:sp>
@@ -25673,8 +26868,8 @@
         </p:nvSpPr>
         <p:spPr>
           <a:xfrm>
-            <a:off x="6490713" y="5193000"/>
-            <a:ext cx="484353" cy="322080"/>
+            <a:off x="6490713" y="4547047"/>
+            <a:ext cx="484353" cy="183689"/>
           </a:xfrm>
           <a:prstGeom prst="roundRect">
             <a:avLst/>
@@ -25708,10 +26903,10 @@
           <a:p>
             <a:pPr algn="ctr"/>
             <a:r>
-              <a:rPr lang="en-US" sz="1200" dirty="0"/>
+              <a:rPr lang="en-US" sz="1100" dirty="0"/>
               <a:t>ALL</a:t>
             </a:r>
-            <a:endParaRPr lang="en-US" dirty="0"/>
+            <a:endParaRPr lang="en-US" sz="1600" dirty="0"/>
           </a:p>
         </p:txBody>
       </p:sp>
@@ -25729,8 +26924,8 @@
         </p:nvSpPr>
         <p:spPr>
           <a:xfrm>
-            <a:off x="5122359" y="2649570"/>
-            <a:ext cx="2296753" cy="322080"/>
+            <a:off x="5122359" y="2515346"/>
+            <a:ext cx="2296753" cy="183689"/>
           </a:xfrm>
           <a:prstGeom prst="roundRect">
             <a:avLst/>
@@ -25764,10 +26959,10 @@
           <a:p>
             <a:pPr algn="ctr"/>
             <a:r>
-              <a:rPr lang="en-US" sz="1200" dirty="0"/>
+              <a:rPr lang="en-US" sz="1100" dirty="0"/>
               <a:t>CRITICAL_QUALITY_RULES</a:t>
             </a:r>
-            <a:endParaRPr lang="en-US" dirty="0"/>
+            <a:endParaRPr lang="en-US" sz="1600" dirty="0"/>
           </a:p>
         </p:txBody>
       </p:sp>
@@ -25785,8 +26980,8 @@
         </p:nvSpPr>
         <p:spPr>
           <a:xfrm>
-            <a:off x="4686677" y="3490689"/>
-            <a:ext cx="2382338" cy="322080"/>
+            <a:off x="7565336" y="2516215"/>
+            <a:ext cx="2382338" cy="183689"/>
           </a:xfrm>
           <a:prstGeom prst="roundRect">
             <a:avLst/>
@@ -25820,7 +27015,7 @@
           <a:p>
             <a:pPr algn="ctr"/>
             <a:r>
-              <a:rPr lang="en-US" sz="1200" dirty="0"/>
+              <a:rPr lang="en-US" sz="1100" dirty="0"/>
               <a:t>&lt;STANDARD TAG NAME&gt;**</a:t>
             </a:r>
           </a:p>
@@ -25840,7 +27035,7 @@
         </p:nvSpPr>
         <p:spPr>
           <a:xfrm>
-            <a:off x="715662" y="6052369"/>
+            <a:off x="715662" y="5607752"/>
             <a:ext cx="10703859" cy="447383"/>
           </a:xfrm>
           <a:prstGeom prst="rect">
@@ -25868,22 +27063,312 @@
           </a:lstStyle>
           <a:p>
             <a:r>
-              <a:rPr lang="en-US" dirty="0"/>
+              <a:rPr lang="en-US" sz="1050" dirty="0"/>
               <a:t>** </a:t>
             </a:r>
             <a:r>
-              <a:rPr lang="en-GB" dirty="0"/>
+              <a:rPr lang="en-GB" sz="1050" dirty="0"/>
               <a:t>The selection of metrics by standard quality tag name should only be used for an application where the extension “Quality Standards Support” is installed. If not, no metrics will be selected and </a:t>
             </a:r>
             <a:r>
-              <a:rPr lang="en-US" dirty="0"/>
+              <a:rPr lang="en-US" sz="1050" dirty="0"/>
               <a:t>graph</a:t>
             </a:r>
             <a:r>
-              <a:rPr lang="en-GB" dirty="0"/>
+              <a:rPr lang="en-GB" sz="1050" dirty="0"/>
               <a:t> will be empty.</a:t>
             </a:r>
-            <a:endParaRPr lang="en-US" dirty="0"/>
+            <a:endParaRPr lang="en-US" sz="1050" dirty="0"/>
+          </a:p>
+        </p:txBody>
+      </p:sp>
+      <p:sp>
+        <p:nvSpPr>
+          <p:cNvPr id="37" name="Rectangle: Rounded Corners 36">
+            <a:extLst>
+              <a:ext uri="{FF2B5EF4-FFF2-40B4-BE49-F238E27FC236}">
+                <a16:creationId xmlns:a16="http://schemas.microsoft.com/office/drawing/2014/main" id="{C396BBBA-7974-438E-80F8-9D5738774B7F}"/>
+              </a:ext>
+            </a:extLst>
+          </p:cNvPr>
+          <p:cNvSpPr/>
+          <p:nvPr/>
+        </p:nvSpPr>
+        <p:spPr>
+          <a:xfrm>
+            <a:off x="3503932" y="4993313"/>
+            <a:ext cx="998420" cy="183689"/>
+          </a:xfrm>
+          <a:prstGeom prst="roundRect">
+            <a:avLst/>
+          </a:prstGeom>
+          <a:solidFill>
+            <a:srgbClr val="7F7F7F"/>
+          </a:solidFill>
+          <a:ln>
+            <a:noFill/>
+          </a:ln>
+        </p:spPr>
+        <p:style>
+          <a:lnRef idx="2">
+            <a:schemeClr val="accent1">
+              <a:shade val="50000"/>
+            </a:schemeClr>
+          </a:lnRef>
+          <a:fillRef idx="1">
+            <a:schemeClr val="accent1"/>
+          </a:fillRef>
+          <a:effectRef idx="0">
+            <a:schemeClr val="accent1"/>
+          </a:effectRef>
+          <a:fontRef idx="minor">
+            <a:schemeClr val="lt1"/>
+          </a:fontRef>
+        </p:style>
+        <p:txBody>
+          <a:bodyPr rtlCol="0" anchor="ctr"/>
+          <a:lstStyle/>
+          <a:p>
+            <a:pPr algn="ctr"/>
+            <a:r>
+              <a:rPr lang="en-US" sz="1100" dirty="0"/>
+              <a:t>TOTAL</a:t>
+            </a:r>
+            <a:endParaRPr lang="en-US" sz="1600" dirty="0"/>
+          </a:p>
+        </p:txBody>
+      </p:sp>
+      <p:sp>
+        <p:nvSpPr>
+          <p:cNvPr id="38" name="Rectangle: Rounded Corners 37">
+            <a:extLst>
+              <a:ext uri="{FF2B5EF4-FFF2-40B4-BE49-F238E27FC236}">
+                <a16:creationId xmlns:a16="http://schemas.microsoft.com/office/drawing/2014/main" id="{3BD185FD-4AF2-4DE6-A55E-F09901FD58AF}"/>
+              </a:ext>
+            </a:extLst>
+          </p:cNvPr>
+          <p:cNvSpPr/>
+          <p:nvPr/>
+        </p:nvSpPr>
+        <p:spPr>
+          <a:xfrm>
+            <a:off x="4566814" y="4993313"/>
+            <a:ext cx="757808" cy="183689"/>
+          </a:xfrm>
+          <a:prstGeom prst="roundRect">
+            <a:avLst/>
+          </a:prstGeom>
+          <a:solidFill>
+            <a:srgbClr val="7F7F7F"/>
+          </a:solidFill>
+          <a:ln>
+            <a:noFill/>
+          </a:ln>
+        </p:spPr>
+        <p:style>
+          <a:lnRef idx="2">
+            <a:schemeClr val="accent1">
+              <a:shade val="50000"/>
+            </a:schemeClr>
+          </a:lnRef>
+          <a:fillRef idx="1">
+            <a:schemeClr val="accent1"/>
+          </a:fillRef>
+          <a:effectRef idx="0">
+            <a:schemeClr val="accent1"/>
+          </a:effectRef>
+          <a:fontRef idx="minor">
+            <a:schemeClr val="lt1"/>
+          </a:fontRef>
+        </p:style>
+        <p:txBody>
+          <a:bodyPr rtlCol="0" anchor="ctr"/>
+          <a:lstStyle/>
+          <a:p>
+            <a:pPr algn="ctr"/>
+            <a:r>
+              <a:rPr lang="en-US" sz="1100" dirty="0"/>
+              <a:t>ADDED</a:t>
+            </a:r>
+            <a:endParaRPr lang="en-US" sz="1600" dirty="0"/>
+          </a:p>
+        </p:txBody>
+      </p:sp>
+      <p:sp>
+        <p:nvSpPr>
+          <p:cNvPr id="39" name="Rectangle: Rounded Corners 38">
+            <a:extLst>
+              <a:ext uri="{FF2B5EF4-FFF2-40B4-BE49-F238E27FC236}">
+                <a16:creationId xmlns:a16="http://schemas.microsoft.com/office/drawing/2014/main" id="{3009B6B9-9E64-4D18-886D-9B154F45B614}"/>
+              </a:ext>
+            </a:extLst>
+          </p:cNvPr>
+          <p:cNvSpPr/>
+          <p:nvPr/>
+        </p:nvSpPr>
+        <p:spPr>
+          <a:xfrm>
+            <a:off x="5390965" y="4993313"/>
+            <a:ext cx="1036683" cy="183689"/>
+          </a:xfrm>
+          <a:prstGeom prst="roundRect">
+            <a:avLst/>
+          </a:prstGeom>
+          <a:solidFill>
+            <a:srgbClr val="7F7F7F"/>
+          </a:solidFill>
+          <a:ln>
+            <a:noFill/>
+          </a:ln>
+        </p:spPr>
+        <p:style>
+          <a:lnRef idx="2">
+            <a:schemeClr val="accent1">
+              <a:shade val="50000"/>
+            </a:schemeClr>
+          </a:lnRef>
+          <a:fillRef idx="1">
+            <a:schemeClr val="accent1"/>
+          </a:fillRef>
+          <a:effectRef idx="0">
+            <a:schemeClr val="accent1"/>
+          </a:effectRef>
+          <a:fontRef idx="minor">
+            <a:schemeClr val="lt1"/>
+          </a:fontRef>
+        </p:style>
+        <p:txBody>
+          <a:bodyPr rtlCol="0" anchor="ctr"/>
+          <a:lstStyle/>
+          <a:p>
+            <a:pPr algn="ctr"/>
+            <a:r>
+              <a:rPr lang="en-US" sz="1100" dirty="0"/>
+              <a:t>REMOVED</a:t>
+            </a:r>
+            <a:endParaRPr lang="en-US" sz="1600" dirty="0"/>
+          </a:p>
+        </p:txBody>
+      </p:sp>
+      <p:sp>
+        <p:nvSpPr>
+          <p:cNvPr id="40" name="Rectangle: Rounded Corners 39">
+            <a:extLst>
+              <a:ext uri="{FF2B5EF4-FFF2-40B4-BE49-F238E27FC236}">
+                <a16:creationId xmlns:a16="http://schemas.microsoft.com/office/drawing/2014/main" id="{5DA30AA2-4EBB-4EA3-BB6D-76B53008F6F3}"/>
+              </a:ext>
+            </a:extLst>
+          </p:cNvPr>
+          <p:cNvSpPr/>
+          <p:nvPr/>
+        </p:nvSpPr>
+        <p:spPr>
+          <a:xfrm>
+            <a:off x="6492111" y="4984673"/>
+            <a:ext cx="484353" cy="183689"/>
+          </a:xfrm>
+          <a:prstGeom prst="roundRect">
+            <a:avLst/>
+          </a:prstGeom>
+          <a:solidFill>
+            <a:srgbClr val="7F7F7F"/>
+          </a:solidFill>
+          <a:ln>
+            <a:noFill/>
+          </a:ln>
+        </p:spPr>
+        <p:style>
+          <a:lnRef idx="2">
+            <a:schemeClr val="accent1">
+              <a:shade val="50000"/>
+            </a:schemeClr>
+          </a:lnRef>
+          <a:fillRef idx="1">
+            <a:schemeClr val="accent1"/>
+          </a:fillRef>
+          <a:effectRef idx="0">
+            <a:schemeClr val="accent1"/>
+          </a:effectRef>
+          <a:fontRef idx="minor">
+            <a:schemeClr val="lt1"/>
+          </a:fontRef>
+        </p:style>
+        <p:txBody>
+          <a:bodyPr rtlCol="0" anchor="ctr"/>
+          <a:lstStyle/>
+          <a:p>
+            <a:pPr algn="ctr"/>
+            <a:r>
+              <a:rPr lang="en-US" sz="1100" dirty="0"/>
+              <a:t>ALL</a:t>
+            </a:r>
+            <a:endParaRPr lang="en-US" sz="1600" dirty="0"/>
+          </a:p>
+        </p:txBody>
+      </p:sp>
+      <p:sp>
+        <p:nvSpPr>
+          <p:cNvPr id="41" name="TextBox 40">
+            <a:extLst>
+              <a:ext uri="{FF2B5EF4-FFF2-40B4-BE49-F238E27FC236}">
+                <a16:creationId xmlns:a16="http://schemas.microsoft.com/office/drawing/2014/main" id="{A95BBD19-162B-4418-8A8B-34FCC1EB9E93}"/>
+              </a:ext>
+            </a:extLst>
+          </p:cNvPr>
+          <p:cNvSpPr txBox="1"/>
+          <p:nvPr/>
+        </p:nvSpPr>
+        <p:spPr>
+          <a:xfrm>
+            <a:off x="715661" y="6091311"/>
+            <a:ext cx="10703859" cy="447383"/>
+          </a:xfrm>
+          <a:prstGeom prst="rect">
+            <a:avLst/>
+          </a:prstGeom>
+        </p:spPr>
+        <p:txBody>
+          <a:bodyPr vert="horz" wrap="square" lIns="91440" tIns="45720" rIns="91440" bIns="45720" rtlCol="0" anchor="t">
+            <a:noAutofit/>
+          </a:bodyPr>
+          <a:lstStyle>
+            <a:defPPr>
+              <a:defRPr lang="en-US"/>
+            </a:defPPr>
+            <a:lvl1pPr>
+              <a:defRPr sz="1200">
+                <a:solidFill>
+                  <a:schemeClr val="tx1">
+                    <a:lumMod val="50000"/>
+                    <a:lumOff val="50000"/>
+                  </a:schemeClr>
+                </a:solidFill>
+              </a:defRPr>
+            </a:lvl1pPr>
+          </a:lstStyle>
+          <a:p>
+            <a:r>
+              <a:rPr lang="en-US" sz="1050" dirty="0"/>
+              <a:t>*** Requires installation of OMG Technical Debt Measure (&gt;2.0.0 </a:t>
+            </a:r>
+            <a:r>
+              <a:rPr lang="en-US" sz="1050" dirty="0" err="1"/>
+              <a:t>funcrel</a:t>
+            </a:r>
+            <a:r>
+              <a:rPr lang="en-US" sz="1050" dirty="0"/>
+              <a:t>) (and ISO-5055 Index extensions and/or CISQ Index extensions)</a:t>
+            </a:r>
+          </a:p>
+          <a:p>
+            <a:r>
+              <a:rPr lang="en-US" sz="1050" dirty="0"/>
+              <a:t>To get results on Omg Technical Debt on a specific metric, add the axis "METRICS=M" where M is the index id (ISO, CISQ or AIP)</a:t>
+            </a:r>
+            <a:endParaRPr lang="en-GB" sz="1050" dirty="0"/>
+          </a:p>
+          <a:p>
+            <a:endParaRPr lang="en-US" sz="1050" dirty="0"/>
           </a:p>
         </p:txBody>
       </p:sp>

</xml_diff>